<commit_message>
create the diagram for rx
</commit_message>
<xml_diff>
--- a/Documents/get_start_with_gr-cdma/figure/figure_source.pptx
+++ b/Documents/get_start_with_gr-cdma/figure/figure_source.pptx
@@ -9,6 +9,8 @@
     <p:sldId id="257" r:id="rId3"/>
     <p:sldId id="258" r:id="rId4"/>
     <p:sldId id="259" r:id="rId5"/>
+    <p:sldId id="260" r:id="rId6"/>
+    <p:sldId id="261" r:id="rId7"/>
   </p:sldIdLst>
   <p:sldSz cx="9144000" cy="6858000" type="screen4x3"/>
   <p:notesSz cx="6858000" cy="9144000"/>
@@ -291,7 +293,7 @@
           <a:p>
             <a:fld id="{74A26211-2DA7-E74A-AB9C-A5C9F972D1F5}" type="datetimeFigureOut">
               <a:rPr kumimoji="1" lang="zh-CN" altLang="en-US" smtClean="0"/>
-              <a:t>5/19/16</a:t>
+              <a:t>6/18/16</a:t>
             </a:fld>
             <a:endParaRPr kumimoji="1" lang="zh-CN" altLang="en-US"/>
           </a:p>
@@ -461,7 +463,7 @@
           <a:p>
             <a:fld id="{74A26211-2DA7-E74A-AB9C-A5C9F972D1F5}" type="datetimeFigureOut">
               <a:rPr kumimoji="1" lang="zh-CN" altLang="en-US" smtClean="0"/>
-              <a:t>5/19/16</a:t>
+              <a:t>6/18/16</a:t>
             </a:fld>
             <a:endParaRPr kumimoji="1" lang="zh-CN" altLang="en-US"/>
           </a:p>
@@ -641,7 +643,7 @@
           <a:p>
             <a:fld id="{74A26211-2DA7-E74A-AB9C-A5C9F972D1F5}" type="datetimeFigureOut">
               <a:rPr kumimoji="1" lang="zh-CN" altLang="en-US" smtClean="0"/>
-              <a:t>5/19/16</a:t>
+              <a:t>6/18/16</a:t>
             </a:fld>
             <a:endParaRPr kumimoji="1" lang="zh-CN" altLang="en-US"/>
           </a:p>
@@ -811,7 +813,7 @@
           <a:p>
             <a:fld id="{74A26211-2DA7-E74A-AB9C-A5C9F972D1F5}" type="datetimeFigureOut">
               <a:rPr kumimoji="1" lang="zh-CN" altLang="en-US" smtClean="0"/>
-              <a:t>5/19/16</a:t>
+              <a:t>6/18/16</a:t>
             </a:fld>
             <a:endParaRPr kumimoji="1" lang="zh-CN" altLang="en-US"/>
           </a:p>
@@ -1057,7 +1059,7 @@
           <a:p>
             <a:fld id="{74A26211-2DA7-E74A-AB9C-A5C9F972D1F5}" type="datetimeFigureOut">
               <a:rPr kumimoji="1" lang="zh-CN" altLang="en-US" smtClean="0"/>
-              <a:t>5/19/16</a:t>
+              <a:t>6/18/16</a:t>
             </a:fld>
             <a:endParaRPr kumimoji="1" lang="zh-CN" altLang="en-US"/>
           </a:p>
@@ -1345,7 +1347,7 @@
           <a:p>
             <a:fld id="{74A26211-2DA7-E74A-AB9C-A5C9F972D1F5}" type="datetimeFigureOut">
               <a:rPr kumimoji="1" lang="zh-CN" altLang="en-US" smtClean="0"/>
-              <a:t>5/19/16</a:t>
+              <a:t>6/18/16</a:t>
             </a:fld>
             <a:endParaRPr kumimoji="1" lang="zh-CN" altLang="en-US"/>
           </a:p>
@@ -1767,7 +1769,7 @@
           <a:p>
             <a:fld id="{74A26211-2DA7-E74A-AB9C-A5C9F972D1F5}" type="datetimeFigureOut">
               <a:rPr kumimoji="1" lang="zh-CN" altLang="en-US" smtClean="0"/>
-              <a:t>5/19/16</a:t>
+              <a:t>6/18/16</a:t>
             </a:fld>
             <a:endParaRPr kumimoji="1" lang="zh-CN" altLang="en-US"/>
           </a:p>
@@ -1885,7 +1887,7 @@
           <a:p>
             <a:fld id="{74A26211-2DA7-E74A-AB9C-A5C9F972D1F5}" type="datetimeFigureOut">
               <a:rPr kumimoji="1" lang="zh-CN" altLang="en-US" smtClean="0"/>
-              <a:t>5/19/16</a:t>
+              <a:t>6/18/16</a:t>
             </a:fld>
             <a:endParaRPr kumimoji="1" lang="zh-CN" altLang="en-US"/>
           </a:p>
@@ -1980,7 +1982,7 @@
           <a:p>
             <a:fld id="{74A26211-2DA7-E74A-AB9C-A5C9F972D1F5}" type="datetimeFigureOut">
               <a:rPr kumimoji="1" lang="zh-CN" altLang="en-US" smtClean="0"/>
-              <a:t>5/19/16</a:t>
+              <a:t>6/18/16</a:t>
             </a:fld>
             <a:endParaRPr kumimoji="1" lang="zh-CN" altLang="en-US"/>
           </a:p>
@@ -2257,7 +2259,7 @@
           <a:p>
             <a:fld id="{74A26211-2DA7-E74A-AB9C-A5C9F972D1F5}" type="datetimeFigureOut">
               <a:rPr kumimoji="1" lang="zh-CN" altLang="en-US" smtClean="0"/>
-              <a:t>5/19/16</a:t>
+              <a:t>6/18/16</a:t>
             </a:fld>
             <a:endParaRPr kumimoji="1" lang="zh-CN" altLang="en-US"/>
           </a:p>
@@ -2510,7 +2512,7 @@
           <a:p>
             <a:fld id="{74A26211-2DA7-E74A-AB9C-A5C9F972D1F5}" type="datetimeFigureOut">
               <a:rPr kumimoji="1" lang="zh-CN" altLang="en-US" smtClean="0"/>
-              <a:t>5/19/16</a:t>
+              <a:t>6/18/16</a:t>
             </a:fld>
             <a:endParaRPr kumimoji="1" lang="zh-CN" altLang="en-US"/>
           </a:p>
@@ -2723,7 +2725,7 @@
           <a:p>
             <a:fld id="{74A26211-2DA7-E74A-AB9C-A5C9F972D1F5}" type="datetimeFigureOut">
               <a:rPr kumimoji="1" lang="zh-CN" altLang="en-US" smtClean="0"/>
-              <a:t>5/19/16</a:t>
+              <a:t>6/18/16</a:t>
             </a:fld>
             <a:endParaRPr kumimoji="1" lang="zh-CN" altLang="en-US"/>
           </a:p>
@@ -17506,6 +17508,3919 @@
 </p:sld>
 </file>
 
+<file path=ppt/slides/slide5.xml><?xml version="1.0" encoding="utf-8"?>
+<p:sld xmlns:a="http://schemas.openxmlformats.org/drawingml/2006/main" xmlns:r="http://schemas.openxmlformats.org/officeDocument/2006/relationships" xmlns:p="http://schemas.openxmlformats.org/presentationml/2006/main">
+  <p:cSld>
+    <p:spTree>
+      <p:nvGrpSpPr>
+        <p:cNvPr id="1" name=""/>
+        <p:cNvGrpSpPr/>
+        <p:nvPr/>
+      </p:nvGrpSpPr>
+      <p:grpSpPr>
+        <a:xfrm>
+          <a:off x="0" y="0"/>
+          <a:ext cx="0" cy="0"/>
+          <a:chOff x="0" y="0"/>
+          <a:chExt cx="0" cy="0"/>
+        </a:xfrm>
+      </p:grpSpPr>
+      <p:sp>
+        <p:nvSpPr>
+          <p:cNvPr id="4" name="矩形 3"/>
+          <p:cNvSpPr/>
+          <p:nvPr/>
+        </p:nvSpPr>
+        <p:spPr>
+          <a:xfrm>
+            <a:off x="-1736725" y="1138630"/>
+            <a:ext cx="1828800" cy="731520"/>
+          </a:xfrm>
+          <a:prstGeom prst="rect">
+            <a:avLst/>
+          </a:prstGeom>
+          <a:noFill/>
+          <a:ln>
+            <a:solidFill>
+              <a:schemeClr val="tx1"/>
+            </a:solidFill>
+          </a:ln>
+        </p:spPr>
+        <p:style>
+          <a:lnRef idx="1">
+            <a:schemeClr val="accent1"/>
+          </a:lnRef>
+          <a:fillRef idx="3">
+            <a:schemeClr val="accent1"/>
+          </a:fillRef>
+          <a:effectRef idx="2">
+            <a:schemeClr val="accent1"/>
+          </a:effectRef>
+          <a:fontRef idx="minor">
+            <a:schemeClr val="lt1"/>
+          </a:fontRef>
+        </p:style>
+        <p:txBody>
+          <a:bodyPr rtlCol="0" anchor="ctr"/>
+          <a:lstStyle/>
+          <a:p>
+            <a:pPr algn="ctr"/>
+            <a:r>
+              <a:rPr kumimoji="1" lang="en-US" altLang="zh-CN" dirty="0" smtClean="0">
+                <a:solidFill>
+                  <a:schemeClr val="tx1"/>
+                </a:solidFill>
+              </a:rPr>
+              <a:t>Input</a:t>
+            </a:r>
+            <a:endParaRPr kumimoji="1" lang="zh-CN" altLang="en-US" dirty="0">
+              <a:solidFill>
+                <a:schemeClr val="tx1"/>
+              </a:solidFill>
+            </a:endParaRPr>
+          </a:p>
+        </p:txBody>
+      </p:sp>
+      <p:sp>
+        <p:nvSpPr>
+          <p:cNvPr id="5" name="矩形 4"/>
+          <p:cNvSpPr/>
+          <p:nvPr/>
+        </p:nvSpPr>
+        <p:spPr>
+          <a:xfrm>
+            <a:off x="810260" y="1138630"/>
+            <a:ext cx="1828800" cy="731520"/>
+          </a:xfrm>
+          <a:prstGeom prst="rect">
+            <a:avLst/>
+          </a:prstGeom>
+          <a:noFill/>
+          <a:ln>
+            <a:solidFill>
+              <a:schemeClr val="tx1"/>
+            </a:solidFill>
+          </a:ln>
+        </p:spPr>
+        <p:style>
+          <a:lnRef idx="1">
+            <a:schemeClr val="accent1"/>
+          </a:lnRef>
+          <a:fillRef idx="3">
+            <a:schemeClr val="accent1"/>
+          </a:fillRef>
+          <a:effectRef idx="2">
+            <a:schemeClr val="accent1"/>
+          </a:effectRef>
+          <a:fontRef idx="minor">
+            <a:schemeClr val="lt1"/>
+          </a:fontRef>
+        </p:style>
+        <p:txBody>
+          <a:bodyPr rtlCol="0" anchor="ctr"/>
+          <a:lstStyle/>
+          <a:p>
+            <a:pPr algn="ctr"/>
+            <a:r>
+              <a:rPr kumimoji="1" lang="en-US" altLang="zh-CN" dirty="0" smtClean="0">
+                <a:solidFill>
+                  <a:schemeClr val="tx1"/>
+                </a:solidFill>
+              </a:rPr>
+              <a:t>Pulse</a:t>
+            </a:r>
+            <a:r>
+              <a:rPr kumimoji="1" lang="en-US" altLang="zh-CN" dirty="0" smtClean="0">
+                <a:solidFill>
+                  <a:schemeClr val="tx1"/>
+                </a:solidFill>
+              </a:rPr>
+              <a:t>-wise</a:t>
+            </a:r>
+          </a:p>
+          <a:p>
+            <a:pPr algn="ctr"/>
+            <a:r>
+              <a:rPr kumimoji="1" lang="en-US" altLang="zh-CN" dirty="0" smtClean="0">
+                <a:solidFill>
+                  <a:schemeClr val="tx1"/>
+                </a:solidFill>
+              </a:rPr>
+              <a:t>Matched</a:t>
+            </a:r>
+            <a:r>
+              <a:rPr kumimoji="1" lang="zh-CN" altLang="en-US" dirty="0" smtClean="0">
+                <a:solidFill>
+                  <a:schemeClr val="tx1"/>
+                </a:solidFill>
+              </a:rPr>
+              <a:t> </a:t>
+            </a:r>
+            <a:r>
+              <a:rPr kumimoji="1" lang="en-US" altLang="zh-CN" dirty="0" smtClean="0">
+                <a:solidFill>
+                  <a:schemeClr val="tx1"/>
+                </a:solidFill>
+              </a:rPr>
+              <a:t>Filter</a:t>
+            </a:r>
+            <a:endParaRPr kumimoji="1" lang="zh-CN" altLang="en-US" dirty="0">
+              <a:solidFill>
+                <a:schemeClr val="tx1"/>
+              </a:solidFill>
+            </a:endParaRPr>
+          </a:p>
+        </p:txBody>
+      </p:sp>
+      <p:sp>
+        <p:nvSpPr>
+          <p:cNvPr id="6" name="矩形 5"/>
+          <p:cNvSpPr/>
+          <p:nvPr/>
+        </p:nvSpPr>
+        <p:spPr>
+          <a:xfrm>
+            <a:off x="3556719" y="349473"/>
+            <a:ext cx="1828800" cy="731520"/>
+          </a:xfrm>
+          <a:prstGeom prst="rect">
+            <a:avLst/>
+          </a:prstGeom>
+          <a:noFill/>
+          <a:ln>
+            <a:solidFill>
+              <a:schemeClr val="tx1"/>
+            </a:solidFill>
+          </a:ln>
+        </p:spPr>
+        <p:style>
+          <a:lnRef idx="1">
+            <a:schemeClr val="accent1"/>
+          </a:lnRef>
+          <a:fillRef idx="3">
+            <a:schemeClr val="accent1"/>
+          </a:fillRef>
+          <a:effectRef idx="2">
+            <a:schemeClr val="accent1"/>
+          </a:effectRef>
+          <a:fontRef idx="minor">
+            <a:schemeClr val="lt1"/>
+          </a:fontRef>
+        </p:style>
+        <p:txBody>
+          <a:bodyPr rtlCol="0" anchor="ctr"/>
+          <a:lstStyle/>
+          <a:p>
+            <a:pPr algn="ctr"/>
+            <a:r>
+              <a:rPr kumimoji="1" lang="en-US" altLang="zh-CN" dirty="0" err="1" smtClean="0">
+                <a:solidFill>
+                  <a:schemeClr val="tx1"/>
+                </a:solidFill>
+              </a:rPr>
+              <a:t>Freq</a:t>
+            </a:r>
+            <a:r>
+              <a:rPr kumimoji="1" lang="zh-CN" altLang="zh-CN" dirty="0">
+                <a:solidFill>
+                  <a:schemeClr val="tx1"/>
+                </a:solidFill>
+              </a:rPr>
+              <a:t> </a:t>
+            </a:r>
+            <a:r>
+              <a:rPr kumimoji="1" lang="en-US" altLang="zh-CN" dirty="0" smtClean="0">
+                <a:solidFill>
+                  <a:schemeClr val="tx1"/>
+                </a:solidFill>
+              </a:rPr>
+              <a:t>&amp;</a:t>
+            </a:r>
+            <a:r>
+              <a:rPr kumimoji="1" lang="zh-CN" altLang="en-US" dirty="0" smtClean="0">
+                <a:solidFill>
+                  <a:schemeClr val="tx1"/>
+                </a:solidFill>
+              </a:rPr>
+              <a:t> </a:t>
+            </a:r>
+            <a:r>
+              <a:rPr kumimoji="1" lang="en-US" altLang="zh-CN" dirty="0" smtClean="0">
+                <a:solidFill>
+                  <a:schemeClr val="tx1"/>
+                </a:solidFill>
+              </a:rPr>
+              <a:t>Timing</a:t>
+            </a:r>
+          </a:p>
+          <a:p>
+            <a:pPr algn="ctr"/>
+            <a:r>
+              <a:rPr kumimoji="1" lang="en-US" altLang="zh-CN" dirty="0" smtClean="0">
+                <a:solidFill>
+                  <a:schemeClr val="tx1"/>
+                </a:solidFill>
+              </a:rPr>
+              <a:t>Estimator</a:t>
+            </a:r>
+            <a:endParaRPr kumimoji="1" lang="en-US" altLang="zh-CN" dirty="0" smtClean="0">
+              <a:solidFill>
+                <a:schemeClr val="tx1"/>
+              </a:solidFill>
+            </a:endParaRPr>
+          </a:p>
+        </p:txBody>
+      </p:sp>
+      <p:sp>
+        <p:nvSpPr>
+          <p:cNvPr id="8" name="矩形 7"/>
+          <p:cNvSpPr/>
+          <p:nvPr/>
+        </p:nvSpPr>
+        <p:spPr>
+          <a:xfrm>
+            <a:off x="5110480" y="2028378"/>
+            <a:ext cx="1828800" cy="731520"/>
+          </a:xfrm>
+          <a:prstGeom prst="rect">
+            <a:avLst/>
+          </a:prstGeom>
+          <a:noFill/>
+          <a:ln>
+            <a:solidFill>
+              <a:schemeClr val="tx1"/>
+            </a:solidFill>
+          </a:ln>
+        </p:spPr>
+        <p:style>
+          <a:lnRef idx="1">
+            <a:schemeClr val="accent1"/>
+          </a:lnRef>
+          <a:fillRef idx="3">
+            <a:schemeClr val="accent1"/>
+          </a:fillRef>
+          <a:effectRef idx="2">
+            <a:schemeClr val="accent1"/>
+          </a:effectRef>
+          <a:fontRef idx="minor">
+            <a:schemeClr val="lt1"/>
+          </a:fontRef>
+        </p:style>
+        <p:txBody>
+          <a:bodyPr rtlCol="0" anchor="ctr"/>
+          <a:lstStyle/>
+          <a:p>
+            <a:pPr algn="ctr"/>
+            <a:r>
+              <a:rPr kumimoji="1" lang="en-US" altLang="zh-CN" dirty="0" smtClean="0">
+                <a:solidFill>
+                  <a:schemeClr val="tx1"/>
+                </a:solidFill>
+              </a:rPr>
+              <a:t>Chopper</a:t>
+            </a:r>
+          </a:p>
+        </p:txBody>
+      </p:sp>
+      <p:sp>
+        <p:nvSpPr>
+          <p:cNvPr id="9" name="矩形 8"/>
+          <p:cNvSpPr/>
+          <p:nvPr/>
+        </p:nvSpPr>
+        <p:spPr>
+          <a:xfrm>
+            <a:off x="7516411" y="407110"/>
+            <a:ext cx="1828800" cy="731520"/>
+          </a:xfrm>
+          <a:prstGeom prst="rect">
+            <a:avLst/>
+          </a:prstGeom>
+          <a:noFill/>
+          <a:ln>
+            <a:solidFill>
+              <a:schemeClr val="tx1"/>
+            </a:solidFill>
+          </a:ln>
+        </p:spPr>
+        <p:style>
+          <a:lnRef idx="1">
+            <a:schemeClr val="accent1"/>
+          </a:lnRef>
+          <a:fillRef idx="3">
+            <a:schemeClr val="accent1"/>
+          </a:fillRef>
+          <a:effectRef idx="2">
+            <a:schemeClr val="accent1"/>
+          </a:effectRef>
+          <a:fontRef idx="minor">
+            <a:schemeClr val="lt1"/>
+          </a:fontRef>
+        </p:style>
+        <p:txBody>
+          <a:bodyPr rtlCol="0" anchor="ctr"/>
+          <a:lstStyle/>
+          <a:p>
+            <a:pPr algn="ctr"/>
+            <a:r>
+              <a:rPr kumimoji="1" lang="en-US" altLang="zh-CN" dirty="0" smtClean="0">
+                <a:solidFill>
+                  <a:schemeClr val="tx1"/>
+                </a:solidFill>
+              </a:rPr>
+              <a:t>Amp</a:t>
+            </a:r>
+            <a:r>
+              <a:rPr kumimoji="1" lang="zh-CN" altLang="en-US" dirty="0" smtClean="0">
+                <a:solidFill>
+                  <a:schemeClr val="tx1"/>
+                </a:solidFill>
+              </a:rPr>
+              <a:t> </a:t>
+            </a:r>
+            <a:r>
+              <a:rPr kumimoji="1" lang="en-US" altLang="zh-CN" dirty="0" smtClean="0">
+                <a:solidFill>
+                  <a:schemeClr val="tx1"/>
+                </a:solidFill>
+              </a:rPr>
+              <a:t>&amp;</a:t>
+            </a:r>
+            <a:r>
+              <a:rPr kumimoji="1" lang="zh-CN" altLang="en-US" dirty="0" smtClean="0">
+                <a:solidFill>
+                  <a:schemeClr val="tx1"/>
+                </a:solidFill>
+              </a:rPr>
+              <a:t> </a:t>
+            </a:r>
+            <a:r>
+              <a:rPr kumimoji="1" lang="en-US" altLang="zh-CN" dirty="0" err="1" smtClean="0">
+                <a:solidFill>
+                  <a:schemeClr val="tx1"/>
+                </a:solidFill>
+              </a:rPr>
+              <a:t>Var</a:t>
+            </a:r>
+            <a:endParaRPr kumimoji="1" lang="en-US" altLang="zh-CN" dirty="0">
+              <a:solidFill>
+                <a:schemeClr val="tx1"/>
+              </a:solidFill>
+            </a:endParaRPr>
+          </a:p>
+          <a:p>
+            <a:pPr algn="ctr"/>
+            <a:r>
+              <a:rPr kumimoji="1" lang="en-US" altLang="zh-CN" dirty="0" smtClean="0">
+                <a:solidFill>
+                  <a:schemeClr val="tx1"/>
+                </a:solidFill>
+              </a:rPr>
+              <a:t>Estimator</a:t>
+            </a:r>
+          </a:p>
+        </p:txBody>
+      </p:sp>
+      <p:sp>
+        <p:nvSpPr>
+          <p:cNvPr id="10" name="矩形 9"/>
+          <p:cNvSpPr/>
+          <p:nvPr/>
+        </p:nvSpPr>
+        <p:spPr>
+          <a:xfrm>
+            <a:off x="7516411" y="2584638"/>
+            <a:ext cx="1828800" cy="731520"/>
+          </a:xfrm>
+          <a:prstGeom prst="rect">
+            <a:avLst/>
+          </a:prstGeom>
+          <a:noFill/>
+          <a:ln>
+            <a:solidFill>
+              <a:schemeClr val="tx1"/>
+            </a:solidFill>
+          </a:ln>
+        </p:spPr>
+        <p:style>
+          <a:lnRef idx="1">
+            <a:schemeClr val="accent1"/>
+          </a:lnRef>
+          <a:fillRef idx="3">
+            <a:schemeClr val="accent1"/>
+          </a:fillRef>
+          <a:effectRef idx="2">
+            <a:schemeClr val="accent1"/>
+          </a:effectRef>
+          <a:fontRef idx="minor">
+            <a:schemeClr val="lt1"/>
+          </a:fontRef>
+        </p:style>
+        <p:txBody>
+          <a:bodyPr rtlCol="0" anchor="ctr"/>
+          <a:lstStyle/>
+          <a:p>
+            <a:pPr algn="ctr"/>
+            <a:r>
+              <a:rPr kumimoji="1" lang="en-US" altLang="zh-CN" dirty="0" smtClean="0">
+                <a:solidFill>
+                  <a:schemeClr val="tx1"/>
+                </a:solidFill>
+              </a:rPr>
+              <a:t>Decimator</a:t>
+            </a:r>
+          </a:p>
+          <a:p>
+            <a:pPr algn="ctr"/>
+            <a:r>
+              <a:rPr kumimoji="1" lang="en-US" altLang="zh-CN" dirty="0" smtClean="0">
+                <a:solidFill>
+                  <a:schemeClr val="tx1"/>
+                </a:solidFill>
+              </a:rPr>
+              <a:t>for</a:t>
+            </a:r>
+            <a:r>
+              <a:rPr kumimoji="1" lang="zh-CN" altLang="en-US" dirty="0" smtClean="0">
+                <a:solidFill>
+                  <a:schemeClr val="tx1"/>
+                </a:solidFill>
+              </a:rPr>
+              <a:t> </a:t>
+            </a:r>
+            <a:r>
+              <a:rPr kumimoji="1" lang="en-US" altLang="zh-CN" dirty="0" smtClean="0">
+                <a:solidFill>
+                  <a:schemeClr val="tx1"/>
+                </a:solidFill>
+              </a:rPr>
+              <a:t>data</a:t>
+            </a:r>
+            <a:r>
+              <a:rPr kumimoji="1" lang="zh-CN" altLang="en-US" dirty="0" smtClean="0">
+                <a:solidFill>
+                  <a:schemeClr val="tx1"/>
+                </a:solidFill>
+              </a:rPr>
+              <a:t> </a:t>
+            </a:r>
+            <a:r>
+              <a:rPr kumimoji="1" lang="en-US" altLang="zh-CN" dirty="0" err="1" smtClean="0">
+                <a:solidFill>
+                  <a:schemeClr val="tx1"/>
+                </a:solidFill>
+              </a:rPr>
+              <a:t>seq</a:t>
+            </a:r>
+            <a:endParaRPr kumimoji="1" lang="en-US" altLang="zh-CN" dirty="0" smtClean="0">
+              <a:solidFill>
+                <a:schemeClr val="tx1"/>
+              </a:solidFill>
+            </a:endParaRPr>
+          </a:p>
+        </p:txBody>
+      </p:sp>
+      <p:sp>
+        <p:nvSpPr>
+          <p:cNvPr id="11" name="矩形 10"/>
+          <p:cNvSpPr/>
+          <p:nvPr/>
+        </p:nvSpPr>
+        <p:spPr>
+          <a:xfrm>
+            <a:off x="5904230" y="3761592"/>
+            <a:ext cx="1828800" cy="731520"/>
+          </a:xfrm>
+          <a:prstGeom prst="rect">
+            <a:avLst/>
+          </a:prstGeom>
+          <a:noFill/>
+          <a:ln>
+            <a:solidFill>
+              <a:schemeClr val="tx1"/>
+            </a:solidFill>
+          </a:ln>
+        </p:spPr>
+        <p:style>
+          <a:lnRef idx="1">
+            <a:schemeClr val="accent1"/>
+          </a:lnRef>
+          <a:fillRef idx="3">
+            <a:schemeClr val="accent1"/>
+          </a:fillRef>
+          <a:effectRef idx="2">
+            <a:schemeClr val="accent1"/>
+          </a:effectRef>
+          <a:fontRef idx="minor">
+            <a:schemeClr val="lt1"/>
+          </a:fontRef>
+        </p:style>
+        <p:txBody>
+          <a:bodyPr rtlCol="0" anchor="ctr"/>
+          <a:lstStyle/>
+          <a:p>
+            <a:pPr algn="ctr"/>
+            <a:r>
+              <a:rPr kumimoji="1" lang="en-US" altLang="zh-CN" dirty="0" smtClean="0">
+                <a:solidFill>
+                  <a:schemeClr val="tx1"/>
+                </a:solidFill>
+              </a:rPr>
+              <a:t>Get</a:t>
+            </a:r>
+            <a:r>
+              <a:rPr kumimoji="1" lang="zh-CN" altLang="en-US" dirty="0" smtClean="0">
+                <a:solidFill>
+                  <a:schemeClr val="tx1"/>
+                </a:solidFill>
+              </a:rPr>
+              <a:t> </a:t>
+            </a:r>
+            <a:r>
+              <a:rPr kumimoji="1" lang="en-US" altLang="zh-CN" dirty="0" smtClean="0">
+                <a:solidFill>
+                  <a:schemeClr val="tx1"/>
+                </a:solidFill>
+              </a:rPr>
+              <a:t>Header</a:t>
+            </a:r>
+          </a:p>
+        </p:txBody>
+      </p:sp>
+      <p:sp>
+        <p:nvSpPr>
+          <p:cNvPr id="12" name="矩形 11"/>
+          <p:cNvSpPr/>
+          <p:nvPr/>
+        </p:nvSpPr>
+        <p:spPr>
+          <a:xfrm>
+            <a:off x="5904230" y="4895702"/>
+            <a:ext cx="1828800" cy="731520"/>
+          </a:xfrm>
+          <a:prstGeom prst="rect">
+            <a:avLst/>
+          </a:prstGeom>
+          <a:noFill/>
+          <a:ln>
+            <a:solidFill>
+              <a:schemeClr val="tx1"/>
+            </a:solidFill>
+          </a:ln>
+        </p:spPr>
+        <p:style>
+          <a:lnRef idx="1">
+            <a:schemeClr val="accent1"/>
+          </a:lnRef>
+          <a:fillRef idx="3">
+            <a:schemeClr val="accent1"/>
+          </a:fillRef>
+          <a:effectRef idx="2">
+            <a:schemeClr val="accent1"/>
+          </a:effectRef>
+          <a:fontRef idx="minor">
+            <a:schemeClr val="lt1"/>
+          </a:fontRef>
+        </p:style>
+        <p:txBody>
+          <a:bodyPr rtlCol="0" anchor="ctr"/>
+          <a:lstStyle/>
+          <a:p>
+            <a:pPr algn="ctr"/>
+            <a:r>
+              <a:rPr kumimoji="1" lang="en-US" altLang="zh-CN" dirty="0" smtClean="0">
+                <a:solidFill>
+                  <a:schemeClr val="tx1"/>
+                </a:solidFill>
+              </a:rPr>
+              <a:t>Get</a:t>
+            </a:r>
+            <a:r>
+              <a:rPr kumimoji="1" lang="zh-CN" altLang="en-US" dirty="0" smtClean="0">
+                <a:solidFill>
+                  <a:schemeClr val="tx1"/>
+                </a:solidFill>
+              </a:rPr>
+              <a:t> </a:t>
+            </a:r>
+            <a:r>
+              <a:rPr kumimoji="1" lang="en-US" altLang="zh-CN" dirty="0" smtClean="0">
+                <a:solidFill>
+                  <a:schemeClr val="tx1"/>
+                </a:solidFill>
+              </a:rPr>
+              <a:t>Payload</a:t>
+            </a:r>
+          </a:p>
+        </p:txBody>
+      </p:sp>
+      <p:sp>
+        <p:nvSpPr>
+          <p:cNvPr id="13" name="矩形 12"/>
+          <p:cNvSpPr/>
+          <p:nvPr/>
+        </p:nvSpPr>
+        <p:spPr>
+          <a:xfrm>
+            <a:off x="3357245" y="3761592"/>
+            <a:ext cx="1828800" cy="731520"/>
+          </a:xfrm>
+          <a:prstGeom prst="rect">
+            <a:avLst/>
+          </a:prstGeom>
+          <a:noFill/>
+          <a:ln>
+            <a:solidFill>
+              <a:schemeClr val="tx1"/>
+            </a:solidFill>
+          </a:ln>
+        </p:spPr>
+        <p:style>
+          <a:lnRef idx="1">
+            <a:schemeClr val="accent1"/>
+          </a:lnRef>
+          <a:fillRef idx="3">
+            <a:schemeClr val="accent1"/>
+          </a:fillRef>
+          <a:effectRef idx="2">
+            <a:schemeClr val="accent1"/>
+          </a:effectRef>
+          <a:fontRef idx="minor">
+            <a:schemeClr val="lt1"/>
+          </a:fontRef>
+        </p:style>
+        <p:txBody>
+          <a:bodyPr rtlCol="0" anchor="ctr"/>
+          <a:lstStyle/>
+          <a:p>
+            <a:pPr algn="ctr"/>
+            <a:r>
+              <a:rPr kumimoji="1" lang="en-US" altLang="zh-CN" dirty="0" smtClean="0">
+                <a:solidFill>
+                  <a:schemeClr val="tx1"/>
+                </a:solidFill>
+              </a:rPr>
+              <a:t>Constellation</a:t>
+            </a:r>
+          </a:p>
+          <a:p>
+            <a:pPr algn="ctr"/>
+            <a:r>
+              <a:rPr kumimoji="1" lang="en-US" altLang="zh-CN" dirty="0" smtClean="0">
+                <a:solidFill>
+                  <a:schemeClr val="tx1"/>
+                </a:solidFill>
+              </a:rPr>
+              <a:t>Decoder</a:t>
+            </a:r>
+          </a:p>
+        </p:txBody>
+      </p:sp>
+      <p:sp>
+        <p:nvSpPr>
+          <p:cNvPr id="14" name="矩形 13"/>
+          <p:cNvSpPr/>
+          <p:nvPr/>
+        </p:nvSpPr>
+        <p:spPr>
+          <a:xfrm>
+            <a:off x="3357245" y="4895702"/>
+            <a:ext cx="1828800" cy="731520"/>
+          </a:xfrm>
+          <a:prstGeom prst="rect">
+            <a:avLst/>
+          </a:prstGeom>
+          <a:noFill/>
+          <a:ln>
+            <a:solidFill>
+              <a:schemeClr val="tx1"/>
+            </a:solidFill>
+          </a:ln>
+        </p:spPr>
+        <p:style>
+          <a:lnRef idx="1">
+            <a:schemeClr val="accent1"/>
+          </a:lnRef>
+          <a:fillRef idx="3">
+            <a:schemeClr val="accent1"/>
+          </a:fillRef>
+          <a:effectRef idx="2">
+            <a:schemeClr val="accent1"/>
+          </a:effectRef>
+          <a:fontRef idx="minor">
+            <a:schemeClr val="lt1"/>
+          </a:fontRef>
+        </p:style>
+        <p:txBody>
+          <a:bodyPr rtlCol="0" anchor="ctr"/>
+          <a:lstStyle/>
+          <a:p>
+            <a:pPr algn="ctr"/>
+            <a:r>
+              <a:rPr kumimoji="1" lang="en-US" altLang="zh-CN" dirty="0" smtClean="0">
+                <a:solidFill>
+                  <a:schemeClr val="tx1"/>
+                </a:solidFill>
+              </a:rPr>
+              <a:t>Constellation</a:t>
+            </a:r>
+          </a:p>
+          <a:p>
+            <a:pPr algn="ctr"/>
+            <a:r>
+              <a:rPr kumimoji="1" lang="en-US" altLang="zh-CN" dirty="0" smtClean="0">
+                <a:solidFill>
+                  <a:schemeClr val="tx1"/>
+                </a:solidFill>
+              </a:rPr>
+              <a:t>Decoder</a:t>
+            </a:r>
+          </a:p>
+        </p:txBody>
+      </p:sp>
+      <p:sp>
+        <p:nvSpPr>
+          <p:cNvPr id="15" name="矩形 14"/>
+          <p:cNvSpPr/>
+          <p:nvPr/>
+        </p:nvSpPr>
+        <p:spPr>
+          <a:xfrm>
+            <a:off x="810260" y="4895702"/>
+            <a:ext cx="1828800" cy="731520"/>
+          </a:xfrm>
+          <a:prstGeom prst="rect">
+            <a:avLst/>
+          </a:prstGeom>
+          <a:noFill/>
+          <a:ln>
+            <a:solidFill>
+              <a:schemeClr val="tx1"/>
+            </a:solidFill>
+          </a:ln>
+        </p:spPr>
+        <p:style>
+          <a:lnRef idx="1">
+            <a:schemeClr val="accent1"/>
+          </a:lnRef>
+          <a:fillRef idx="3">
+            <a:schemeClr val="accent1"/>
+          </a:fillRef>
+          <a:effectRef idx="2">
+            <a:schemeClr val="accent1"/>
+          </a:effectRef>
+          <a:fontRef idx="minor">
+            <a:schemeClr val="lt1"/>
+          </a:fontRef>
+        </p:style>
+        <p:txBody>
+          <a:bodyPr rtlCol="0" anchor="ctr"/>
+          <a:lstStyle/>
+          <a:p>
+            <a:pPr algn="ctr"/>
+            <a:r>
+              <a:rPr kumimoji="1" lang="en-US" altLang="zh-CN" dirty="0" smtClean="0">
+                <a:solidFill>
+                  <a:schemeClr val="tx1"/>
+                </a:solidFill>
+              </a:rPr>
+              <a:t>CRC32</a:t>
+            </a:r>
+          </a:p>
+          <a:p>
+            <a:pPr algn="ctr"/>
+            <a:r>
+              <a:rPr kumimoji="1" lang="en-US" altLang="zh-CN" dirty="0" smtClean="0">
+                <a:solidFill>
+                  <a:schemeClr val="tx1"/>
+                </a:solidFill>
+              </a:rPr>
+              <a:t>Decoder</a:t>
+            </a:r>
+          </a:p>
+        </p:txBody>
+      </p:sp>
+      <p:grpSp>
+        <p:nvGrpSpPr>
+          <p:cNvPr id="21" name="组 20"/>
+          <p:cNvGrpSpPr/>
+          <p:nvPr/>
+        </p:nvGrpSpPr>
+        <p:grpSpPr>
+          <a:xfrm>
+            <a:off x="3556719" y="2203638"/>
+            <a:ext cx="381000" cy="381000"/>
+            <a:chOff x="5238750" y="698500"/>
+            <a:chExt cx="381000" cy="381000"/>
+          </a:xfrm>
+        </p:grpSpPr>
+        <p:sp>
+          <p:nvSpPr>
+            <p:cNvPr id="16" name="椭圆 15"/>
+            <p:cNvSpPr/>
+            <p:nvPr/>
+          </p:nvSpPr>
+          <p:spPr>
+            <a:xfrm>
+              <a:off x="5238750" y="698500"/>
+              <a:ext cx="381000" cy="381000"/>
+            </a:xfrm>
+            <a:prstGeom prst="ellipse">
+              <a:avLst/>
+            </a:prstGeom>
+            <a:noFill/>
+            <a:ln w="38100">
+              <a:solidFill>
+                <a:schemeClr val="tx1"/>
+              </a:solidFill>
+            </a:ln>
+          </p:spPr>
+          <p:style>
+            <a:lnRef idx="1">
+              <a:schemeClr val="accent1"/>
+            </a:lnRef>
+            <a:fillRef idx="3">
+              <a:schemeClr val="accent1"/>
+            </a:fillRef>
+            <a:effectRef idx="2">
+              <a:schemeClr val="accent1"/>
+            </a:effectRef>
+            <a:fontRef idx="minor">
+              <a:schemeClr val="lt1"/>
+            </a:fontRef>
+          </p:style>
+          <p:txBody>
+            <a:bodyPr rtlCol="0" anchor="ctr"/>
+            <a:lstStyle/>
+            <a:p>
+              <a:pPr algn="ctr"/>
+              <a:endParaRPr kumimoji="1" lang="zh-CN" altLang="en-US"/>
+            </a:p>
+          </p:txBody>
+        </p:sp>
+        <p:cxnSp>
+          <p:nvCxnSpPr>
+            <p:cNvPr id="18" name="直线连接符 17"/>
+            <p:cNvCxnSpPr>
+              <a:stCxn id="16" idx="1"/>
+              <a:endCxn id="16" idx="5"/>
+            </p:cNvCxnSpPr>
+            <p:nvPr/>
+          </p:nvCxnSpPr>
+          <p:spPr>
+            <a:xfrm>
+              <a:off x="5294546" y="754296"/>
+              <a:ext cx="269408" cy="269408"/>
+            </a:xfrm>
+            <a:prstGeom prst="line">
+              <a:avLst/>
+            </a:prstGeom>
+            <a:ln w="38100">
+              <a:solidFill>
+                <a:schemeClr val="tx1"/>
+              </a:solidFill>
+            </a:ln>
+          </p:spPr>
+          <p:style>
+            <a:lnRef idx="2">
+              <a:schemeClr val="accent1"/>
+            </a:lnRef>
+            <a:fillRef idx="0">
+              <a:schemeClr val="accent1"/>
+            </a:fillRef>
+            <a:effectRef idx="1">
+              <a:schemeClr val="accent1"/>
+            </a:effectRef>
+            <a:fontRef idx="minor">
+              <a:schemeClr val="tx1"/>
+            </a:fontRef>
+          </p:style>
+        </p:cxnSp>
+        <p:cxnSp>
+          <p:nvCxnSpPr>
+            <p:cNvPr id="20" name="直线连接符 19"/>
+            <p:cNvCxnSpPr>
+              <a:stCxn id="16" idx="7"/>
+              <a:endCxn id="16" idx="3"/>
+            </p:cNvCxnSpPr>
+            <p:nvPr/>
+          </p:nvCxnSpPr>
+          <p:spPr>
+            <a:xfrm flipH="1">
+              <a:off x="5294546" y="754296"/>
+              <a:ext cx="269408" cy="269408"/>
+            </a:xfrm>
+            <a:prstGeom prst="line">
+              <a:avLst/>
+            </a:prstGeom>
+            <a:ln w="38100">
+              <a:solidFill>
+                <a:schemeClr val="tx1"/>
+              </a:solidFill>
+            </a:ln>
+          </p:spPr>
+          <p:style>
+            <a:lnRef idx="2">
+              <a:schemeClr val="accent1"/>
+            </a:lnRef>
+            <a:fillRef idx="0">
+              <a:schemeClr val="accent1"/>
+            </a:fillRef>
+            <a:effectRef idx="1">
+              <a:schemeClr val="accent1"/>
+            </a:effectRef>
+            <a:fontRef idx="minor">
+              <a:schemeClr val="tx1"/>
+            </a:fontRef>
+          </p:style>
+        </p:cxnSp>
+      </p:grpSp>
+      <p:sp>
+        <p:nvSpPr>
+          <p:cNvPr id="25" name="矩形 24"/>
+          <p:cNvSpPr/>
+          <p:nvPr/>
+        </p:nvSpPr>
+        <p:spPr>
+          <a:xfrm>
+            <a:off x="3290019" y="1405332"/>
+            <a:ext cx="914400" cy="365760"/>
+          </a:xfrm>
+          <a:prstGeom prst="rect">
+            <a:avLst/>
+          </a:prstGeom>
+          <a:noFill/>
+          <a:ln>
+            <a:solidFill>
+              <a:schemeClr val="tx1"/>
+            </a:solidFill>
+          </a:ln>
+        </p:spPr>
+        <p:style>
+          <a:lnRef idx="1">
+            <a:schemeClr val="accent1"/>
+          </a:lnRef>
+          <a:fillRef idx="3">
+            <a:schemeClr val="accent1"/>
+          </a:fillRef>
+          <a:effectRef idx="2">
+            <a:schemeClr val="accent1"/>
+          </a:effectRef>
+          <a:fontRef idx="minor">
+            <a:schemeClr val="lt1"/>
+          </a:fontRef>
+        </p:style>
+        <p:txBody>
+          <a:bodyPr rtlCol="0" anchor="ctr"/>
+          <a:lstStyle/>
+          <a:p>
+            <a:pPr algn="ctr"/>
+            <a:r>
+              <a:rPr kumimoji="1" lang="en-US" altLang="zh-CN" dirty="0" smtClean="0">
+                <a:solidFill>
+                  <a:schemeClr val="tx1"/>
+                </a:solidFill>
+              </a:rPr>
+              <a:t>VCO</a:t>
+            </a:r>
+          </a:p>
+        </p:txBody>
+      </p:sp>
+      <p:sp>
+        <p:nvSpPr>
+          <p:cNvPr id="26" name="矩形 25"/>
+          <p:cNvSpPr/>
+          <p:nvPr/>
+        </p:nvSpPr>
+        <p:spPr>
+          <a:xfrm>
+            <a:off x="4470400" y="1405332"/>
+            <a:ext cx="914400" cy="365760"/>
+          </a:xfrm>
+          <a:prstGeom prst="rect">
+            <a:avLst/>
+          </a:prstGeom>
+          <a:noFill/>
+          <a:ln>
+            <a:solidFill>
+              <a:schemeClr val="tx1"/>
+            </a:solidFill>
+          </a:ln>
+        </p:spPr>
+        <p:style>
+          <a:lnRef idx="1">
+            <a:schemeClr val="accent1"/>
+          </a:lnRef>
+          <a:fillRef idx="3">
+            <a:schemeClr val="accent1"/>
+          </a:fillRef>
+          <a:effectRef idx="2">
+            <a:schemeClr val="accent1"/>
+          </a:effectRef>
+          <a:fontRef idx="minor">
+            <a:schemeClr val="lt1"/>
+          </a:fontRef>
+        </p:style>
+        <p:txBody>
+          <a:bodyPr rtlCol="0" anchor="ctr"/>
+          <a:lstStyle/>
+          <a:p>
+            <a:pPr algn="ctr"/>
+            <a:r>
+              <a:rPr kumimoji="1" lang="en-US" altLang="zh-CN" dirty="0" smtClean="0">
+                <a:solidFill>
+                  <a:schemeClr val="tx1"/>
+                </a:solidFill>
+              </a:rPr>
+              <a:t>×(-1)</a:t>
+            </a:r>
+          </a:p>
+        </p:txBody>
+      </p:sp>
+      <p:sp>
+        <p:nvSpPr>
+          <p:cNvPr id="27" name="矩形 26"/>
+          <p:cNvSpPr/>
+          <p:nvPr/>
+        </p:nvSpPr>
+        <p:spPr>
+          <a:xfrm>
+            <a:off x="7516411" y="1544041"/>
+            <a:ext cx="1828800" cy="731520"/>
+          </a:xfrm>
+          <a:prstGeom prst="rect">
+            <a:avLst/>
+          </a:prstGeom>
+          <a:noFill/>
+          <a:ln>
+            <a:solidFill>
+              <a:schemeClr val="tx1"/>
+            </a:solidFill>
+          </a:ln>
+        </p:spPr>
+        <p:style>
+          <a:lnRef idx="1">
+            <a:schemeClr val="accent1"/>
+          </a:lnRef>
+          <a:fillRef idx="3">
+            <a:schemeClr val="accent1"/>
+          </a:fillRef>
+          <a:effectRef idx="2">
+            <a:schemeClr val="accent1"/>
+          </a:effectRef>
+          <a:fontRef idx="minor">
+            <a:schemeClr val="lt1"/>
+          </a:fontRef>
+        </p:style>
+        <p:txBody>
+          <a:bodyPr rtlCol="0" anchor="ctr"/>
+          <a:lstStyle/>
+          <a:p>
+            <a:pPr algn="ctr"/>
+            <a:r>
+              <a:rPr kumimoji="1" lang="en-US" altLang="zh-CN" dirty="0" smtClean="0">
+                <a:solidFill>
+                  <a:schemeClr val="tx1"/>
+                </a:solidFill>
+              </a:rPr>
+              <a:t>Decimator</a:t>
+            </a:r>
+            <a:endParaRPr kumimoji="1" lang="en-US" altLang="zh-CN" dirty="0">
+              <a:solidFill>
+                <a:schemeClr val="tx1"/>
+              </a:solidFill>
+            </a:endParaRPr>
+          </a:p>
+          <a:p>
+            <a:pPr algn="ctr"/>
+            <a:r>
+              <a:rPr kumimoji="1" lang="en-US" altLang="zh-CN" dirty="0" smtClean="0">
+                <a:solidFill>
+                  <a:schemeClr val="tx1"/>
+                </a:solidFill>
+              </a:rPr>
+              <a:t>for</a:t>
+            </a:r>
+            <a:r>
+              <a:rPr kumimoji="1" lang="zh-CN" altLang="en-US" dirty="0" smtClean="0">
+                <a:solidFill>
+                  <a:schemeClr val="tx1"/>
+                </a:solidFill>
+              </a:rPr>
+              <a:t> </a:t>
+            </a:r>
+            <a:r>
+              <a:rPr kumimoji="1" lang="en-US" altLang="zh-CN" dirty="0" smtClean="0">
+                <a:solidFill>
+                  <a:schemeClr val="tx1"/>
+                </a:solidFill>
+              </a:rPr>
+              <a:t>training</a:t>
+            </a:r>
+            <a:r>
+              <a:rPr kumimoji="1" lang="zh-CN" altLang="en-US" dirty="0" smtClean="0">
+                <a:solidFill>
+                  <a:schemeClr val="tx1"/>
+                </a:solidFill>
+              </a:rPr>
+              <a:t> </a:t>
+            </a:r>
+            <a:r>
+              <a:rPr kumimoji="1" lang="en-US" altLang="zh-CN" dirty="0" err="1" smtClean="0">
+                <a:solidFill>
+                  <a:schemeClr val="tx1"/>
+                </a:solidFill>
+              </a:rPr>
+              <a:t>seq</a:t>
+            </a:r>
+            <a:endParaRPr kumimoji="1" lang="en-US" altLang="zh-CN" dirty="0" smtClean="0">
+              <a:solidFill>
+                <a:schemeClr val="tx1"/>
+              </a:solidFill>
+            </a:endParaRPr>
+          </a:p>
+        </p:txBody>
+      </p:sp>
+      <p:sp>
+        <p:nvSpPr>
+          <p:cNvPr id="28" name="矩形 27"/>
+          <p:cNvSpPr/>
+          <p:nvPr/>
+        </p:nvSpPr>
+        <p:spPr>
+          <a:xfrm>
+            <a:off x="810260" y="3761592"/>
+            <a:ext cx="1828800" cy="731520"/>
+          </a:xfrm>
+          <a:prstGeom prst="rect">
+            <a:avLst/>
+          </a:prstGeom>
+          <a:noFill/>
+          <a:ln>
+            <a:solidFill>
+              <a:schemeClr val="tx1"/>
+            </a:solidFill>
+          </a:ln>
+        </p:spPr>
+        <p:style>
+          <a:lnRef idx="1">
+            <a:schemeClr val="accent1"/>
+          </a:lnRef>
+          <a:fillRef idx="3">
+            <a:schemeClr val="accent1"/>
+          </a:fillRef>
+          <a:effectRef idx="2">
+            <a:schemeClr val="accent1"/>
+          </a:effectRef>
+          <a:fontRef idx="minor">
+            <a:schemeClr val="lt1"/>
+          </a:fontRef>
+        </p:style>
+        <p:txBody>
+          <a:bodyPr rtlCol="0" anchor="ctr"/>
+          <a:lstStyle/>
+          <a:p>
+            <a:pPr algn="ctr"/>
+            <a:r>
+              <a:rPr kumimoji="1" lang="en-US" altLang="zh-CN" dirty="0" smtClean="0">
+                <a:solidFill>
+                  <a:schemeClr val="tx1"/>
+                </a:solidFill>
+              </a:rPr>
+              <a:t>Header</a:t>
+            </a:r>
+            <a:r>
+              <a:rPr kumimoji="1" lang="zh-CN" altLang="en-US" dirty="0" smtClean="0">
+                <a:solidFill>
+                  <a:schemeClr val="tx1"/>
+                </a:solidFill>
+              </a:rPr>
+              <a:t> </a:t>
+            </a:r>
+            <a:r>
+              <a:rPr kumimoji="1" lang="en-US" altLang="zh-CN" dirty="0" smtClean="0">
+                <a:solidFill>
+                  <a:schemeClr val="tx1"/>
+                </a:solidFill>
+              </a:rPr>
+              <a:t>Parser</a:t>
+            </a:r>
+          </a:p>
+        </p:txBody>
+      </p:sp>
+      <p:sp>
+        <p:nvSpPr>
+          <p:cNvPr id="29" name="矩形 28"/>
+          <p:cNvSpPr/>
+          <p:nvPr/>
+        </p:nvSpPr>
+        <p:spPr>
+          <a:xfrm>
+            <a:off x="-1736725" y="4895702"/>
+            <a:ext cx="1828800" cy="731520"/>
+          </a:xfrm>
+          <a:prstGeom prst="rect">
+            <a:avLst/>
+          </a:prstGeom>
+          <a:noFill/>
+          <a:ln>
+            <a:solidFill>
+              <a:schemeClr val="tx1"/>
+            </a:solidFill>
+          </a:ln>
+        </p:spPr>
+        <p:style>
+          <a:lnRef idx="1">
+            <a:schemeClr val="accent1"/>
+          </a:lnRef>
+          <a:fillRef idx="3">
+            <a:schemeClr val="accent1"/>
+          </a:fillRef>
+          <a:effectRef idx="2">
+            <a:schemeClr val="accent1"/>
+          </a:effectRef>
+          <a:fontRef idx="minor">
+            <a:schemeClr val="lt1"/>
+          </a:fontRef>
+        </p:style>
+        <p:txBody>
+          <a:bodyPr rtlCol="0" anchor="ctr"/>
+          <a:lstStyle/>
+          <a:p>
+            <a:pPr algn="ctr"/>
+            <a:r>
+              <a:rPr kumimoji="1" lang="en-US" altLang="zh-CN" dirty="0" smtClean="0">
+                <a:solidFill>
+                  <a:schemeClr val="tx1"/>
+                </a:solidFill>
+              </a:rPr>
+              <a:t>Payload</a:t>
+            </a:r>
+          </a:p>
+        </p:txBody>
+      </p:sp>
+      <p:sp>
+        <p:nvSpPr>
+          <p:cNvPr id="30" name="矩形 29"/>
+          <p:cNvSpPr/>
+          <p:nvPr/>
+        </p:nvSpPr>
+        <p:spPr>
+          <a:xfrm>
+            <a:off x="-1736725" y="3761592"/>
+            <a:ext cx="1828800" cy="731520"/>
+          </a:xfrm>
+          <a:prstGeom prst="rect">
+            <a:avLst/>
+          </a:prstGeom>
+          <a:noFill/>
+          <a:ln>
+            <a:solidFill>
+              <a:schemeClr val="tx1"/>
+            </a:solidFill>
+          </a:ln>
+        </p:spPr>
+        <p:style>
+          <a:lnRef idx="1">
+            <a:schemeClr val="accent1"/>
+          </a:lnRef>
+          <a:fillRef idx="3">
+            <a:schemeClr val="accent1"/>
+          </a:fillRef>
+          <a:effectRef idx="2">
+            <a:schemeClr val="accent1"/>
+          </a:effectRef>
+          <a:fontRef idx="minor">
+            <a:schemeClr val="lt1"/>
+          </a:fontRef>
+        </p:style>
+        <p:txBody>
+          <a:bodyPr rtlCol="0" anchor="ctr"/>
+          <a:lstStyle/>
+          <a:p>
+            <a:pPr algn="ctr"/>
+            <a:r>
+              <a:rPr kumimoji="1" lang="en-US" altLang="zh-CN" dirty="0" smtClean="0">
+                <a:solidFill>
+                  <a:schemeClr val="tx1"/>
+                </a:solidFill>
+              </a:rPr>
+              <a:t>Packet</a:t>
+            </a:r>
+            <a:r>
+              <a:rPr kumimoji="1" lang="zh-CN" altLang="en-US" dirty="0" smtClean="0">
+                <a:solidFill>
+                  <a:schemeClr val="tx1"/>
+                </a:solidFill>
+              </a:rPr>
+              <a:t> </a:t>
+            </a:r>
+            <a:r>
+              <a:rPr kumimoji="1" lang="en-US" altLang="zh-CN" dirty="0" smtClean="0">
+                <a:solidFill>
+                  <a:schemeClr val="tx1"/>
+                </a:solidFill>
+              </a:rPr>
+              <a:t>Info</a:t>
+            </a:r>
+          </a:p>
+        </p:txBody>
+      </p:sp>
+      <p:cxnSp>
+        <p:nvCxnSpPr>
+          <p:cNvPr id="32" name="直线箭头连接符 31"/>
+          <p:cNvCxnSpPr>
+            <a:stCxn id="4" idx="3"/>
+            <a:endCxn id="5" idx="1"/>
+          </p:cNvCxnSpPr>
+          <p:nvPr/>
+        </p:nvCxnSpPr>
+        <p:spPr>
+          <a:xfrm>
+            <a:off x="92075" y="1504390"/>
+            <a:ext cx="718185" cy="0"/>
+          </a:xfrm>
+          <a:prstGeom prst="straightConnector1">
+            <a:avLst/>
+          </a:prstGeom>
+          <a:ln>
+            <a:solidFill>
+              <a:schemeClr val="tx1"/>
+            </a:solidFill>
+            <a:tailEnd type="arrow"/>
+          </a:ln>
+        </p:spPr>
+        <p:style>
+          <a:lnRef idx="2">
+            <a:schemeClr val="accent1"/>
+          </a:lnRef>
+          <a:fillRef idx="0">
+            <a:schemeClr val="accent1"/>
+          </a:fillRef>
+          <a:effectRef idx="1">
+            <a:schemeClr val="accent1"/>
+          </a:effectRef>
+          <a:fontRef idx="minor">
+            <a:schemeClr val="tx1"/>
+          </a:fontRef>
+        </p:style>
+      </p:cxnSp>
+      <p:cxnSp>
+        <p:nvCxnSpPr>
+          <p:cNvPr id="34" name="肘形连接符 33"/>
+          <p:cNvCxnSpPr>
+            <a:stCxn id="5" idx="3"/>
+            <a:endCxn id="6" idx="1"/>
+          </p:cNvCxnSpPr>
+          <p:nvPr/>
+        </p:nvCxnSpPr>
+        <p:spPr>
+          <a:xfrm flipV="1">
+            <a:off x="2639060" y="715233"/>
+            <a:ext cx="917659" cy="789157"/>
+          </a:xfrm>
+          <a:prstGeom prst="bentConnector3">
+            <a:avLst/>
+          </a:prstGeom>
+          <a:ln>
+            <a:solidFill>
+              <a:schemeClr val="tx1"/>
+            </a:solidFill>
+            <a:tailEnd type="arrow"/>
+          </a:ln>
+        </p:spPr>
+        <p:style>
+          <a:lnRef idx="2">
+            <a:schemeClr val="accent1"/>
+          </a:lnRef>
+          <a:fillRef idx="0">
+            <a:schemeClr val="accent1"/>
+          </a:fillRef>
+          <a:effectRef idx="1">
+            <a:schemeClr val="accent1"/>
+          </a:effectRef>
+          <a:fontRef idx="minor">
+            <a:schemeClr val="tx1"/>
+          </a:fontRef>
+        </p:style>
+      </p:cxnSp>
+      <p:cxnSp>
+        <p:nvCxnSpPr>
+          <p:cNvPr id="36" name="肘形连接符 35"/>
+          <p:cNvCxnSpPr>
+            <a:stCxn id="5" idx="3"/>
+            <a:endCxn id="16" idx="2"/>
+          </p:cNvCxnSpPr>
+          <p:nvPr/>
+        </p:nvCxnSpPr>
+        <p:spPr>
+          <a:xfrm>
+            <a:off x="2639060" y="1504390"/>
+            <a:ext cx="917659" cy="889748"/>
+          </a:xfrm>
+          <a:prstGeom prst="bentConnector3">
+            <a:avLst/>
+          </a:prstGeom>
+          <a:ln>
+            <a:solidFill>
+              <a:schemeClr val="tx1"/>
+            </a:solidFill>
+            <a:tailEnd type="arrow"/>
+          </a:ln>
+        </p:spPr>
+        <p:style>
+          <a:lnRef idx="2">
+            <a:schemeClr val="accent1"/>
+          </a:lnRef>
+          <a:fillRef idx="0">
+            <a:schemeClr val="accent1"/>
+          </a:fillRef>
+          <a:effectRef idx="1">
+            <a:schemeClr val="accent1"/>
+          </a:effectRef>
+          <a:fontRef idx="minor">
+            <a:schemeClr val="tx1"/>
+          </a:fontRef>
+        </p:style>
+      </p:cxnSp>
+      <p:cxnSp>
+        <p:nvCxnSpPr>
+          <p:cNvPr id="40" name="肘形连接符 39"/>
+          <p:cNvCxnSpPr>
+            <a:stCxn id="6" idx="2"/>
+            <a:endCxn id="26" idx="0"/>
+          </p:cNvCxnSpPr>
+          <p:nvPr/>
+        </p:nvCxnSpPr>
+        <p:spPr>
+          <a:xfrm rot="16200000" flipH="1">
+            <a:off x="4537190" y="1014921"/>
+            <a:ext cx="324339" cy="456481"/>
+          </a:xfrm>
+          <a:prstGeom prst="bentConnector3">
+            <a:avLst/>
+          </a:prstGeom>
+          <a:ln>
+            <a:solidFill>
+              <a:schemeClr val="tx1"/>
+            </a:solidFill>
+            <a:tailEnd type="arrow"/>
+          </a:ln>
+        </p:spPr>
+        <p:style>
+          <a:lnRef idx="2">
+            <a:schemeClr val="accent1"/>
+          </a:lnRef>
+          <a:fillRef idx="0">
+            <a:schemeClr val="accent1"/>
+          </a:fillRef>
+          <a:effectRef idx="1">
+            <a:schemeClr val="accent1"/>
+          </a:effectRef>
+          <a:fontRef idx="minor">
+            <a:schemeClr val="tx1"/>
+          </a:fontRef>
+        </p:style>
+      </p:cxnSp>
+      <p:cxnSp>
+        <p:nvCxnSpPr>
+          <p:cNvPr id="42" name="肘形连接符 41"/>
+          <p:cNvCxnSpPr>
+            <a:stCxn id="6" idx="3"/>
+            <a:endCxn id="8" idx="0"/>
+          </p:cNvCxnSpPr>
+          <p:nvPr/>
+        </p:nvCxnSpPr>
+        <p:spPr>
+          <a:xfrm>
+            <a:off x="5385519" y="715233"/>
+            <a:ext cx="639361" cy="1313145"/>
+          </a:xfrm>
+          <a:prstGeom prst="bentConnector2">
+            <a:avLst/>
+          </a:prstGeom>
+          <a:ln>
+            <a:solidFill>
+              <a:schemeClr val="tx1"/>
+            </a:solidFill>
+            <a:tailEnd type="arrow"/>
+          </a:ln>
+        </p:spPr>
+        <p:style>
+          <a:lnRef idx="2">
+            <a:schemeClr val="accent1"/>
+          </a:lnRef>
+          <a:fillRef idx="0">
+            <a:schemeClr val="accent1"/>
+          </a:fillRef>
+          <a:effectRef idx="1">
+            <a:schemeClr val="accent1"/>
+          </a:effectRef>
+          <a:fontRef idx="minor">
+            <a:schemeClr val="tx1"/>
+          </a:fontRef>
+        </p:style>
+      </p:cxnSp>
+      <p:cxnSp>
+        <p:nvCxnSpPr>
+          <p:cNvPr id="45" name="直线箭头连接符 44"/>
+          <p:cNvCxnSpPr>
+            <a:stCxn id="16" idx="6"/>
+            <a:endCxn id="8" idx="1"/>
+          </p:cNvCxnSpPr>
+          <p:nvPr/>
+        </p:nvCxnSpPr>
+        <p:spPr>
+          <a:xfrm>
+            <a:off x="3937719" y="2394138"/>
+            <a:ext cx="1172761" cy="0"/>
+          </a:xfrm>
+          <a:prstGeom prst="straightConnector1">
+            <a:avLst/>
+          </a:prstGeom>
+          <a:ln>
+            <a:solidFill>
+              <a:schemeClr val="tx1"/>
+            </a:solidFill>
+            <a:tailEnd type="arrow"/>
+          </a:ln>
+        </p:spPr>
+        <p:style>
+          <a:lnRef idx="2">
+            <a:schemeClr val="accent1"/>
+          </a:lnRef>
+          <a:fillRef idx="0">
+            <a:schemeClr val="accent1"/>
+          </a:fillRef>
+          <a:effectRef idx="1">
+            <a:schemeClr val="accent1"/>
+          </a:effectRef>
+          <a:fontRef idx="minor">
+            <a:schemeClr val="tx1"/>
+          </a:fontRef>
+        </p:style>
+      </p:cxnSp>
+      <p:cxnSp>
+        <p:nvCxnSpPr>
+          <p:cNvPr id="49" name="直线箭头连接符 48"/>
+          <p:cNvCxnSpPr>
+            <a:stCxn id="26" idx="1"/>
+            <a:endCxn id="25" idx="3"/>
+          </p:cNvCxnSpPr>
+          <p:nvPr/>
+        </p:nvCxnSpPr>
+        <p:spPr>
+          <a:xfrm flipH="1">
+            <a:off x="4204419" y="1588212"/>
+            <a:ext cx="265981" cy="0"/>
+          </a:xfrm>
+          <a:prstGeom prst="straightConnector1">
+            <a:avLst/>
+          </a:prstGeom>
+          <a:ln>
+            <a:solidFill>
+              <a:schemeClr val="tx1"/>
+            </a:solidFill>
+            <a:tailEnd type="arrow"/>
+          </a:ln>
+        </p:spPr>
+        <p:style>
+          <a:lnRef idx="2">
+            <a:schemeClr val="accent1"/>
+          </a:lnRef>
+          <a:fillRef idx="0">
+            <a:schemeClr val="accent1"/>
+          </a:fillRef>
+          <a:effectRef idx="1">
+            <a:schemeClr val="accent1"/>
+          </a:effectRef>
+          <a:fontRef idx="minor">
+            <a:schemeClr val="tx1"/>
+          </a:fontRef>
+        </p:style>
+      </p:cxnSp>
+      <p:cxnSp>
+        <p:nvCxnSpPr>
+          <p:cNvPr id="53" name="直线箭头连接符 52"/>
+          <p:cNvCxnSpPr>
+            <a:stCxn id="25" idx="2"/>
+            <a:endCxn id="16" idx="0"/>
+          </p:cNvCxnSpPr>
+          <p:nvPr/>
+        </p:nvCxnSpPr>
+        <p:spPr>
+          <a:xfrm>
+            <a:off x="3747219" y="1771092"/>
+            <a:ext cx="0" cy="432546"/>
+          </a:xfrm>
+          <a:prstGeom prst="straightConnector1">
+            <a:avLst/>
+          </a:prstGeom>
+          <a:ln>
+            <a:solidFill>
+              <a:schemeClr val="tx1"/>
+            </a:solidFill>
+            <a:tailEnd type="arrow"/>
+          </a:ln>
+        </p:spPr>
+        <p:style>
+          <a:lnRef idx="2">
+            <a:schemeClr val="accent1"/>
+          </a:lnRef>
+          <a:fillRef idx="0">
+            <a:schemeClr val="accent1"/>
+          </a:fillRef>
+          <a:effectRef idx="1">
+            <a:schemeClr val="accent1"/>
+          </a:effectRef>
+          <a:fontRef idx="minor">
+            <a:schemeClr val="tx1"/>
+          </a:fontRef>
+        </p:style>
+      </p:cxnSp>
+      <p:cxnSp>
+        <p:nvCxnSpPr>
+          <p:cNvPr id="68" name="肘形连接符 67"/>
+          <p:cNvCxnSpPr>
+            <a:stCxn id="8" idx="3"/>
+            <a:endCxn id="27" idx="1"/>
+          </p:cNvCxnSpPr>
+          <p:nvPr/>
+        </p:nvCxnSpPr>
+        <p:spPr>
+          <a:xfrm flipV="1">
+            <a:off x="6939280" y="1909801"/>
+            <a:ext cx="577131" cy="484337"/>
+          </a:xfrm>
+          <a:prstGeom prst="bentConnector3">
+            <a:avLst/>
+          </a:prstGeom>
+          <a:ln>
+            <a:solidFill>
+              <a:schemeClr val="tx1"/>
+            </a:solidFill>
+            <a:tailEnd type="arrow"/>
+          </a:ln>
+        </p:spPr>
+        <p:style>
+          <a:lnRef idx="2">
+            <a:schemeClr val="accent1"/>
+          </a:lnRef>
+          <a:fillRef idx="0">
+            <a:schemeClr val="accent1"/>
+          </a:fillRef>
+          <a:effectRef idx="1">
+            <a:schemeClr val="accent1"/>
+          </a:effectRef>
+          <a:fontRef idx="minor">
+            <a:schemeClr val="tx1"/>
+          </a:fontRef>
+        </p:style>
+      </p:cxnSp>
+      <p:cxnSp>
+        <p:nvCxnSpPr>
+          <p:cNvPr id="70" name="肘形连接符 69"/>
+          <p:cNvCxnSpPr>
+            <a:stCxn id="8" idx="3"/>
+            <a:endCxn id="10" idx="1"/>
+          </p:cNvCxnSpPr>
+          <p:nvPr/>
+        </p:nvCxnSpPr>
+        <p:spPr>
+          <a:xfrm>
+            <a:off x="6939280" y="2394138"/>
+            <a:ext cx="577131" cy="556260"/>
+          </a:xfrm>
+          <a:prstGeom prst="bentConnector3">
+            <a:avLst>
+              <a:gd name="adj1" fmla="val 50000"/>
+            </a:avLst>
+          </a:prstGeom>
+          <a:ln>
+            <a:solidFill>
+              <a:schemeClr val="tx1"/>
+            </a:solidFill>
+            <a:tailEnd type="arrow"/>
+          </a:ln>
+        </p:spPr>
+        <p:style>
+          <a:lnRef idx="2">
+            <a:schemeClr val="accent1"/>
+          </a:lnRef>
+          <a:fillRef idx="0">
+            <a:schemeClr val="accent1"/>
+          </a:fillRef>
+          <a:effectRef idx="1">
+            <a:schemeClr val="accent1"/>
+          </a:effectRef>
+          <a:fontRef idx="minor">
+            <a:schemeClr val="tx1"/>
+          </a:fontRef>
+        </p:style>
+      </p:cxnSp>
+      <p:cxnSp>
+        <p:nvCxnSpPr>
+          <p:cNvPr id="77" name="直线箭头连接符 76"/>
+          <p:cNvCxnSpPr>
+            <a:stCxn id="27" idx="0"/>
+            <a:endCxn id="9" idx="2"/>
+          </p:cNvCxnSpPr>
+          <p:nvPr/>
+        </p:nvCxnSpPr>
+        <p:spPr>
+          <a:xfrm flipV="1">
+            <a:off x="8430811" y="1138630"/>
+            <a:ext cx="0" cy="405411"/>
+          </a:xfrm>
+          <a:prstGeom prst="straightConnector1">
+            <a:avLst/>
+          </a:prstGeom>
+          <a:ln>
+            <a:solidFill>
+              <a:schemeClr val="tx1"/>
+            </a:solidFill>
+            <a:tailEnd type="arrow"/>
+          </a:ln>
+        </p:spPr>
+        <p:style>
+          <a:lnRef idx="2">
+            <a:schemeClr val="accent1"/>
+          </a:lnRef>
+          <a:fillRef idx="0">
+            <a:schemeClr val="accent1"/>
+          </a:fillRef>
+          <a:effectRef idx="1">
+            <a:schemeClr val="accent1"/>
+          </a:effectRef>
+          <a:fontRef idx="minor">
+            <a:schemeClr val="tx1"/>
+          </a:fontRef>
+        </p:style>
+      </p:cxnSp>
+      <p:cxnSp>
+        <p:nvCxnSpPr>
+          <p:cNvPr id="79" name="直线箭头连接符 78"/>
+          <p:cNvCxnSpPr>
+            <a:stCxn id="11" idx="1"/>
+            <a:endCxn id="13" idx="3"/>
+          </p:cNvCxnSpPr>
+          <p:nvPr/>
+        </p:nvCxnSpPr>
+        <p:spPr>
+          <a:xfrm flipH="1">
+            <a:off x="5186045" y="4127352"/>
+            <a:ext cx="718185" cy="0"/>
+          </a:xfrm>
+          <a:prstGeom prst="straightConnector1">
+            <a:avLst/>
+          </a:prstGeom>
+          <a:ln>
+            <a:solidFill>
+              <a:schemeClr val="tx1"/>
+            </a:solidFill>
+            <a:tailEnd type="arrow"/>
+          </a:ln>
+        </p:spPr>
+        <p:style>
+          <a:lnRef idx="2">
+            <a:schemeClr val="accent1"/>
+          </a:lnRef>
+          <a:fillRef idx="0">
+            <a:schemeClr val="accent1"/>
+          </a:fillRef>
+          <a:effectRef idx="1">
+            <a:schemeClr val="accent1"/>
+          </a:effectRef>
+          <a:fontRef idx="minor">
+            <a:schemeClr val="tx1"/>
+          </a:fontRef>
+        </p:style>
+      </p:cxnSp>
+      <p:cxnSp>
+        <p:nvCxnSpPr>
+          <p:cNvPr id="81" name="直线箭头连接符 80"/>
+          <p:cNvCxnSpPr>
+            <a:stCxn id="13" idx="1"/>
+            <a:endCxn id="28" idx="3"/>
+          </p:cNvCxnSpPr>
+          <p:nvPr/>
+        </p:nvCxnSpPr>
+        <p:spPr>
+          <a:xfrm flipH="1">
+            <a:off x="2639060" y="4127352"/>
+            <a:ext cx="718185" cy="0"/>
+          </a:xfrm>
+          <a:prstGeom prst="straightConnector1">
+            <a:avLst/>
+          </a:prstGeom>
+          <a:ln>
+            <a:solidFill>
+              <a:schemeClr val="tx1"/>
+            </a:solidFill>
+            <a:tailEnd type="arrow"/>
+          </a:ln>
+        </p:spPr>
+        <p:style>
+          <a:lnRef idx="2">
+            <a:schemeClr val="accent1"/>
+          </a:lnRef>
+          <a:fillRef idx="0">
+            <a:schemeClr val="accent1"/>
+          </a:fillRef>
+          <a:effectRef idx="1">
+            <a:schemeClr val="accent1"/>
+          </a:effectRef>
+          <a:fontRef idx="minor">
+            <a:schemeClr val="tx1"/>
+          </a:fontRef>
+        </p:style>
+      </p:cxnSp>
+      <p:cxnSp>
+        <p:nvCxnSpPr>
+          <p:cNvPr id="83" name="直线箭头连接符 82"/>
+          <p:cNvCxnSpPr>
+            <a:stCxn id="28" idx="1"/>
+            <a:endCxn id="30" idx="3"/>
+          </p:cNvCxnSpPr>
+          <p:nvPr/>
+        </p:nvCxnSpPr>
+        <p:spPr>
+          <a:xfrm flipH="1">
+            <a:off x="92075" y="4127352"/>
+            <a:ext cx="718185" cy="0"/>
+          </a:xfrm>
+          <a:prstGeom prst="straightConnector1">
+            <a:avLst/>
+          </a:prstGeom>
+          <a:ln>
+            <a:solidFill>
+              <a:schemeClr val="tx1"/>
+            </a:solidFill>
+            <a:tailEnd type="arrow"/>
+          </a:ln>
+        </p:spPr>
+        <p:style>
+          <a:lnRef idx="2">
+            <a:schemeClr val="accent1"/>
+          </a:lnRef>
+          <a:fillRef idx="0">
+            <a:schemeClr val="accent1"/>
+          </a:fillRef>
+          <a:effectRef idx="1">
+            <a:schemeClr val="accent1"/>
+          </a:effectRef>
+          <a:fontRef idx="minor">
+            <a:schemeClr val="tx1"/>
+          </a:fontRef>
+        </p:style>
+      </p:cxnSp>
+      <p:cxnSp>
+        <p:nvCxnSpPr>
+          <p:cNvPr id="85" name="直线箭头连接符 84"/>
+          <p:cNvCxnSpPr>
+            <a:stCxn id="12" idx="1"/>
+            <a:endCxn id="14" idx="3"/>
+          </p:cNvCxnSpPr>
+          <p:nvPr/>
+        </p:nvCxnSpPr>
+        <p:spPr>
+          <a:xfrm flipH="1">
+            <a:off x="5186045" y="5261462"/>
+            <a:ext cx="718185" cy="0"/>
+          </a:xfrm>
+          <a:prstGeom prst="straightConnector1">
+            <a:avLst/>
+          </a:prstGeom>
+          <a:ln>
+            <a:solidFill>
+              <a:schemeClr val="tx1"/>
+            </a:solidFill>
+            <a:tailEnd type="arrow"/>
+          </a:ln>
+        </p:spPr>
+        <p:style>
+          <a:lnRef idx="2">
+            <a:schemeClr val="accent1"/>
+          </a:lnRef>
+          <a:fillRef idx="0">
+            <a:schemeClr val="accent1"/>
+          </a:fillRef>
+          <a:effectRef idx="1">
+            <a:schemeClr val="accent1"/>
+          </a:effectRef>
+          <a:fontRef idx="minor">
+            <a:schemeClr val="tx1"/>
+          </a:fontRef>
+        </p:style>
+      </p:cxnSp>
+      <p:cxnSp>
+        <p:nvCxnSpPr>
+          <p:cNvPr id="87" name="直线箭头连接符 86"/>
+          <p:cNvCxnSpPr>
+            <a:stCxn id="14" idx="1"/>
+            <a:endCxn id="15" idx="3"/>
+          </p:cNvCxnSpPr>
+          <p:nvPr/>
+        </p:nvCxnSpPr>
+        <p:spPr>
+          <a:xfrm flipH="1">
+            <a:off x="2639060" y="5261462"/>
+            <a:ext cx="718185" cy="0"/>
+          </a:xfrm>
+          <a:prstGeom prst="straightConnector1">
+            <a:avLst/>
+          </a:prstGeom>
+          <a:ln>
+            <a:solidFill>
+              <a:schemeClr val="tx1"/>
+            </a:solidFill>
+            <a:tailEnd type="arrow"/>
+          </a:ln>
+        </p:spPr>
+        <p:style>
+          <a:lnRef idx="2">
+            <a:schemeClr val="accent1"/>
+          </a:lnRef>
+          <a:fillRef idx="0">
+            <a:schemeClr val="accent1"/>
+          </a:fillRef>
+          <a:effectRef idx="1">
+            <a:schemeClr val="accent1"/>
+          </a:effectRef>
+          <a:fontRef idx="minor">
+            <a:schemeClr val="tx1"/>
+          </a:fontRef>
+        </p:style>
+      </p:cxnSp>
+      <p:cxnSp>
+        <p:nvCxnSpPr>
+          <p:cNvPr id="89" name="直线箭头连接符 88"/>
+          <p:cNvCxnSpPr>
+            <a:stCxn id="15" idx="1"/>
+            <a:endCxn id="29" idx="3"/>
+          </p:cNvCxnSpPr>
+          <p:nvPr/>
+        </p:nvCxnSpPr>
+        <p:spPr>
+          <a:xfrm flipH="1">
+            <a:off x="92075" y="5261462"/>
+            <a:ext cx="718185" cy="0"/>
+          </a:xfrm>
+          <a:prstGeom prst="straightConnector1">
+            <a:avLst/>
+          </a:prstGeom>
+          <a:ln>
+            <a:solidFill>
+              <a:schemeClr val="tx1"/>
+            </a:solidFill>
+            <a:tailEnd type="arrow"/>
+          </a:ln>
+        </p:spPr>
+        <p:style>
+          <a:lnRef idx="2">
+            <a:schemeClr val="accent1"/>
+          </a:lnRef>
+          <a:fillRef idx="0">
+            <a:schemeClr val="accent1"/>
+          </a:fillRef>
+          <a:effectRef idx="1">
+            <a:schemeClr val="accent1"/>
+          </a:effectRef>
+          <a:fontRef idx="minor">
+            <a:schemeClr val="tx1"/>
+          </a:fontRef>
+        </p:style>
+      </p:cxnSp>
+      <p:cxnSp>
+        <p:nvCxnSpPr>
+          <p:cNvPr id="91" name="肘形连接符 90"/>
+          <p:cNvCxnSpPr>
+            <a:stCxn id="10" idx="2"/>
+            <a:endCxn id="11" idx="3"/>
+          </p:cNvCxnSpPr>
+          <p:nvPr/>
+        </p:nvCxnSpPr>
+        <p:spPr>
+          <a:xfrm rot="5400000">
+            <a:off x="7676324" y="3372865"/>
+            <a:ext cx="811194" cy="697781"/>
+          </a:xfrm>
+          <a:prstGeom prst="bentConnector2">
+            <a:avLst/>
+          </a:prstGeom>
+          <a:ln>
+            <a:solidFill>
+              <a:schemeClr val="tx1"/>
+            </a:solidFill>
+            <a:tailEnd type="arrow"/>
+          </a:ln>
+        </p:spPr>
+        <p:style>
+          <a:lnRef idx="2">
+            <a:schemeClr val="accent1"/>
+          </a:lnRef>
+          <a:fillRef idx="0">
+            <a:schemeClr val="accent1"/>
+          </a:fillRef>
+          <a:effectRef idx="1">
+            <a:schemeClr val="accent1"/>
+          </a:effectRef>
+          <a:fontRef idx="minor">
+            <a:schemeClr val="tx1"/>
+          </a:fontRef>
+        </p:style>
+      </p:cxnSp>
+      <p:cxnSp>
+        <p:nvCxnSpPr>
+          <p:cNvPr id="93" name="肘形连接符 92"/>
+          <p:cNvCxnSpPr>
+            <a:stCxn id="10" idx="2"/>
+            <a:endCxn id="12" idx="3"/>
+          </p:cNvCxnSpPr>
+          <p:nvPr/>
+        </p:nvCxnSpPr>
+        <p:spPr>
+          <a:xfrm rot="5400000">
+            <a:off x="7109269" y="3939920"/>
+            <a:ext cx="1945304" cy="697781"/>
+          </a:xfrm>
+          <a:prstGeom prst="bentConnector2">
+            <a:avLst/>
+          </a:prstGeom>
+          <a:ln>
+            <a:solidFill>
+              <a:schemeClr val="tx1"/>
+            </a:solidFill>
+            <a:tailEnd type="arrow"/>
+          </a:ln>
+        </p:spPr>
+        <p:style>
+          <a:lnRef idx="2">
+            <a:schemeClr val="accent1"/>
+          </a:lnRef>
+          <a:fillRef idx="0">
+            <a:schemeClr val="accent1"/>
+          </a:fillRef>
+          <a:effectRef idx="1">
+            <a:schemeClr val="accent1"/>
+          </a:effectRef>
+          <a:fontRef idx="minor">
+            <a:schemeClr val="tx1"/>
+          </a:fontRef>
+        </p:style>
+      </p:cxnSp>
+      <p:grpSp>
+        <p:nvGrpSpPr>
+          <p:cNvPr id="116" name="组 115"/>
+          <p:cNvGrpSpPr/>
+          <p:nvPr/>
+        </p:nvGrpSpPr>
+        <p:grpSpPr>
+          <a:xfrm>
+            <a:off x="4927600" y="1349375"/>
+            <a:ext cx="4756150" cy="2184400"/>
+            <a:chOff x="4927600" y="1349375"/>
+            <a:chExt cx="4756150" cy="2184400"/>
+          </a:xfrm>
+        </p:grpSpPr>
+        <p:cxnSp>
+          <p:nvCxnSpPr>
+            <p:cNvPr id="97" name="直线连接符 96"/>
+            <p:cNvCxnSpPr/>
+            <p:nvPr/>
+          </p:nvCxnSpPr>
+          <p:spPr>
+            <a:xfrm>
+              <a:off x="6939280" y="1349375"/>
+              <a:ext cx="2744470" cy="0"/>
+            </a:xfrm>
+            <a:prstGeom prst="line">
+              <a:avLst/>
+            </a:prstGeom>
+            <a:ln>
+              <a:solidFill>
+                <a:schemeClr val="tx1"/>
+              </a:solidFill>
+              <a:prstDash val="dash"/>
+            </a:ln>
+          </p:spPr>
+          <p:style>
+            <a:lnRef idx="2">
+              <a:schemeClr val="accent1"/>
+            </a:lnRef>
+            <a:fillRef idx="0">
+              <a:schemeClr val="accent1"/>
+            </a:fillRef>
+            <a:effectRef idx="1">
+              <a:schemeClr val="accent1"/>
+            </a:effectRef>
+            <a:fontRef idx="minor">
+              <a:schemeClr val="tx1"/>
+            </a:fontRef>
+          </p:style>
+        </p:cxnSp>
+        <p:cxnSp>
+          <p:nvCxnSpPr>
+            <p:cNvPr id="98" name="直线连接符 97"/>
+            <p:cNvCxnSpPr/>
+            <p:nvPr/>
+          </p:nvCxnSpPr>
+          <p:spPr>
+            <a:xfrm>
+              <a:off x="4927600" y="3533775"/>
+              <a:ext cx="4756150" cy="0"/>
+            </a:xfrm>
+            <a:prstGeom prst="line">
+              <a:avLst/>
+            </a:prstGeom>
+            <a:ln>
+              <a:solidFill>
+                <a:schemeClr val="tx1"/>
+              </a:solidFill>
+              <a:prstDash val="dash"/>
+            </a:ln>
+          </p:spPr>
+          <p:style>
+            <a:lnRef idx="2">
+              <a:schemeClr val="accent1"/>
+            </a:lnRef>
+            <a:fillRef idx="0">
+              <a:schemeClr val="accent1"/>
+            </a:fillRef>
+            <a:effectRef idx="1">
+              <a:schemeClr val="accent1"/>
+            </a:effectRef>
+            <a:fontRef idx="minor">
+              <a:schemeClr val="tx1"/>
+            </a:fontRef>
+          </p:style>
+        </p:cxnSp>
+        <p:cxnSp>
+          <p:nvCxnSpPr>
+            <p:cNvPr id="100" name="直线连接符 99"/>
+            <p:cNvCxnSpPr/>
+            <p:nvPr/>
+          </p:nvCxnSpPr>
+          <p:spPr>
+            <a:xfrm flipV="1">
+              <a:off x="9683750" y="1349375"/>
+              <a:ext cx="0" cy="2184400"/>
+            </a:xfrm>
+            <a:prstGeom prst="line">
+              <a:avLst/>
+            </a:prstGeom>
+            <a:ln>
+              <a:solidFill>
+                <a:schemeClr val="tx1"/>
+              </a:solidFill>
+              <a:prstDash val="dash"/>
+            </a:ln>
+          </p:spPr>
+          <p:style>
+            <a:lnRef idx="2">
+              <a:schemeClr val="accent1"/>
+            </a:lnRef>
+            <a:fillRef idx="0">
+              <a:schemeClr val="accent1"/>
+            </a:fillRef>
+            <a:effectRef idx="1">
+              <a:schemeClr val="accent1"/>
+            </a:effectRef>
+            <a:fontRef idx="minor">
+              <a:schemeClr val="tx1"/>
+            </a:fontRef>
+          </p:style>
+        </p:cxnSp>
+        <p:cxnSp>
+          <p:nvCxnSpPr>
+            <p:cNvPr id="104" name="直线连接符 103"/>
+            <p:cNvCxnSpPr/>
+            <p:nvPr/>
+          </p:nvCxnSpPr>
+          <p:spPr>
+            <a:xfrm flipV="1">
+              <a:off x="6939280" y="1349375"/>
+              <a:ext cx="0" cy="520775"/>
+            </a:xfrm>
+            <a:prstGeom prst="line">
+              <a:avLst/>
+            </a:prstGeom>
+            <a:ln>
+              <a:solidFill>
+                <a:schemeClr val="tx1"/>
+              </a:solidFill>
+              <a:prstDash val="dash"/>
+            </a:ln>
+          </p:spPr>
+          <p:style>
+            <a:lnRef idx="2">
+              <a:schemeClr val="accent1"/>
+            </a:lnRef>
+            <a:fillRef idx="0">
+              <a:schemeClr val="accent1"/>
+            </a:fillRef>
+            <a:effectRef idx="1">
+              <a:schemeClr val="accent1"/>
+            </a:effectRef>
+            <a:fontRef idx="minor">
+              <a:schemeClr val="tx1"/>
+            </a:fontRef>
+          </p:style>
+        </p:cxnSp>
+        <p:cxnSp>
+          <p:nvCxnSpPr>
+            <p:cNvPr id="112" name="直线连接符 111"/>
+            <p:cNvCxnSpPr/>
+            <p:nvPr/>
+          </p:nvCxnSpPr>
+          <p:spPr>
+            <a:xfrm>
+              <a:off x="4927600" y="1870150"/>
+              <a:ext cx="2021289" cy="0"/>
+            </a:xfrm>
+            <a:prstGeom prst="line">
+              <a:avLst/>
+            </a:prstGeom>
+            <a:ln>
+              <a:solidFill>
+                <a:schemeClr val="tx1"/>
+              </a:solidFill>
+              <a:prstDash val="dash"/>
+            </a:ln>
+          </p:spPr>
+          <p:style>
+            <a:lnRef idx="2">
+              <a:schemeClr val="accent1"/>
+            </a:lnRef>
+            <a:fillRef idx="0">
+              <a:schemeClr val="accent1"/>
+            </a:fillRef>
+            <a:effectRef idx="1">
+              <a:schemeClr val="accent1"/>
+            </a:effectRef>
+            <a:fontRef idx="minor">
+              <a:schemeClr val="tx1"/>
+            </a:fontRef>
+          </p:style>
+        </p:cxnSp>
+        <p:cxnSp>
+          <p:nvCxnSpPr>
+            <p:cNvPr id="114" name="直线连接符 113"/>
+            <p:cNvCxnSpPr/>
+            <p:nvPr/>
+          </p:nvCxnSpPr>
+          <p:spPr>
+            <a:xfrm flipV="1">
+              <a:off x="4927600" y="1870150"/>
+              <a:ext cx="0" cy="1663625"/>
+            </a:xfrm>
+            <a:prstGeom prst="line">
+              <a:avLst/>
+            </a:prstGeom>
+            <a:ln>
+              <a:solidFill>
+                <a:schemeClr val="tx1"/>
+              </a:solidFill>
+              <a:prstDash val="dash"/>
+            </a:ln>
+          </p:spPr>
+          <p:style>
+            <a:lnRef idx="2">
+              <a:schemeClr val="accent1"/>
+            </a:lnRef>
+            <a:fillRef idx="0">
+              <a:schemeClr val="accent1"/>
+            </a:fillRef>
+            <a:effectRef idx="1">
+              <a:schemeClr val="accent1"/>
+            </a:effectRef>
+            <a:fontRef idx="minor">
+              <a:schemeClr val="tx1"/>
+            </a:fontRef>
+          </p:style>
+        </p:cxnSp>
+      </p:grpSp>
+      <p:sp>
+        <p:nvSpPr>
+          <p:cNvPr id="117" name="文本框 116"/>
+          <p:cNvSpPr txBox="1"/>
+          <p:nvPr/>
+        </p:nvSpPr>
+        <p:spPr>
+          <a:xfrm>
+            <a:off x="5110480" y="2950398"/>
+            <a:ext cx="2036397" cy="369332"/>
+          </a:xfrm>
+          <a:prstGeom prst="rect">
+            <a:avLst/>
+          </a:prstGeom>
+          <a:noFill/>
+        </p:spPr>
+        <p:txBody>
+          <a:bodyPr wrap="none" rtlCol="0">
+            <a:spAutoFit/>
+          </a:bodyPr>
+          <a:lstStyle/>
+          <a:p>
+            <a:r>
+              <a:rPr kumimoji="1" lang="en-US" altLang="zh-CN" b="1" dirty="0" smtClean="0"/>
+              <a:t>Chopper</a:t>
+            </a:r>
+            <a:r>
+              <a:rPr kumimoji="1" lang="zh-CN" altLang="en-US" b="1" dirty="0" smtClean="0"/>
+              <a:t> </a:t>
+            </a:r>
+            <a:r>
+              <a:rPr kumimoji="1" lang="en-US" altLang="zh-CN" b="1" dirty="0" err="1" smtClean="0"/>
+              <a:t>Correlator</a:t>
+            </a:r>
+            <a:endParaRPr kumimoji="1" lang="zh-CN" altLang="en-US" b="1" dirty="0" smtClean="0"/>
+          </a:p>
+        </p:txBody>
+      </p:sp>
+      <p:sp>
+        <p:nvSpPr>
+          <p:cNvPr id="120" name="五角星 119"/>
+          <p:cNvSpPr/>
+          <p:nvPr/>
+        </p:nvSpPr>
+        <p:spPr>
+          <a:xfrm>
+            <a:off x="4975860" y="3058536"/>
+            <a:ext cx="175260" cy="175260"/>
+          </a:xfrm>
+          <a:prstGeom prst="star5">
+            <a:avLst/>
+          </a:prstGeom>
+          <a:solidFill>
+            <a:schemeClr val="tx1"/>
+          </a:solidFill>
+          <a:ln>
+            <a:solidFill>
+              <a:schemeClr val="tx1"/>
+            </a:solidFill>
+          </a:ln>
+        </p:spPr>
+        <p:style>
+          <a:lnRef idx="1">
+            <a:schemeClr val="accent1"/>
+          </a:lnRef>
+          <a:fillRef idx="3">
+            <a:schemeClr val="accent1"/>
+          </a:fillRef>
+          <a:effectRef idx="2">
+            <a:schemeClr val="accent1"/>
+          </a:effectRef>
+          <a:fontRef idx="minor">
+            <a:schemeClr val="lt1"/>
+          </a:fontRef>
+        </p:style>
+        <p:txBody>
+          <a:bodyPr rtlCol="0" anchor="ctr"/>
+          <a:lstStyle/>
+          <a:p>
+            <a:pPr algn="ctr"/>
+            <a:endParaRPr kumimoji="1" lang="zh-CN" altLang="en-US"/>
+          </a:p>
+        </p:txBody>
+      </p:sp>
+      <p:sp>
+        <p:nvSpPr>
+          <p:cNvPr id="121" name="五角星 120"/>
+          <p:cNvSpPr/>
+          <p:nvPr/>
+        </p:nvSpPr>
+        <p:spPr>
+          <a:xfrm>
+            <a:off x="3612515" y="511885"/>
+            <a:ext cx="175260" cy="175260"/>
+          </a:xfrm>
+          <a:prstGeom prst="star5">
+            <a:avLst/>
+          </a:prstGeom>
+          <a:solidFill>
+            <a:schemeClr val="tx1"/>
+          </a:solidFill>
+          <a:ln>
+            <a:solidFill>
+              <a:schemeClr val="tx1"/>
+            </a:solidFill>
+          </a:ln>
+        </p:spPr>
+        <p:style>
+          <a:lnRef idx="1">
+            <a:schemeClr val="accent1"/>
+          </a:lnRef>
+          <a:fillRef idx="3">
+            <a:schemeClr val="accent1"/>
+          </a:fillRef>
+          <a:effectRef idx="2">
+            <a:schemeClr val="accent1"/>
+          </a:effectRef>
+          <a:fontRef idx="minor">
+            <a:schemeClr val="lt1"/>
+          </a:fontRef>
+        </p:style>
+        <p:txBody>
+          <a:bodyPr rtlCol="0" anchor="ctr"/>
+          <a:lstStyle/>
+          <a:p>
+            <a:pPr algn="ctr"/>
+            <a:endParaRPr kumimoji="1" lang="zh-CN" altLang="en-US"/>
+          </a:p>
+        </p:txBody>
+      </p:sp>
+    </p:spTree>
+    <p:extLst>
+      <p:ext uri="{BB962C8B-B14F-4D97-AF65-F5344CB8AC3E}">
+        <p14:creationId xmlns:p14="http://schemas.microsoft.com/office/powerpoint/2010/main" val="954556828"/>
+      </p:ext>
+    </p:extLst>
+  </p:cSld>
+  <p:clrMapOvr>
+    <a:masterClrMapping/>
+  </p:clrMapOvr>
+</p:sld>
+</file>
+
+<file path=ppt/slides/slide6.xml><?xml version="1.0" encoding="utf-8"?>
+<p:sld xmlns:a="http://schemas.openxmlformats.org/drawingml/2006/main" xmlns:r="http://schemas.openxmlformats.org/officeDocument/2006/relationships" xmlns:p="http://schemas.openxmlformats.org/presentationml/2006/main">
+  <p:cSld>
+    <p:spTree>
+      <p:nvGrpSpPr>
+        <p:cNvPr id="1" name=""/>
+        <p:cNvGrpSpPr/>
+        <p:nvPr/>
+      </p:nvGrpSpPr>
+      <p:grpSpPr>
+        <a:xfrm>
+          <a:off x="0" y="0"/>
+          <a:ext cx="0" cy="0"/>
+          <a:chOff x="0" y="0"/>
+          <a:chExt cx="0" cy="0"/>
+        </a:xfrm>
+      </p:grpSpPr>
+      <p:sp>
+        <p:nvSpPr>
+          <p:cNvPr id="4" name="矩形 3"/>
+          <p:cNvSpPr/>
+          <p:nvPr/>
+        </p:nvSpPr>
+        <p:spPr>
+          <a:xfrm>
+            <a:off x="0" y="1116289"/>
+            <a:ext cx="1828800" cy="731520"/>
+          </a:xfrm>
+          <a:prstGeom prst="rect">
+            <a:avLst/>
+          </a:prstGeom>
+          <a:noFill/>
+          <a:ln>
+            <a:solidFill>
+              <a:schemeClr val="tx1"/>
+            </a:solidFill>
+          </a:ln>
+        </p:spPr>
+        <p:style>
+          <a:lnRef idx="1">
+            <a:schemeClr val="accent1"/>
+          </a:lnRef>
+          <a:fillRef idx="3">
+            <a:schemeClr val="accent1"/>
+          </a:fillRef>
+          <a:effectRef idx="2">
+            <a:schemeClr val="accent1"/>
+          </a:effectRef>
+          <a:fontRef idx="minor">
+            <a:schemeClr val="lt1"/>
+          </a:fontRef>
+        </p:style>
+        <p:txBody>
+          <a:bodyPr rtlCol="0" anchor="ctr"/>
+          <a:lstStyle/>
+          <a:p>
+            <a:pPr algn="ctr"/>
+            <a:r>
+              <a:rPr kumimoji="1" lang="en-US" altLang="zh-CN" dirty="0" smtClean="0">
+                <a:solidFill>
+                  <a:schemeClr val="tx1"/>
+                </a:solidFill>
+              </a:rPr>
+              <a:t>Payload</a:t>
+            </a:r>
+          </a:p>
+        </p:txBody>
+      </p:sp>
+      <p:sp>
+        <p:nvSpPr>
+          <p:cNvPr id="5" name="矩形 4"/>
+          <p:cNvSpPr/>
+          <p:nvPr/>
+        </p:nvSpPr>
+        <p:spPr>
+          <a:xfrm>
+            <a:off x="2563411" y="1140863"/>
+            <a:ext cx="1828800" cy="731520"/>
+          </a:xfrm>
+          <a:prstGeom prst="rect">
+            <a:avLst/>
+          </a:prstGeom>
+          <a:noFill/>
+          <a:ln>
+            <a:solidFill>
+              <a:schemeClr val="tx1"/>
+            </a:solidFill>
+          </a:ln>
+        </p:spPr>
+        <p:style>
+          <a:lnRef idx="1">
+            <a:schemeClr val="accent1"/>
+          </a:lnRef>
+          <a:fillRef idx="3">
+            <a:schemeClr val="accent1"/>
+          </a:fillRef>
+          <a:effectRef idx="2">
+            <a:schemeClr val="accent1"/>
+          </a:effectRef>
+          <a:fontRef idx="minor">
+            <a:schemeClr val="lt1"/>
+          </a:fontRef>
+        </p:style>
+        <p:txBody>
+          <a:bodyPr rtlCol="0" anchor="ctr"/>
+          <a:lstStyle/>
+          <a:p>
+            <a:pPr algn="ctr"/>
+            <a:r>
+              <a:rPr kumimoji="1" lang="en-US" altLang="zh-CN" dirty="0" smtClean="0">
+                <a:solidFill>
+                  <a:schemeClr val="tx1"/>
+                </a:solidFill>
+              </a:rPr>
+              <a:t>CRC32</a:t>
+            </a:r>
+          </a:p>
+          <a:p>
+            <a:pPr algn="ctr"/>
+            <a:r>
+              <a:rPr kumimoji="1" lang="en-US" altLang="zh-CN" dirty="0" smtClean="0">
+                <a:solidFill>
+                  <a:schemeClr val="tx1"/>
+                </a:solidFill>
+              </a:rPr>
+              <a:t>Encoder</a:t>
+            </a:r>
+          </a:p>
+        </p:txBody>
+      </p:sp>
+      <p:sp>
+        <p:nvSpPr>
+          <p:cNvPr id="7" name="矩形 6"/>
+          <p:cNvSpPr/>
+          <p:nvPr/>
+        </p:nvSpPr>
+        <p:spPr>
+          <a:xfrm>
+            <a:off x="4978400" y="2595013"/>
+            <a:ext cx="1828800" cy="731520"/>
+          </a:xfrm>
+          <a:prstGeom prst="rect">
+            <a:avLst/>
+          </a:prstGeom>
+          <a:noFill/>
+          <a:ln>
+            <a:solidFill>
+              <a:schemeClr val="tx1"/>
+            </a:solidFill>
+          </a:ln>
+        </p:spPr>
+        <p:style>
+          <a:lnRef idx="1">
+            <a:schemeClr val="accent1"/>
+          </a:lnRef>
+          <a:fillRef idx="3">
+            <a:schemeClr val="accent1"/>
+          </a:fillRef>
+          <a:effectRef idx="2">
+            <a:schemeClr val="accent1"/>
+          </a:effectRef>
+          <a:fontRef idx="minor">
+            <a:schemeClr val="lt1"/>
+          </a:fontRef>
+        </p:style>
+        <p:txBody>
+          <a:bodyPr rtlCol="0" anchor="ctr"/>
+          <a:lstStyle/>
+          <a:p>
+            <a:pPr algn="ctr"/>
+            <a:r>
+              <a:rPr kumimoji="1" lang="en-US" altLang="zh-CN" dirty="0" smtClean="0">
+                <a:solidFill>
+                  <a:schemeClr val="tx1"/>
+                </a:solidFill>
+              </a:rPr>
+              <a:t>Redundant</a:t>
+            </a:r>
+            <a:r>
+              <a:rPr kumimoji="1" lang="zh-CN" altLang="en-US" dirty="0" smtClean="0">
+                <a:solidFill>
+                  <a:schemeClr val="tx1"/>
+                </a:solidFill>
+              </a:rPr>
+              <a:t> </a:t>
+            </a:r>
+            <a:r>
+              <a:rPr kumimoji="1" lang="en-US" altLang="zh-CN" dirty="0" smtClean="0">
+                <a:solidFill>
+                  <a:schemeClr val="tx1"/>
+                </a:solidFill>
+              </a:rPr>
+              <a:t>Bits</a:t>
+            </a:r>
+          </a:p>
+        </p:txBody>
+      </p:sp>
+      <p:sp>
+        <p:nvSpPr>
+          <p:cNvPr id="8" name="矩形 7"/>
+          <p:cNvSpPr/>
+          <p:nvPr/>
+        </p:nvSpPr>
+        <p:spPr>
+          <a:xfrm>
+            <a:off x="7601669" y="1590570"/>
+            <a:ext cx="1828800" cy="731520"/>
+          </a:xfrm>
+          <a:prstGeom prst="rect">
+            <a:avLst/>
+          </a:prstGeom>
+          <a:noFill/>
+          <a:ln>
+            <a:solidFill>
+              <a:schemeClr val="tx1"/>
+            </a:solidFill>
+          </a:ln>
+        </p:spPr>
+        <p:style>
+          <a:lnRef idx="1">
+            <a:schemeClr val="accent1"/>
+          </a:lnRef>
+          <a:fillRef idx="3">
+            <a:schemeClr val="accent1"/>
+          </a:fillRef>
+          <a:effectRef idx="2">
+            <a:schemeClr val="accent1"/>
+          </a:effectRef>
+          <a:fontRef idx="minor">
+            <a:schemeClr val="lt1"/>
+          </a:fontRef>
+        </p:style>
+        <p:txBody>
+          <a:bodyPr rtlCol="0" anchor="ctr"/>
+          <a:lstStyle/>
+          <a:p>
+            <a:pPr algn="ctr"/>
+            <a:r>
+              <a:rPr kumimoji="1" lang="en-US" altLang="zh-CN" dirty="0" smtClean="0">
+                <a:solidFill>
+                  <a:schemeClr val="tx1"/>
+                </a:solidFill>
+              </a:rPr>
+              <a:t>Tag</a:t>
+            </a:r>
+            <a:r>
+              <a:rPr kumimoji="1" lang="zh-CN" altLang="en-US" dirty="0" smtClean="0">
+                <a:solidFill>
+                  <a:schemeClr val="tx1"/>
+                </a:solidFill>
+              </a:rPr>
+              <a:t> </a:t>
+            </a:r>
+            <a:r>
+              <a:rPr kumimoji="1" lang="en-US" altLang="zh-CN" dirty="0" smtClean="0">
+                <a:solidFill>
+                  <a:schemeClr val="tx1"/>
+                </a:solidFill>
+              </a:rPr>
+              <a:t>Mixer</a:t>
+            </a:r>
+          </a:p>
+        </p:txBody>
+      </p:sp>
+      <p:sp>
+        <p:nvSpPr>
+          <p:cNvPr id="9" name="矩形 8"/>
+          <p:cNvSpPr/>
+          <p:nvPr/>
+        </p:nvSpPr>
+        <p:spPr>
+          <a:xfrm>
+            <a:off x="-4718050" y="3623057"/>
+            <a:ext cx="1828800" cy="731520"/>
+          </a:xfrm>
+          <a:prstGeom prst="rect">
+            <a:avLst/>
+          </a:prstGeom>
+          <a:noFill/>
+          <a:ln>
+            <a:solidFill>
+              <a:schemeClr val="tx1"/>
+            </a:solidFill>
+          </a:ln>
+        </p:spPr>
+        <p:style>
+          <a:lnRef idx="1">
+            <a:schemeClr val="accent1"/>
+          </a:lnRef>
+          <a:fillRef idx="3">
+            <a:schemeClr val="accent1"/>
+          </a:fillRef>
+          <a:effectRef idx="2">
+            <a:schemeClr val="accent1"/>
+          </a:effectRef>
+          <a:fontRef idx="minor">
+            <a:schemeClr val="lt1"/>
+          </a:fontRef>
+        </p:style>
+        <p:txBody>
+          <a:bodyPr rtlCol="0" anchor="ctr"/>
+          <a:lstStyle/>
+          <a:p>
+            <a:pPr algn="ctr"/>
+            <a:r>
+              <a:rPr kumimoji="1" lang="en-US" altLang="zh-CN" dirty="0" smtClean="0">
+                <a:solidFill>
+                  <a:schemeClr val="tx1"/>
+                </a:solidFill>
+              </a:rPr>
+              <a:t>Data</a:t>
+            </a:r>
+            <a:r>
+              <a:rPr kumimoji="1" lang="zh-CN" altLang="en-US" dirty="0" smtClean="0">
+                <a:solidFill>
+                  <a:schemeClr val="tx1"/>
+                </a:solidFill>
+              </a:rPr>
+              <a:t> </a:t>
+            </a:r>
+            <a:r>
+              <a:rPr kumimoji="1" lang="en-US" altLang="zh-CN" dirty="0" smtClean="0">
+                <a:solidFill>
+                  <a:schemeClr val="tx1"/>
+                </a:solidFill>
+              </a:rPr>
+              <a:t>String</a:t>
+            </a:r>
+            <a:r>
+              <a:rPr kumimoji="1" lang="zh-CN" altLang="en-US" dirty="0" smtClean="0">
+                <a:solidFill>
+                  <a:schemeClr val="tx1"/>
+                </a:solidFill>
+              </a:rPr>
+              <a:t> </a:t>
+            </a:r>
+            <a:r>
+              <a:rPr kumimoji="1" lang="en-US" altLang="zh-CN" dirty="0" smtClean="0">
+                <a:solidFill>
+                  <a:schemeClr val="tx1"/>
+                </a:solidFill>
+              </a:rPr>
+              <a:t>Power</a:t>
+            </a:r>
+          </a:p>
+        </p:txBody>
+      </p:sp>
+      <p:grpSp>
+        <p:nvGrpSpPr>
+          <p:cNvPr id="10" name="组 9"/>
+          <p:cNvGrpSpPr/>
+          <p:nvPr/>
+        </p:nvGrpSpPr>
+        <p:grpSpPr>
+          <a:xfrm>
+            <a:off x="9430469" y="3636497"/>
+            <a:ext cx="381000" cy="381000"/>
+            <a:chOff x="5238750" y="698500"/>
+            <a:chExt cx="381000" cy="381000"/>
+          </a:xfrm>
+        </p:grpSpPr>
+        <p:sp>
+          <p:nvSpPr>
+            <p:cNvPr id="11" name="椭圆 10"/>
+            <p:cNvSpPr/>
+            <p:nvPr/>
+          </p:nvSpPr>
+          <p:spPr>
+            <a:xfrm>
+              <a:off x="5238750" y="698500"/>
+              <a:ext cx="381000" cy="381000"/>
+            </a:xfrm>
+            <a:prstGeom prst="ellipse">
+              <a:avLst/>
+            </a:prstGeom>
+            <a:noFill/>
+            <a:ln w="38100">
+              <a:solidFill>
+                <a:schemeClr val="tx1"/>
+              </a:solidFill>
+            </a:ln>
+          </p:spPr>
+          <p:style>
+            <a:lnRef idx="1">
+              <a:schemeClr val="accent1"/>
+            </a:lnRef>
+            <a:fillRef idx="3">
+              <a:schemeClr val="accent1"/>
+            </a:fillRef>
+            <a:effectRef idx="2">
+              <a:schemeClr val="accent1"/>
+            </a:effectRef>
+            <a:fontRef idx="minor">
+              <a:schemeClr val="lt1"/>
+            </a:fontRef>
+          </p:style>
+          <p:txBody>
+            <a:bodyPr rtlCol="0" anchor="ctr"/>
+            <a:lstStyle/>
+            <a:p>
+              <a:pPr algn="ctr"/>
+              <a:endParaRPr kumimoji="1" lang="zh-CN" altLang="en-US"/>
+            </a:p>
+          </p:txBody>
+        </p:sp>
+        <p:cxnSp>
+          <p:nvCxnSpPr>
+            <p:cNvPr id="12" name="直线连接符 11"/>
+            <p:cNvCxnSpPr>
+              <a:stCxn id="11" idx="1"/>
+              <a:endCxn id="11" idx="5"/>
+            </p:cNvCxnSpPr>
+            <p:nvPr/>
+          </p:nvCxnSpPr>
+          <p:spPr>
+            <a:xfrm>
+              <a:off x="5294546" y="754296"/>
+              <a:ext cx="269408" cy="269408"/>
+            </a:xfrm>
+            <a:prstGeom prst="line">
+              <a:avLst/>
+            </a:prstGeom>
+            <a:ln w="38100">
+              <a:solidFill>
+                <a:schemeClr val="tx1"/>
+              </a:solidFill>
+            </a:ln>
+          </p:spPr>
+          <p:style>
+            <a:lnRef idx="2">
+              <a:schemeClr val="accent1"/>
+            </a:lnRef>
+            <a:fillRef idx="0">
+              <a:schemeClr val="accent1"/>
+            </a:fillRef>
+            <a:effectRef idx="1">
+              <a:schemeClr val="accent1"/>
+            </a:effectRef>
+            <a:fontRef idx="minor">
+              <a:schemeClr val="tx1"/>
+            </a:fontRef>
+          </p:style>
+        </p:cxnSp>
+        <p:cxnSp>
+          <p:nvCxnSpPr>
+            <p:cNvPr id="13" name="直线连接符 12"/>
+            <p:cNvCxnSpPr>
+              <a:stCxn id="11" idx="7"/>
+              <a:endCxn id="11" idx="3"/>
+            </p:cNvCxnSpPr>
+            <p:nvPr/>
+          </p:nvCxnSpPr>
+          <p:spPr>
+            <a:xfrm flipH="1">
+              <a:off x="5294546" y="754296"/>
+              <a:ext cx="269408" cy="269408"/>
+            </a:xfrm>
+            <a:prstGeom prst="line">
+              <a:avLst/>
+            </a:prstGeom>
+            <a:ln w="38100">
+              <a:solidFill>
+                <a:schemeClr val="tx1"/>
+              </a:solidFill>
+            </a:ln>
+          </p:spPr>
+          <p:style>
+            <a:lnRef idx="2">
+              <a:schemeClr val="accent1"/>
+            </a:lnRef>
+            <a:fillRef idx="0">
+              <a:schemeClr val="accent1"/>
+            </a:fillRef>
+            <a:effectRef idx="1">
+              <a:schemeClr val="accent1"/>
+            </a:effectRef>
+            <a:fontRef idx="minor">
+              <a:schemeClr val="tx1"/>
+            </a:fontRef>
+          </p:style>
+        </p:cxnSp>
+      </p:grpSp>
+      <p:grpSp>
+        <p:nvGrpSpPr>
+          <p:cNvPr id="14" name="组 13"/>
+          <p:cNvGrpSpPr/>
+          <p:nvPr/>
+        </p:nvGrpSpPr>
+        <p:grpSpPr>
+          <a:xfrm>
+            <a:off x="3422015" y="2904977"/>
+            <a:ext cx="381000" cy="381000"/>
+            <a:chOff x="5238750" y="698500"/>
+            <a:chExt cx="381000" cy="381000"/>
+          </a:xfrm>
+        </p:grpSpPr>
+        <p:sp>
+          <p:nvSpPr>
+            <p:cNvPr id="15" name="椭圆 14"/>
+            <p:cNvSpPr/>
+            <p:nvPr/>
+          </p:nvSpPr>
+          <p:spPr>
+            <a:xfrm>
+              <a:off x="5238750" y="698500"/>
+              <a:ext cx="381000" cy="381000"/>
+            </a:xfrm>
+            <a:prstGeom prst="ellipse">
+              <a:avLst/>
+            </a:prstGeom>
+            <a:noFill/>
+            <a:ln w="38100">
+              <a:solidFill>
+                <a:schemeClr val="tx1"/>
+              </a:solidFill>
+            </a:ln>
+          </p:spPr>
+          <p:style>
+            <a:lnRef idx="1">
+              <a:schemeClr val="accent1"/>
+            </a:lnRef>
+            <a:fillRef idx="3">
+              <a:schemeClr val="accent1"/>
+            </a:fillRef>
+            <a:effectRef idx="2">
+              <a:schemeClr val="accent1"/>
+            </a:effectRef>
+            <a:fontRef idx="minor">
+              <a:schemeClr val="lt1"/>
+            </a:fontRef>
+          </p:style>
+          <p:txBody>
+            <a:bodyPr rtlCol="0" anchor="ctr"/>
+            <a:lstStyle/>
+            <a:p>
+              <a:pPr algn="ctr"/>
+              <a:endParaRPr kumimoji="1" lang="zh-CN" altLang="en-US"/>
+            </a:p>
+          </p:txBody>
+        </p:sp>
+        <p:cxnSp>
+          <p:nvCxnSpPr>
+            <p:cNvPr id="16" name="直线连接符 15"/>
+            <p:cNvCxnSpPr>
+              <a:stCxn id="15" idx="1"/>
+              <a:endCxn id="15" idx="5"/>
+            </p:cNvCxnSpPr>
+            <p:nvPr/>
+          </p:nvCxnSpPr>
+          <p:spPr>
+            <a:xfrm>
+              <a:off x="5294546" y="754296"/>
+              <a:ext cx="269408" cy="269408"/>
+            </a:xfrm>
+            <a:prstGeom prst="line">
+              <a:avLst/>
+            </a:prstGeom>
+            <a:ln w="38100">
+              <a:solidFill>
+                <a:schemeClr val="tx1"/>
+              </a:solidFill>
+            </a:ln>
+          </p:spPr>
+          <p:style>
+            <a:lnRef idx="2">
+              <a:schemeClr val="accent1"/>
+            </a:lnRef>
+            <a:fillRef idx="0">
+              <a:schemeClr val="accent1"/>
+            </a:fillRef>
+            <a:effectRef idx="1">
+              <a:schemeClr val="accent1"/>
+            </a:effectRef>
+            <a:fontRef idx="minor">
+              <a:schemeClr val="tx1"/>
+            </a:fontRef>
+          </p:style>
+        </p:cxnSp>
+        <p:cxnSp>
+          <p:nvCxnSpPr>
+            <p:cNvPr id="17" name="直线连接符 16"/>
+            <p:cNvCxnSpPr>
+              <a:stCxn id="15" idx="7"/>
+              <a:endCxn id="15" idx="3"/>
+            </p:cNvCxnSpPr>
+            <p:nvPr/>
+          </p:nvCxnSpPr>
+          <p:spPr>
+            <a:xfrm flipH="1">
+              <a:off x="5294546" y="754296"/>
+              <a:ext cx="269408" cy="269408"/>
+            </a:xfrm>
+            <a:prstGeom prst="line">
+              <a:avLst/>
+            </a:prstGeom>
+            <a:ln w="38100">
+              <a:solidFill>
+                <a:schemeClr val="tx1"/>
+              </a:solidFill>
+            </a:ln>
+          </p:spPr>
+          <p:style>
+            <a:lnRef idx="2">
+              <a:schemeClr val="accent1"/>
+            </a:lnRef>
+            <a:fillRef idx="0">
+              <a:schemeClr val="accent1"/>
+            </a:fillRef>
+            <a:effectRef idx="1">
+              <a:schemeClr val="accent1"/>
+            </a:effectRef>
+            <a:fontRef idx="minor">
+              <a:schemeClr val="tx1"/>
+            </a:fontRef>
+          </p:style>
+        </p:cxnSp>
+      </p:grpSp>
+      <p:sp>
+        <p:nvSpPr>
+          <p:cNvPr id="18" name="矩形 17"/>
+          <p:cNvSpPr/>
+          <p:nvPr/>
+        </p:nvSpPr>
+        <p:spPr>
+          <a:xfrm>
+            <a:off x="-4626610" y="4506977"/>
+            <a:ext cx="1828800" cy="731520"/>
+          </a:xfrm>
+          <a:prstGeom prst="rect">
+            <a:avLst/>
+          </a:prstGeom>
+          <a:noFill/>
+          <a:ln>
+            <a:solidFill>
+              <a:schemeClr val="tx1"/>
+            </a:solidFill>
+          </a:ln>
+        </p:spPr>
+        <p:style>
+          <a:lnRef idx="1">
+            <a:schemeClr val="accent1"/>
+          </a:lnRef>
+          <a:fillRef idx="3">
+            <a:schemeClr val="accent1"/>
+          </a:fillRef>
+          <a:effectRef idx="2">
+            <a:schemeClr val="accent1"/>
+          </a:effectRef>
+          <a:fontRef idx="minor">
+            <a:schemeClr val="lt1"/>
+          </a:fontRef>
+        </p:style>
+        <p:txBody>
+          <a:bodyPr rtlCol="0" anchor="ctr"/>
+          <a:lstStyle/>
+          <a:p>
+            <a:pPr algn="ctr"/>
+            <a:r>
+              <a:rPr kumimoji="1" lang="en-US" altLang="zh-CN" dirty="0" smtClean="0">
+                <a:solidFill>
+                  <a:schemeClr val="tx1"/>
+                </a:solidFill>
+              </a:rPr>
+              <a:t>Training</a:t>
+            </a:r>
+            <a:r>
+              <a:rPr kumimoji="1" lang="zh-CN" altLang="en-US" dirty="0" smtClean="0">
+                <a:solidFill>
+                  <a:schemeClr val="tx1"/>
+                </a:solidFill>
+              </a:rPr>
+              <a:t> </a:t>
+            </a:r>
+            <a:r>
+              <a:rPr kumimoji="1" lang="en-US" altLang="zh-CN" dirty="0" smtClean="0">
+                <a:solidFill>
+                  <a:schemeClr val="tx1"/>
+                </a:solidFill>
+              </a:rPr>
+              <a:t>String</a:t>
+            </a:r>
+            <a:r>
+              <a:rPr kumimoji="1" lang="zh-CN" altLang="en-US" dirty="0" smtClean="0">
+                <a:solidFill>
+                  <a:schemeClr val="tx1"/>
+                </a:solidFill>
+              </a:rPr>
+              <a:t> </a:t>
+            </a:r>
+            <a:r>
+              <a:rPr kumimoji="1" lang="en-US" altLang="zh-CN" dirty="0" smtClean="0">
+                <a:solidFill>
+                  <a:schemeClr val="tx1"/>
+                </a:solidFill>
+              </a:rPr>
+              <a:t>Power</a:t>
+            </a:r>
+          </a:p>
+        </p:txBody>
+      </p:sp>
+      <p:sp>
+        <p:nvSpPr>
+          <p:cNvPr id="19" name="矩形 18"/>
+          <p:cNvSpPr/>
+          <p:nvPr/>
+        </p:nvSpPr>
+        <p:spPr>
+          <a:xfrm>
+            <a:off x="-2889250" y="1956330"/>
+            <a:ext cx="1828800" cy="731520"/>
+          </a:xfrm>
+          <a:prstGeom prst="rect">
+            <a:avLst/>
+          </a:prstGeom>
+          <a:noFill/>
+          <a:ln>
+            <a:solidFill>
+              <a:schemeClr val="tx1"/>
+            </a:solidFill>
+          </a:ln>
+        </p:spPr>
+        <p:style>
+          <a:lnRef idx="1">
+            <a:schemeClr val="accent1"/>
+          </a:lnRef>
+          <a:fillRef idx="3">
+            <a:schemeClr val="accent1"/>
+          </a:fillRef>
+          <a:effectRef idx="2">
+            <a:schemeClr val="accent1"/>
+          </a:effectRef>
+          <a:fontRef idx="minor">
+            <a:schemeClr val="lt1"/>
+          </a:fontRef>
+        </p:style>
+        <p:txBody>
+          <a:bodyPr rtlCol="0" anchor="ctr"/>
+          <a:lstStyle/>
+          <a:p>
+            <a:pPr algn="ctr"/>
+            <a:r>
+              <a:rPr kumimoji="1" lang="en-US" altLang="zh-CN" dirty="0" err="1" smtClean="0">
+                <a:solidFill>
+                  <a:schemeClr val="tx1"/>
+                </a:solidFill>
+              </a:rPr>
+              <a:t>Convoluion</a:t>
+            </a:r>
+            <a:endParaRPr kumimoji="1" lang="en-US" altLang="zh-CN" dirty="0" smtClean="0">
+              <a:solidFill>
+                <a:schemeClr val="tx1"/>
+              </a:solidFill>
+            </a:endParaRPr>
+          </a:p>
+        </p:txBody>
+      </p:sp>
+      <p:sp>
+        <p:nvSpPr>
+          <p:cNvPr id="20" name="矩形 19"/>
+          <p:cNvSpPr/>
+          <p:nvPr/>
+        </p:nvSpPr>
+        <p:spPr>
+          <a:xfrm>
+            <a:off x="-2736850" y="2840250"/>
+            <a:ext cx="1828800" cy="731520"/>
+          </a:xfrm>
+          <a:prstGeom prst="rect">
+            <a:avLst/>
+          </a:prstGeom>
+          <a:noFill/>
+          <a:ln>
+            <a:solidFill>
+              <a:schemeClr val="tx1"/>
+            </a:solidFill>
+          </a:ln>
+        </p:spPr>
+        <p:style>
+          <a:lnRef idx="1">
+            <a:schemeClr val="accent1"/>
+          </a:lnRef>
+          <a:fillRef idx="3">
+            <a:schemeClr val="accent1"/>
+          </a:fillRef>
+          <a:effectRef idx="2">
+            <a:schemeClr val="accent1"/>
+          </a:effectRef>
+          <a:fontRef idx="minor">
+            <a:schemeClr val="lt1"/>
+          </a:fontRef>
+        </p:style>
+        <p:txBody>
+          <a:bodyPr rtlCol="0" anchor="ctr"/>
+          <a:lstStyle/>
+          <a:p>
+            <a:pPr algn="ctr"/>
+            <a:r>
+              <a:rPr kumimoji="1" lang="en-US" altLang="zh-CN" dirty="0" err="1" smtClean="0">
+                <a:solidFill>
+                  <a:schemeClr val="tx1"/>
+                </a:solidFill>
+              </a:rPr>
+              <a:t>Convoluion</a:t>
+            </a:r>
+            <a:endParaRPr kumimoji="1" lang="en-US" altLang="zh-CN" dirty="0" smtClean="0">
+              <a:solidFill>
+                <a:schemeClr val="tx1"/>
+              </a:solidFill>
+            </a:endParaRPr>
+          </a:p>
+        </p:txBody>
+      </p:sp>
+      <p:sp>
+        <p:nvSpPr>
+          <p:cNvPr id="21" name="矩形 20"/>
+          <p:cNvSpPr/>
+          <p:nvPr/>
+        </p:nvSpPr>
+        <p:spPr>
+          <a:xfrm>
+            <a:off x="-2501900" y="3824500"/>
+            <a:ext cx="1828800" cy="731520"/>
+          </a:xfrm>
+          <a:prstGeom prst="rect">
+            <a:avLst/>
+          </a:prstGeom>
+          <a:noFill/>
+          <a:ln>
+            <a:solidFill>
+              <a:schemeClr val="tx1"/>
+            </a:solidFill>
+          </a:ln>
+        </p:spPr>
+        <p:style>
+          <a:lnRef idx="1">
+            <a:schemeClr val="accent1"/>
+          </a:lnRef>
+          <a:fillRef idx="3">
+            <a:schemeClr val="accent1"/>
+          </a:fillRef>
+          <a:effectRef idx="2">
+            <a:schemeClr val="accent1"/>
+          </a:effectRef>
+          <a:fontRef idx="minor">
+            <a:schemeClr val="lt1"/>
+          </a:fontRef>
+        </p:style>
+        <p:txBody>
+          <a:bodyPr rtlCol="0" anchor="ctr"/>
+          <a:lstStyle/>
+          <a:p>
+            <a:pPr algn="ctr"/>
+            <a:r>
+              <a:rPr kumimoji="1" lang="en-US" altLang="zh-CN" dirty="0" err="1" smtClean="0">
+                <a:solidFill>
+                  <a:schemeClr val="tx1"/>
+                </a:solidFill>
+              </a:rPr>
+              <a:t>Convoluion</a:t>
+            </a:r>
+            <a:endParaRPr kumimoji="1" lang="en-US" altLang="zh-CN" dirty="0" smtClean="0">
+              <a:solidFill>
+                <a:schemeClr val="tx1"/>
+              </a:solidFill>
+            </a:endParaRPr>
+          </a:p>
+        </p:txBody>
+      </p:sp>
+      <p:sp>
+        <p:nvSpPr>
+          <p:cNvPr id="22" name="矩形 21"/>
+          <p:cNvSpPr/>
+          <p:nvPr/>
+        </p:nvSpPr>
+        <p:spPr>
+          <a:xfrm>
+            <a:off x="-2320925" y="4682237"/>
+            <a:ext cx="1828800" cy="731520"/>
+          </a:xfrm>
+          <a:prstGeom prst="rect">
+            <a:avLst/>
+          </a:prstGeom>
+          <a:noFill/>
+          <a:ln>
+            <a:solidFill>
+              <a:schemeClr val="tx1"/>
+            </a:solidFill>
+          </a:ln>
+        </p:spPr>
+        <p:style>
+          <a:lnRef idx="1">
+            <a:schemeClr val="accent1"/>
+          </a:lnRef>
+          <a:fillRef idx="3">
+            <a:schemeClr val="accent1"/>
+          </a:fillRef>
+          <a:effectRef idx="2">
+            <a:schemeClr val="accent1"/>
+          </a:effectRef>
+          <a:fontRef idx="minor">
+            <a:schemeClr val="lt1"/>
+          </a:fontRef>
+        </p:style>
+        <p:txBody>
+          <a:bodyPr rtlCol="0" anchor="ctr"/>
+          <a:lstStyle/>
+          <a:p>
+            <a:pPr algn="ctr"/>
+            <a:r>
+              <a:rPr kumimoji="1" lang="en-US" altLang="zh-CN" dirty="0" smtClean="0">
+                <a:solidFill>
+                  <a:schemeClr val="tx1"/>
+                </a:solidFill>
+              </a:rPr>
+              <a:t>Root</a:t>
+            </a:r>
+            <a:r>
+              <a:rPr kumimoji="1" lang="zh-CN" altLang="en-US" dirty="0" smtClean="0">
+                <a:solidFill>
+                  <a:schemeClr val="tx1"/>
+                </a:solidFill>
+              </a:rPr>
+              <a:t> </a:t>
+            </a:r>
+            <a:r>
+              <a:rPr kumimoji="1" lang="en-US" altLang="zh-CN" dirty="0" smtClean="0">
+                <a:solidFill>
+                  <a:schemeClr val="tx1"/>
+                </a:solidFill>
+              </a:rPr>
+              <a:t>Raise-Cosine</a:t>
+            </a:r>
+            <a:r>
+              <a:rPr kumimoji="1" lang="zh-CN" altLang="en-US" dirty="0" smtClean="0">
+                <a:solidFill>
+                  <a:schemeClr val="tx1"/>
+                </a:solidFill>
+              </a:rPr>
+              <a:t> </a:t>
+            </a:r>
+            <a:r>
+              <a:rPr kumimoji="1" lang="en-US" altLang="zh-CN" dirty="0" smtClean="0">
+                <a:solidFill>
+                  <a:schemeClr val="tx1"/>
+                </a:solidFill>
+              </a:rPr>
+              <a:t>Filter</a:t>
+            </a:r>
+          </a:p>
+        </p:txBody>
+      </p:sp>
+      <p:sp>
+        <p:nvSpPr>
+          <p:cNvPr id="6" name="矩形 5"/>
+          <p:cNvSpPr/>
+          <p:nvPr/>
+        </p:nvSpPr>
+        <p:spPr>
+          <a:xfrm>
+            <a:off x="4978400" y="656146"/>
+            <a:ext cx="1828800" cy="731520"/>
+          </a:xfrm>
+          <a:prstGeom prst="rect">
+            <a:avLst/>
+          </a:prstGeom>
+          <a:noFill/>
+          <a:ln>
+            <a:solidFill>
+              <a:schemeClr val="tx1"/>
+            </a:solidFill>
+          </a:ln>
+        </p:spPr>
+        <p:style>
+          <a:lnRef idx="1">
+            <a:schemeClr val="accent1"/>
+          </a:lnRef>
+          <a:fillRef idx="3">
+            <a:schemeClr val="accent1"/>
+          </a:fillRef>
+          <a:effectRef idx="2">
+            <a:schemeClr val="accent1"/>
+          </a:effectRef>
+          <a:fontRef idx="minor">
+            <a:schemeClr val="lt1"/>
+          </a:fontRef>
+        </p:style>
+        <p:txBody>
+          <a:bodyPr rtlCol="0" anchor="ctr"/>
+          <a:lstStyle/>
+          <a:p>
+            <a:pPr algn="ctr"/>
+            <a:r>
+              <a:rPr kumimoji="1" lang="en-US" altLang="zh-CN" dirty="0" smtClean="0">
+                <a:solidFill>
+                  <a:schemeClr val="tx1"/>
+                </a:solidFill>
+              </a:rPr>
+              <a:t>Packet</a:t>
+            </a:r>
+            <a:r>
+              <a:rPr kumimoji="1" lang="zh-CN" altLang="en-US" dirty="0" smtClean="0">
+                <a:solidFill>
+                  <a:schemeClr val="tx1"/>
+                </a:solidFill>
+              </a:rPr>
+              <a:t> </a:t>
+            </a:r>
+            <a:r>
+              <a:rPr kumimoji="1" lang="en-US" altLang="zh-CN" dirty="0" smtClean="0">
+                <a:solidFill>
+                  <a:schemeClr val="tx1"/>
+                </a:solidFill>
+              </a:rPr>
+              <a:t>Header</a:t>
+            </a:r>
+            <a:r>
+              <a:rPr kumimoji="1" lang="zh-CN" altLang="en-US" dirty="0" smtClean="0">
+                <a:solidFill>
+                  <a:schemeClr val="tx1"/>
+                </a:solidFill>
+              </a:rPr>
+              <a:t> </a:t>
+            </a:r>
+            <a:r>
+              <a:rPr kumimoji="1" lang="en-US" altLang="zh-CN" dirty="0" smtClean="0">
+                <a:solidFill>
+                  <a:schemeClr val="tx1"/>
+                </a:solidFill>
+              </a:rPr>
+              <a:t>Formatter</a:t>
+            </a:r>
+          </a:p>
+        </p:txBody>
+      </p:sp>
+      <p:sp>
+        <p:nvSpPr>
+          <p:cNvPr id="23" name="矩形 22"/>
+          <p:cNvSpPr/>
+          <p:nvPr/>
+        </p:nvSpPr>
+        <p:spPr>
+          <a:xfrm>
+            <a:off x="4978400" y="1625580"/>
+            <a:ext cx="1828800" cy="731520"/>
+          </a:xfrm>
+          <a:prstGeom prst="rect">
+            <a:avLst/>
+          </a:prstGeom>
+          <a:noFill/>
+          <a:ln>
+            <a:solidFill>
+              <a:schemeClr val="tx1"/>
+            </a:solidFill>
+          </a:ln>
+        </p:spPr>
+        <p:style>
+          <a:lnRef idx="1">
+            <a:schemeClr val="accent1"/>
+          </a:lnRef>
+          <a:fillRef idx="3">
+            <a:schemeClr val="accent1"/>
+          </a:fillRef>
+          <a:effectRef idx="2">
+            <a:schemeClr val="accent1"/>
+          </a:effectRef>
+          <a:fontRef idx="minor">
+            <a:schemeClr val="lt1"/>
+          </a:fontRef>
+        </p:style>
+        <p:txBody>
+          <a:bodyPr rtlCol="0" anchor="ctr"/>
+          <a:lstStyle/>
+          <a:p>
+            <a:pPr algn="ctr"/>
+            <a:r>
+              <a:rPr kumimoji="1" lang="en-US" altLang="zh-CN" dirty="0" smtClean="0">
+                <a:solidFill>
+                  <a:schemeClr val="tx1"/>
+                </a:solidFill>
+              </a:rPr>
+              <a:t>Repack</a:t>
+            </a:r>
+            <a:r>
+              <a:rPr kumimoji="1" lang="zh-CN" altLang="en-US" dirty="0" smtClean="0">
+                <a:solidFill>
+                  <a:schemeClr val="tx1"/>
+                </a:solidFill>
+              </a:rPr>
+              <a:t> </a:t>
+            </a:r>
+            <a:r>
+              <a:rPr kumimoji="1" lang="en-US" altLang="zh-CN" dirty="0" smtClean="0">
+                <a:solidFill>
+                  <a:schemeClr val="tx1"/>
+                </a:solidFill>
+              </a:rPr>
+              <a:t>Bits</a:t>
+            </a:r>
+          </a:p>
+        </p:txBody>
+      </p:sp>
+      <p:sp>
+        <p:nvSpPr>
+          <p:cNvPr id="25" name="矩形 24"/>
+          <p:cNvSpPr/>
+          <p:nvPr/>
+        </p:nvSpPr>
+        <p:spPr>
+          <a:xfrm>
+            <a:off x="0" y="3574119"/>
+            <a:ext cx="1828800" cy="731520"/>
+          </a:xfrm>
+          <a:prstGeom prst="rect">
+            <a:avLst/>
+          </a:prstGeom>
+          <a:noFill/>
+          <a:ln>
+            <a:solidFill>
+              <a:schemeClr val="tx1"/>
+            </a:solidFill>
+          </a:ln>
+        </p:spPr>
+        <p:style>
+          <a:lnRef idx="1">
+            <a:schemeClr val="accent1"/>
+          </a:lnRef>
+          <a:fillRef idx="3">
+            <a:schemeClr val="accent1"/>
+          </a:fillRef>
+          <a:effectRef idx="2">
+            <a:schemeClr val="accent1"/>
+          </a:effectRef>
+          <a:fontRef idx="minor">
+            <a:schemeClr val="lt1"/>
+          </a:fontRef>
+        </p:style>
+        <p:txBody>
+          <a:bodyPr rtlCol="0" anchor="ctr"/>
+          <a:lstStyle/>
+          <a:p>
+            <a:pPr algn="ctr"/>
+            <a:r>
+              <a:rPr kumimoji="1" lang="en-US" altLang="zh-CN" dirty="0" smtClean="0">
+                <a:solidFill>
+                  <a:schemeClr val="tx1"/>
+                </a:solidFill>
+              </a:rPr>
+              <a:t>Training</a:t>
+            </a:r>
+            <a:r>
+              <a:rPr kumimoji="1" lang="zh-CN" altLang="en-US" dirty="0" smtClean="0">
+                <a:solidFill>
+                  <a:schemeClr val="tx1"/>
+                </a:solidFill>
+              </a:rPr>
+              <a:t> </a:t>
+            </a:r>
+            <a:r>
+              <a:rPr kumimoji="1" lang="en-US" altLang="zh-CN" dirty="0" err="1" smtClean="0">
+                <a:solidFill>
+                  <a:schemeClr val="tx1"/>
+                </a:solidFill>
+              </a:rPr>
+              <a:t>Seq</a:t>
+            </a:r>
+            <a:endParaRPr kumimoji="1" lang="en-US" altLang="zh-CN" dirty="0" smtClean="0">
+              <a:solidFill>
+                <a:schemeClr val="tx1"/>
+              </a:solidFill>
+            </a:endParaRPr>
+          </a:p>
+        </p:txBody>
+      </p:sp>
+      <p:grpSp>
+        <p:nvGrpSpPr>
+          <p:cNvPr id="34" name="组 33"/>
+          <p:cNvGrpSpPr/>
+          <p:nvPr/>
+        </p:nvGrpSpPr>
+        <p:grpSpPr>
+          <a:xfrm>
+            <a:off x="-5081102" y="2649750"/>
+            <a:ext cx="381000" cy="381000"/>
+            <a:chOff x="2967523" y="3788897"/>
+            <a:chExt cx="381000" cy="381000"/>
+          </a:xfrm>
+        </p:grpSpPr>
+        <p:sp>
+          <p:nvSpPr>
+            <p:cNvPr id="27" name="椭圆 26"/>
+            <p:cNvSpPr/>
+            <p:nvPr/>
+          </p:nvSpPr>
+          <p:spPr>
+            <a:xfrm>
+              <a:off x="2967523" y="3788897"/>
+              <a:ext cx="381000" cy="381000"/>
+            </a:xfrm>
+            <a:prstGeom prst="ellipse">
+              <a:avLst/>
+            </a:prstGeom>
+            <a:noFill/>
+            <a:ln w="38100">
+              <a:solidFill>
+                <a:schemeClr val="tx1"/>
+              </a:solidFill>
+            </a:ln>
+          </p:spPr>
+          <p:style>
+            <a:lnRef idx="1">
+              <a:schemeClr val="accent1"/>
+            </a:lnRef>
+            <a:fillRef idx="3">
+              <a:schemeClr val="accent1"/>
+            </a:fillRef>
+            <a:effectRef idx="2">
+              <a:schemeClr val="accent1"/>
+            </a:effectRef>
+            <a:fontRef idx="minor">
+              <a:schemeClr val="lt1"/>
+            </a:fontRef>
+          </p:style>
+          <p:txBody>
+            <a:bodyPr rtlCol="0" anchor="ctr"/>
+            <a:lstStyle/>
+            <a:p>
+              <a:pPr algn="ctr"/>
+              <a:endParaRPr kumimoji="1" lang="zh-CN" altLang="en-US"/>
+            </a:p>
+          </p:txBody>
+        </p:sp>
+        <p:cxnSp>
+          <p:nvCxnSpPr>
+            <p:cNvPr id="28" name="直线连接符 27"/>
+            <p:cNvCxnSpPr>
+              <a:stCxn id="27" idx="2"/>
+              <a:endCxn id="27" idx="6"/>
+            </p:cNvCxnSpPr>
+            <p:nvPr/>
+          </p:nvCxnSpPr>
+          <p:spPr>
+            <a:xfrm>
+              <a:off x="2967523" y="3979397"/>
+              <a:ext cx="381000" cy="0"/>
+            </a:xfrm>
+            <a:prstGeom prst="line">
+              <a:avLst/>
+            </a:prstGeom>
+            <a:ln w="38100">
+              <a:solidFill>
+                <a:schemeClr val="tx1"/>
+              </a:solidFill>
+            </a:ln>
+          </p:spPr>
+          <p:style>
+            <a:lnRef idx="2">
+              <a:schemeClr val="accent1"/>
+            </a:lnRef>
+            <a:fillRef idx="0">
+              <a:schemeClr val="accent1"/>
+            </a:fillRef>
+            <a:effectRef idx="1">
+              <a:schemeClr val="accent1"/>
+            </a:effectRef>
+            <a:fontRef idx="minor">
+              <a:schemeClr val="tx1"/>
+            </a:fontRef>
+          </p:style>
+        </p:cxnSp>
+        <p:cxnSp>
+          <p:nvCxnSpPr>
+            <p:cNvPr id="29" name="直线连接符 28"/>
+            <p:cNvCxnSpPr>
+              <a:stCxn id="27" idx="0"/>
+              <a:endCxn id="27" idx="4"/>
+            </p:cNvCxnSpPr>
+            <p:nvPr/>
+          </p:nvCxnSpPr>
+          <p:spPr>
+            <a:xfrm>
+              <a:off x="3158023" y="3788897"/>
+              <a:ext cx="0" cy="381000"/>
+            </a:xfrm>
+            <a:prstGeom prst="line">
+              <a:avLst/>
+            </a:prstGeom>
+            <a:ln w="38100">
+              <a:solidFill>
+                <a:schemeClr val="tx1"/>
+              </a:solidFill>
+            </a:ln>
+          </p:spPr>
+          <p:style>
+            <a:lnRef idx="2">
+              <a:schemeClr val="accent1"/>
+            </a:lnRef>
+            <a:fillRef idx="0">
+              <a:schemeClr val="accent1"/>
+            </a:fillRef>
+            <a:effectRef idx="1">
+              <a:schemeClr val="accent1"/>
+            </a:effectRef>
+            <a:fontRef idx="minor">
+              <a:schemeClr val="tx1"/>
+            </a:fontRef>
+          </p:style>
+        </p:cxnSp>
+      </p:grpSp>
+      <p:cxnSp>
+        <p:nvCxnSpPr>
+          <p:cNvPr id="37" name="肘形连接符 36"/>
+          <p:cNvCxnSpPr>
+            <a:stCxn id="5" idx="3"/>
+            <a:endCxn id="6" idx="1"/>
+          </p:cNvCxnSpPr>
+          <p:nvPr/>
+        </p:nvCxnSpPr>
+        <p:spPr>
+          <a:xfrm flipV="1">
+            <a:off x="4392211" y="1021906"/>
+            <a:ext cx="586189" cy="484717"/>
+          </a:xfrm>
+          <a:prstGeom prst="bentConnector3">
+            <a:avLst/>
+          </a:prstGeom>
+          <a:ln>
+            <a:solidFill>
+              <a:schemeClr val="tx1"/>
+            </a:solidFill>
+            <a:tailEnd type="arrow"/>
+          </a:ln>
+        </p:spPr>
+        <p:style>
+          <a:lnRef idx="2">
+            <a:schemeClr val="accent1"/>
+          </a:lnRef>
+          <a:fillRef idx="0">
+            <a:schemeClr val="accent1"/>
+          </a:fillRef>
+          <a:effectRef idx="1">
+            <a:schemeClr val="accent1"/>
+          </a:effectRef>
+          <a:fontRef idx="minor">
+            <a:schemeClr val="tx1"/>
+          </a:fontRef>
+        </p:style>
+      </p:cxnSp>
+      <p:cxnSp>
+        <p:nvCxnSpPr>
+          <p:cNvPr id="39" name="肘形连接符 38"/>
+          <p:cNvCxnSpPr>
+            <a:stCxn id="5" idx="3"/>
+            <a:endCxn id="23" idx="1"/>
+          </p:cNvCxnSpPr>
+          <p:nvPr/>
+        </p:nvCxnSpPr>
+        <p:spPr>
+          <a:xfrm>
+            <a:off x="4392211" y="1506623"/>
+            <a:ext cx="586189" cy="484717"/>
+          </a:xfrm>
+          <a:prstGeom prst="bentConnector3">
+            <a:avLst/>
+          </a:prstGeom>
+          <a:ln>
+            <a:solidFill>
+              <a:schemeClr val="tx1"/>
+            </a:solidFill>
+            <a:tailEnd type="arrow"/>
+          </a:ln>
+        </p:spPr>
+        <p:style>
+          <a:lnRef idx="2">
+            <a:schemeClr val="accent1"/>
+          </a:lnRef>
+          <a:fillRef idx="0">
+            <a:schemeClr val="accent1"/>
+          </a:fillRef>
+          <a:effectRef idx="1">
+            <a:schemeClr val="accent1"/>
+          </a:effectRef>
+          <a:fontRef idx="minor">
+            <a:schemeClr val="tx1"/>
+          </a:fontRef>
+        </p:style>
+      </p:cxnSp>
+      <p:cxnSp>
+        <p:nvCxnSpPr>
+          <p:cNvPr id="43" name="直线箭头连接符 42"/>
+          <p:cNvCxnSpPr>
+            <a:stCxn id="4" idx="3"/>
+            <a:endCxn id="5" idx="1"/>
+          </p:cNvCxnSpPr>
+          <p:nvPr/>
+        </p:nvCxnSpPr>
+        <p:spPr>
+          <a:xfrm>
+            <a:off x="1828800" y="1482049"/>
+            <a:ext cx="734611" cy="24574"/>
+          </a:xfrm>
+          <a:prstGeom prst="straightConnector1">
+            <a:avLst/>
+          </a:prstGeom>
+          <a:ln>
+            <a:solidFill>
+              <a:schemeClr val="tx1"/>
+            </a:solidFill>
+            <a:tailEnd type="arrow"/>
+          </a:ln>
+        </p:spPr>
+        <p:style>
+          <a:lnRef idx="2">
+            <a:schemeClr val="accent1"/>
+          </a:lnRef>
+          <a:fillRef idx="0">
+            <a:schemeClr val="accent1"/>
+          </a:fillRef>
+          <a:effectRef idx="1">
+            <a:schemeClr val="accent1"/>
+          </a:effectRef>
+          <a:fontRef idx="minor">
+            <a:schemeClr val="tx1"/>
+          </a:fontRef>
+        </p:style>
+      </p:cxnSp>
+    </p:spTree>
+    <p:extLst>
+      <p:ext uri="{BB962C8B-B14F-4D97-AF65-F5344CB8AC3E}">
+        <p14:creationId xmlns:p14="http://schemas.microsoft.com/office/powerpoint/2010/main" val="3085580383"/>
+      </p:ext>
+    </p:extLst>
+  </p:cSld>
+  <p:clrMapOvr>
+    <a:masterClrMapping/>
+  </p:clrMapOvr>
+</p:sld>
+</file>
+
 <file path=ppt/theme/theme1.xml><?xml version="1.0" encoding="utf-8"?>
 <a:theme xmlns:a="http://schemas.openxmlformats.org/drawingml/2006/main" name="Office 主题">
   <a:themeElements>

</xml_diff>

<commit_message>
insert some new figures
</commit_message>
<xml_diff>
--- a/Documents/get_start_with_gr-cdma/figure/figure_source.pptx
+++ b/Documents/get_start_with_gr-cdma/figure/figure_source.pptx
@@ -9,8 +9,6 @@
     <p:sldId id="257" r:id="rId3"/>
     <p:sldId id="258" r:id="rId4"/>
     <p:sldId id="259" r:id="rId5"/>
-    <p:sldId id="260" r:id="rId6"/>
-    <p:sldId id="261" r:id="rId7"/>
   </p:sldIdLst>
   <p:sldSz cx="9144000" cy="6858000" type="screen4x3"/>
   <p:notesSz cx="6858000" cy="9144000"/>
@@ -293,7 +291,7 @@
           <a:p>
             <a:fld id="{74A26211-2DA7-E74A-AB9C-A5C9F972D1F5}" type="datetimeFigureOut">
               <a:rPr kumimoji="1" lang="zh-CN" altLang="en-US" smtClean="0"/>
-              <a:t>6/18/16</a:t>
+              <a:t>5/19/16</a:t>
             </a:fld>
             <a:endParaRPr kumimoji="1" lang="zh-CN" altLang="en-US"/>
           </a:p>
@@ -463,7 +461,7 @@
           <a:p>
             <a:fld id="{74A26211-2DA7-E74A-AB9C-A5C9F972D1F5}" type="datetimeFigureOut">
               <a:rPr kumimoji="1" lang="zh-CN" altLang="en-US" smtClean="0"/>
-              <a:t>6/18/16</a:t>
+              <a:t>5/19/16</a:t>
             </a:fld>
             <a:endParaRPr kumimoji="1" lang="zh-CN" altLang="en-US"/>
           </a:p>
@@ -643,7 +641,7 @@
           <a:p>
             <a:fld id="{74A26211-2DA7-E74A-AB9C-A5C9F972D1F5}" type="datetimeFigureOut">
               <a:rPr kumimoji="1" lang="zh-CN" altLang="en-US" smtClean="0"/>
-              <a:t>6/18/16</a:t>
+              <a:t>5/19/16</a:t>
             </a:fld>
             <a:endParaRPr kumimoji="1" lang="zh-CN" altLang="en-US"/>
           </a:p>
@@ -813,7 +811,7 @@
           <a:p>
             <a:fld id="{74A26211-2DA7-E74A-AB9C-A5C9F972D1F5}" type="datetimeFigureOut">
               <a:rPr kumimoji="1" lang="zh-CN" altLang="en-US" smtClean="0"/>
-              <a:t>6/18/16</a:t>
+              <a:t>5/19/16</a:t>
             </a:fld>
             <a:endParaRPr kumimoji="1" lang="zh-CN" altLang="en-US"/>
           </a:p>
@@ -1059,7 +1057,7 @@
           <a:p>
             <a:fld id="{74A26211-2DA7-E74A-AB9C-A5C9F972D1F5}" type="datetimeFigureOut">
               <a:rPr kumimoji="1" lang="zh-CN" altLang="en-US" smtClean="0"/>
-              <a:t>6/18/16</a:t>
+              <a:t>5/19/16</a:t>
             </a:fld>
             <a:endParaRPr kumimoji="1" lang="zh-CN" altLang="en-US"/>
           </a:p>
@@ -1347,7 +1345,7 @@
           <a:p>
             <a:fld id="{74A26211-2DA7-E74A-AB9C-A5C9F972D1F5}" type="datetimeFigureOut">
               <a:rPr kumimoji="1" lang="zh-CN" altLang="en-US" smtClean="0"/>
-              <a:t>6/18/16</a:t>
+              <a:t>5/19/16</a:t>
             </a:fld>
             <a:endParaRPr kumimoji="1" lang="zh-CN" altLang="en-US"/>
           </a:p>
@@ -1769,7 +1767,7 @@
           <a:p>
             <a:fld id="{74A26211-2DA7-E74A-AB9C-A5C9F972D1F5}" type="datetimeFigureOut">
               <a:rPr kumimoji="1" lang="zh-CN" altLang="en-US" smtClean="0"/>
-              <a:t>6/18/16</a:t>
+              <a:t>5/19/16</a:t>
             </a:fld>
             <a:endParaRPr kumimoji="1" lang="zh-CN" altLang="en-US"/>
           </a:p>
@@ -1887,7 +1885,7 @@
           <a:p>
             <a:fld id="{74A26211-2DA7-E74A-AB9C-A5C9F972D1F5}" type="datetimeFigureOut">
               <a:rPr kumimoji="1" lang="zh-CN" altLang="en-US" smtClean="0"/>
-              <a:t>6/18/16</a:t>
+              <a:t>5/19/16</a:t>
             </a:fld>
             <a:endParaRPr kumimoji="1" lang="zh-CN" altLang="en-US"/>
           </a:p>
@@ -1982,7 +1980,7 @@
           <a:p>
             <a:fld id="{74A26211-2DA7-E74A-AB9C-A5C9F972D1F5}" type="datetimeFigureOut">
               <a:rPr kumimoji="1" lang="zh-CN" altLang="en-US" smtClean="0"/>
-              <a:t>6/18/16</a:t>
+              <a:t>5/19/16</a:t>
             </a:fld>
             <a:endParaRPr kumimoji="1" lang="zh-CN" altLang="en-US"/>
           </a:p>
@@ -2259,7 +2257,7 @@
           <a:p>
             <a:fld id="{74A26211-2DA7-E74A-AB9C-A5C9F972D1F5}" type="datetimeFigureOut">
               <a:rPr kumimoji="1" lang="zh-CN" altLang="en-US" smtClean="0"/>
-              <a:t>6/18/16</a:t>
+              <a:t>5/19/16</a:t>
             </a:fld>
             <a:endParaRPr kumimoji="1" lang="zh-CN" altLang="en-US"/>
           </a:p>
@@ -2512,7 +2510,7 @@
           <a:p>
             <a:fld id="{74A26211-2DA7-E74A-AB9C-A5C9F972D1F5}" type="datetimeFigureOut">
               <a:rPr kumimoji="1" lang="zh-CN" altLang="en-US" smtClean="0"/>
-              <a:t>6/18/16</a:t>
+              <a:t>5/19/16</a:t>
             </a:fld>
             <a:endParaRPr kumimoji="1" lang="zh-CN" altLang="en-US"/>
           </a:p>
@@ -2725,7 +2723,7 @@
           <a:p>
             <a:fld id="{74A26211-2DA7-E74A-AB9C-A5C9F972D1F5}" type="datetimeFigureOut">
               <a:rPr kumimoji="1" lang="zh-CN" altLang="en-US" smtClean="0"/>
-              <a:t>6/18/16</a:t>
+              <a:t>5/19/16</a:t>
             </a:fld>
             <a:endParaRPr kumimoji="1" lang="zh-CN" altLang="en-US"/>
           </a:p>
@@ -17508,3919 +17506,6 @@
 </p:sld>
 </file>
 
-<file path=ppt/slides/slide5.xml><?xml version="1.0" encoding="utf-8"?>
-<p:sld xmlns:a="http://schemas.openxmlformats.org/drawingml/2006/main" xmlns:r="http://schemas.openxmlformats.org/officeDocument/2006/relationships" xmlns:p="http://schemas.openxmlformats.org/presentationml/2006/main">
-  <p:cSld>
-    <p:spTree>
-      <p:nvGrpSpPr>
-        <p:cNvPr id="1" name=""/>
-        <p:cNvGrpSpPr/>
-        <p:nvPr/>
-      </p:nvGrpSpPr>
-      <p:grpSpPr>
-        <a:xfrm>
-          <a:off x="0" y="0"/>
-          <a:ext cx="0" cy="0"/>
-          <a:chOff x="0" y="0"/>
-          <a:chExt cx="0" cy="0"/>
-        </a:xfrm>
-      </p:grpSpPr>
-      <p:sp>
-        <p:nvSpPr>
-          <p:cNvPr id="4" name="矩形 3"/>
-          <p:cNvSpPr/>
-          <p:nvPr/>
-        </p:nvSpPr>
-        <p:spPr>
-          <a:xfrm>
-            <a:off x="-1736725" y="1138630"/>
-            <a:ext cx="1828800" cy="731520"/>
-          </a:xfrm>
-          <a:prstGeom prst="rect">
-            <a:avLst/>
-          </a:prstGeom>
-          <a:noFill/>
-          <a:ln>
-            <a:solidFill>
-              <a:schemeClr val="tx1"/>
-            </a:solidFill>
-          </a:ln>
-        </p:spPr>
-        <p:style>
-          <a:lnRef idx="1">
-            <a:schemeClr val="accent1"/>
-          </a:lnRef>
-          <a:fillRef idx="3">
-            <a:schemeClr val="accent1"/>
-          </a:fillRef>
-          <a:effectRef idx="2">
-            <a:schemeClr val="accent1"/>
-          </a:effectRef>
-          <a:fontRef idx="minor">
-            <a:schemeClr val="lt1"/>
-          </a:fontRef>
-        </p:style>
-        <p:txBody>
-          <a:bodyPr rtlCol="0" anchor="ctr"/>
-          <a:lstStyle/>
-          <a:p>
-            <a:pPr algn="ctr"/>
-            <a:r>
-              <a:rPr kumimoji="1" lang="en-US" altLang="zh-CN" dirty="0" smtClean="0">
-                <a:solidFill>
-                  <a:schemeClr val="tx1"/>
-                </a:solidFill>
-              </a:rPr>
-              <a:t>Input</a:t>
-            </a:r>
-            <a:endParaRPr kumimoji="1" lang="zh-CN" altLang="en-US" dirty="0">
-              <a:solidFill>
-                <a:schemeClr val="tx1"/>
-              </a:solidFill>
-            </a:endParaRPr>
-          </a:p>
-        </p:txBody>
-      </p:sp>
-      <p:sp>
-        <p:nvSpPr>
-          <p:cNvPr id="5" name="矩形 4"/>
-          <p:cNvSpPr/>
-          <p:nvPr/>
-        </p:nvSpPr>
-        <p:spPr>
-          <a:xfrm>
-            <a:off x="810260" y="1138630"/>
-            <a:ext cx="1828800" cy="731520"/>
-          </a:xfrm>
-          <a:prstGeom prst="rect">
-            <a:avLst/>
-          </a:prstGeom>
-          <a:noFill/>
-          <a:ln>
-            <a:solidFill>
-              <a:schemeClr val="tx1"/>
-            </a:solidFill>
-          </a:ln>
-        </p:spPr>
-        <p:style>
-          <a:lnRef idx="1">
-            <a:schemeClr val="accent1"/>
-          </a:lnRef>
-          <a:fillRef idx="3">
-            <a:schemeClr val="accent1"/>
-          </a:fillRef>
-          <a:effectRef idx="2">
-            <a:schemeClr val="accent1"/>
-          </a:effectRef>
-          <a:fontRef idx="minor">
-            <a:schemeClr val="lt1"/>
-          </a:fontRef>
-        </p:style>
-        <p:txBody>
-          <a:bodyPr rtlCol="0" anchor="ctr"/>
-          <a:lstStyle/>
-          <a:p>
-            <a:pPr algn="ctr"/>
-            <a:r>
-              <a:rPr kumimoji="1" lang="en-US" altLang="zh-CN" dirty="0" smtClean="0">
-                <a:solidFill>
-                  <a:schemeClr val="tx1"/>
-                </a:solidFill>
-              </a:rPr>
-              <a:t>Pulse</a:t>
-            </a:r>
-            <a:r>
-              <a:rPr kumimoji="1" lang="en-US" altLang="zh-CN" dirty="0" smtClean="0">
-                <a:solidFill>
-                  <a:schemeClr val="tx1"/>
-                </a:solidFill>
-              </a:rPr>
-              <a:t>-wise</a:t>
-            </a:r>
-          </a:p>
-          <a:p>
-            <a:pPr algn="ctr"/>
-            <a:r>
-              <a:rPr kumimoji="1" lang="en-US" altLang="zh-CN" dirty="0" smtClean="0">
-                <a:solidFill>
-                  <a:schemeClr val="tx1"/>
-                </a:solidFill>
-              </a:rPr>
-              <a:t>Matched</a:t>
-            </a:r>
-            <a:r>
-              <a:rPr kumimoji="1" lang="zh-CN" altLang="en-US" dirty="0" smtClean="0">
-                <a:solidFill>
-                  <a:schemeClr val="tx1"/>
-                </a:solidFill>
-              </a:rPr>
-              <a:t> </a:t>
-            </a:r>
-            <a:r>
-              <a:rPr kumimoji="1" lang="en-US" altLang="zh-CN" dirty="0" smtClean="0">
-                <a:solidFill>
-                  <a:schemeClr val="tx1"/>
-                </a:solidFill>
-              </a:rPr>
-              <a:t>Filter</a:t>
-            </a:r>
-            <a:endParaRPr kumimoji="1" lang="zh-CN" altLang="en-US" dirty="0">
-              <a:solidFill>
-                <a:schemeClr val="tx1"/>
-              </a:solidFill>
-            </a:endParaRPr>
-          </a:p>
-        </p:txBody>
-      </p:sp>
-      <p:sp>
-        <p:nvSpPr>
-          <p:cNvPr id="6" name="矩形 5"/>
-          <p:cNvSpPr/>
-          <p:nvPr/>
-        </p:nvSpPr>
-        <p:spPr>
-          <a:xfrm>
-            <a:off x="3556719" y="349473"/>
-            <a:ext cx="1828800" cy="731520"/>
-          </a:xfrm>
-          <a:prstGeom prst="rect">
-            <a:avLst/>
-          </a:prstGeom>
-          <a:noFill/>
-          <a:ln>
-            <a:solidFill>
-              <a:schemeClr val="tx1"/>
-            </a:solidFill>
-          </a:ln>
-        </p:spPr>
-        <p:style>
-          <a:lnRef idx="1">
-            <a:schemeClr val="accent1"/>
-          </a:lnRef>
-          <a:fillRef idx="3">
-            <a:schemeClr val="accent1"/>
-          </a:fillRef>
-          <a:effectRef idx="2">
-            <a:schemeClr val="accent1"/>
-          </a:effectRef>
-          <a:fontRef idx="minor">
-            <a:schemeClr val="lt1"/>
-          </a:fontRef>
-        </p:style>
-        <p:txBody>
-          <a:bodyPr rtlCol="0" anchor="ctr"/>
-          <a:lstStyle/>
-          <a:p>
-            <a:pPr algn="ctr"/>
-            <a:r>
-              <a:rPr kumimoji="1" lang="en-US" altLang="zh-CN" dirty="0" err="1" smtClean="0">
-                <a:solidFill>
-                  <a:schemeClr val="tx1"/>
-                </a:solidFill>
-              </a:rPr>
-              <a:t>Freq</a:t>
-            </a:r>
-            <a:r>
-              <a:rPr kumimoji="1" lang="zh-CN" altLang="zh-CN" dirty="0">
-                <a:solidFill>
-                  <a:schemeClr val="tx1"/>
-                </a:solidFill>
-              </a:rPr>
-              <a:t> </a:t>
-            </a:r>
-            <a:r>
-              <a:rPr kumimoji="1" lang="en-US" altLang="zh-CN" dirty="0" smtClean="0">
-                <a:solidFill>
-                  <a:schemeClr val="tx1"/>
-                </a:solidFill>
-              </a:rPr>
-              <a:t>&amp;</a:t>
-            </a:r>
-            <a:r>
-              <a:rPr kumimoji="1" lang="zh-CN" altLang="en-US" dirty="0" smtClean="0">
-                <a:solidFill>
-                  <a:schemeClr val="tx1"/>
-                </a:solidFill>
-              </a:rPr>
-              <a:t> </a:t>
-            </a:r>
-            <a:r>
-              <a:rPr kumimoji="1" lang="en-US" altLang="zh-CN" dirty="0" smtClean="0">
-                <a:solidFill>
-                  <a:schemeClr val="tx1"/>
-                </a:solidFill>
-              </a:rPr>
-              <a:t>Timing</a:t>
-            </a:r>
-          </a:p>
-          <a:p>
-            <a:pPr algn="ctr"/>
-            <a:r>
-              <a:rPr kumimoji="1" lang="en-US" altLang="zh-CN" dirty="0" smtClean="0">
-                <a:solidFill>
-                  <a:schemeClr val="tx1"/>
-                </a:solidFill>
-              </a:rPr>
-              <a:t>Estimator</a:t>
-            </a:r>
-            <a:endParaRPr kumimoji="1" lang="en-US" altLang="zh-CN" dirty="0" smtClean="0">
-              <a:solidFill>
-                <a:schemeClr val="tx1"/>
-              </a:solidFill>
-            </a:endParaRPr>
-          </a:p>
-        </p:txBody>
-      </p:sp>
-      <p:sp>
-        <p:nvSpPr>
-          <p:cNvPr id="8" name="矩形 7"/>
-          <p:cNvSpPr/>
-          <p:nvPr/>
-        </p:nvSpPr>
-        <p:spPr>
-          <a:xfrm>
-            <a:off x="5110480" y="2028378"/>
-            <a:ext cx="1828800" cy="731520"/>
-          </a:xfrm>
-          <a:prstGeom prst="rect">
-            <a:avLst/>
-          </a:prstGeom>
-          <a:noFill/>
-          <a:ln>
-            <a:solidFill>
-              <a:schemeClr val="tx1"/>
-            </a:solidFill>
-          </a:ln>
-        </p:spPr>
-        <p:style>
-          <a:lnRef idx="1">
-            <a:schemeClr val="accent1"/>
-          </a:lnRef>
-          <a:fillRef idx="3">
-            <a:schemeClr val="accent1"/>
-          </a:fillRef>
-          <a:effectRef idx="2">
-            <a:schemeClr val="accent1"/>
-          </a:effectRef>
-          <a:fontRef idx="minor">
-            <a:schemeClr val="lt1"/>
-          </a:fontRef>
-        </p:style>
-        <p:txBody>
-          <a:bodyPr rtlCol="0" anchor="ctr"/>
-          <a:lstStyle/>
-          <a:p>
-            <a:pPr algn="ctr"/>
-            <a:r>
-              <a:rPr kumimoji="1" lang="en-US" altLang="zh-CN" dirty="0" smtClean="0">
-                <a:solidFill>
-                  <a:schemeClr val="tx1"/>
-                </a:solidFill>
-              </a:rPr>
-              <a:t>Chopper</a:t>
-            </a:r>
-          </a:p>
-        </p:txBody>
-      </p:sp>
-      <p:sp>
-        <p:nvSpPr>
-          <p:cNvPr id="9" name="矩形 8"/>
-          <p:cNvSpPr/>
-          <p:nvPr/>
-        </p:nvSpPr>
-        <p:spPr>
-          <a:xfrm>
-            <a:off x="7516411" y="407110"/>
-            <a:ext cx="1828800" cy="731520"/>
-          </a:xfrm>
-          <a:prstGeom prst="rect">
-            <a:avLst/>
-          </a:prstGeom>
-          <a:noFill/>
-          <a:ln>
-            <a:solidFill>
-              <a:schemeClr val="tx1"/>
-            </a:solidFill>
-          </a:ln>
-        </p:spPr>
-        <p:style>
-          <a:lnRef idx="1">
-            <a:schemeClr val="accent1"/>
-          </a:lnRef>
-          <a:fillRef idx="3">
-            <a:schemeClr val="accent1"/>
-          </a:fillRef>
-          <a:effectRef idx="2">
-            <a:schemeClr val="accent1"/>
-          </a:effectRef>
-          <a:fontRef idx="minor">
-            <a:schemeClr val="lt1"/>
-          </a:fontRef>
-        </p:style>
-        <p:txBody>
-          <a:bodyPr rtlCol="0" anchor="ctr"/>
-          <a:lstStyle/>
-          <a:p>
-            <a:pPr algn="ctr"/>
-            <a:r>
-              <a:rPr kumimoji="1" lang="en-US" altLang="zh-CN" dirty="0" smtClean="0">
-                <a:solidFill>
-                  <a:schemeClr val="tx1"/>
-                </a:solidFill>
-              </a:rPr>
-              <a:t>Amp</a:t>
-            </a:r>
-            <a:r>
-              <a:rPr kumimoji="1" lang="zh-CN" altLang="en-US" dirty="0" smtClean="0">
-                <a:solidFill>
-                  <a:schemeClr val="tx1"/>
-                </a:solidFill>
-              </a:rPr>
-              <a:t> </a:t>
-            </a:r>
-            <a:r>
-              <a:rPr kumimoji="1" lang="en-US" altLang="zh-CN" dirty="0" smtClean="0">
-                <a:solidFill>
-                  <a:schemeClr val="tx1"/>
-                </a:solidFill>
-              </a:rPr>
-              <a:t>&amp;</a:t>
-            </a:r>
-            <a:r>
-              <a:rPr kumimoji="1" lang="zh-CN" altLang="en-US" dirty="0" smtClean="0">
-                <a:solidFill>
-                  <a:schemeClr val="tx1"/>
-                </a:solidFill>
-              </a:rPr>
-              <a:t> </a:t>
-            </a:r>
-            <a:r>
-              <a:rPr kumimoji="1" lang="en-US" altLang="zh-CN" dirty="0" err="1" smtClean="0">
-                <a:solidFill>
-                  <a:schemeClr val="tx1"/>
-                </a:solidFill>
-              </a:rPr>
-              <a:t>Var</a:t>
-            </a:r>
-            <a:endParaRPr kumimoji="1" lang="en-US" altLang="zh-CN" dirty="0">
-              <a:solidFill>
-                <a:schemeClr val="tx1"/>
-              </a:solidFill>
-            </a:endParaRPr>
-          </a:p>
-          <a:p>
-            <a:pPr algn="ctr"/>
-            <a:r>
-              <a:rPr kumimoji="1" lang="en-US" altLang="zh-CN" dirty="0" smtClean="0">
-                <a:solidFill>
-                  <a:schemeClr val="tx1"/>
-                </a:solidFill>
-              </a:rPr>
-              <a:t>Estimator</a:t>
-            </a:r>
-          </a:p>
-        </p:txBody>
-      </p:sp>
-      <p:sp>
-        <p:nvSpPr>
-          <p:cNvPr id="10" name="矩形 9"/>
-          <p:cNvSpPr/>
-          <p:nvPr/>
-        </p:nvSpPr>
-        <p:spPr>
-          <a:xfrm>
-            <a:off x="7516411" y="2584638"/>
-            <a:ext cx="1828800" cy="731520"/>
-          </a:xfrm>
-          <a:prstGeom prst="rect">
-            <a:avLst/>
-          </a:prstGeom>
-          <a:noFill/>
-          <a:ln>
-            <a:solidFill>
-              <a:schemeClr val="tx1"/>
-            </a:solidFill>
-          </a:ln>
-        </p:spPr>
-        <p:style>
-          <a:lnRef idx="1">
-            <a:schemeClr val="accent1"/>
-          </a:lnRef>
-          <a:fillRef idx="3">
-            <a:schemeClr val="accent1"/>
-          </a:fillRef>
-          <a:effectRef idx="2">
-            <a:schemeClr val="accent1"/>
-          </a:effectRef>
-          <a:fontRef idx="minor">
-            <a:schemeClr val="lt1"/>
-          </a:fontRef>
-        </p:style>
-        <p:txBody>
-          <a:bodyPr rtlCol="0" anchor="ctr"/>
-          <a:lstStyle/>
-          <a:p>
-            <a:pPr algn="ctr"/>
-            <a:r>
-              <a:rPr kumimoji="1" lang="en-US" altLang="zh-CN" dirty="0" smtClean="0">
-                <a:solidFill>
-                  <a:schemeClr val="tx1"/>
-                </a:solidFill>
-              </a:rPr>
-              <a:t>Decimator</a:t>
-            </a:r>
-          </a:p>
-          <a:p>
-            <a:pPr algn="ctr"/>
-            <a:r>
-              <a:rPr kumimoji="1" lang="en-US" altLang="zh-CN" dirty="0" smtClean="0">
-                <a:solidFill>
-                  <a:schemeClr val="tx1"/>
-                </a:solidFill>
-              </a:rPr>
-              <a:t>for</a:t>
-            </a:r>
-            <a:r>
-              <a:rPr kumimoji="1" lang="zh-CN" altLang="en-US" dirty="0" smtClean="0">
-                <a:solidFill>
-                  <a:schemeClr val="tx1"/>
-                </a:solidFill>
-              </a:rPr>
-              <a:t> </a:t>
-            </a:r>
-            <a:r>
-              <a:rPr kumimoji="1" lang="en-US" altLang="zh-CN" dirty="0" smtClean="0">
-                <a:solidFill>
-                  <a:schemeClr val="tx1"/>
-                </a:solidFill>
-              </a:rPr>
-              <a:t>data</a:t>
-            </a:r>
-            <a:r>
-              <a:rPr kumimoji="1" lang="zh-CN" altLang="en-US" dirty="0" smtClean="0">
-                <a:solidFill>
-                  <a:schemeClr val="tx1"/>
-                </a:solidFill>
-              </a:rPr>
-              <a:t> </a:t>
-            </a:r>
-            <a:r>
-              <a:rPr kumimoji="1" lang="en-US" altLang="zh-CN" dirty="0" err="1" smtClean="0">
-                <a:solidFill>
-                  <a:schemeClr val="tx1"/>
-                </a:solidFill>
-              </a:rPr>
-              <a:t>seq</a:t>
-            </a:r>
-            <a:endParaRPr kumimoji="1" lang="en-US" altLang="zh-CN" dirty="0" smtClean="0">
-              <a:solidFill>
-                <a:schemeClr val="tx1"/>
-              </a:solidFill>
-            </a:endParaRPr>
-          </a:p>
-        </p:txBody>
-      </p:sp>
-      <p:sp>
-        <p:nvSpPr>
-          <p:cNvPr id="11" name="矩形 10"/>
-          <p:cNvSpPr/>
-          <p:nvPr/>
-        </p:nvSpPr>
-        <p:spPr>
-          <a:xfrm>
-            <a:off x="5904230" y="3761592"/>
-            <a:ext cx="1828800" cy="731520"/>
-          </a:xfrm>
-          <a:prstGeom prst="rect">
-            <a:avLst/>
-          </a:prstGeom>
-          <a:noFill/>
-          <a:ln>
-            <a:solidFill>
-              <a:schemeClr val="tx1"/>
-            </a:solidFill>
-          </a:ln>
-        </p:spPr>
-        <p:style>
-          <a:lnRef idx="1">
-            <a:schemeClr val="accent1"/>
-          </a:lnRef>
-          <a:fillRef idx="3">
-            <a:schemeClr val="accent1"/>
-          </a:fillRef>
-          <a:effectRef idx="2">
-            <a:schemeClr val="accent1"/>
-          </a:effectRef>
-          <a:fontRef idx="minor">
-            <a:schemeClr val="lt1"/>
-          </a:fontRef>
-        </p:style>
-        <p:txBody>
-          <a:bodyPr rtlCol="0" anchor="ctr"/>
-          <a:lstStyle/>
-          <a:p>
-            <a:pPr algn="ctr"/>
-            <a:r>
-              <a:rPr kumimoji="1" lang="en-US" altLang="zh-CN" dirty="0" smtClean="0">
-                <a:solidFill>
-                  <a:schemeClr val="tx1"/>
-                </a:solidFill>
-              </a:rPr>
-              <a:t>Get</a:t>
-            </a:r>
-            <a:r>
-              <a:rPr kumimoji="1" lang="zh-CN" altLang="en-US" dirty="0" smtClean="0">
-                <a:solidFill>
-                  <a:schemeClr val="tx1"/>
-                </a:solidFill>
-              </a:rPr>
-              <a:t> </a:t>
-            </a:r>
-            <a:r>
-              <a:rPr kumimoji="1" lang="en-US" altLang="zh-CN" dirty="0" smtClean="0">
-                <a:solidFill>
-                  <a:schemeClr val="tx1"/>
-                </a:solidFill>
-              </a:rPr>
-              <a:t>Header</a:t>
-            </a:r>
-          </a:p>
-        </p:txBody>
-      </p:sp>
-      <p:sp>
-        <p:nvSpPr>
-          <p:cNvPr id="12" name="矩形 11"/>
-          <p:cNvSpPr/>
-          <p:nvPr/>
-        </p:nvSpPr>
-        <p:spPr>
-          <a:xfrm>
-            <a:off x="5904230" y="4895702"/>
-            <a:ext cx="1828800" cy="731520"/>
-          </a:xfrm>
-          <a:prstGeom prst="rect">
-            <a:avLst/>
-          </a:prstGeom>
-          <a:noFill/>
-          <a:ln>
-            <a:solidFill>
-              <a:schemeClr val="tx1"/>
-            </a:solidFill>
-          </a:ln>
-        </p:spPr>
-        <p:style>
-          <a:lnRef idx="1">
-            <a:schemeClr val="accent1"/>
-          </a:lnRef>
-          <a:fillRef idx="3">
-            <a:schemeClr val="accent1"/>
-          </a:fillRef>
-          <a:effectRef idx="2">
-            <a:schemeClr val="accent1"/>
-          </a:effectRef>
-          <a:fontRef idx="minor">
-            <a:schemeClr val="lt1"/>
-          </a:fontRef>
-        </p:style>
-        <p:txBody>
-          <a:bodyPr rtlCol="0" anchor="ctr"/>
-          <a:lstStyle/>
-          <a:p>
-            <a:pPr algn="ctr"/>
-            <a:r>
-              <a:rPr kumimoji="1" lang="en-US" altLang="zh-CN" dirty="0" smtClean="0">
-                <a:solidFill>
-                  <a:schemeClr val="tx1"/>
-                </a:solidFill>
-              </a:rPr>
-              <a:t>Get</a:t>
-            </a:r>
-            <a:r>
-              <a:rPr kumimoji="1" lang="zh-CN" altLang="en-US" dirty="0" smtClean="0">
-                <a:solidFill>
-                  <a:schemeClr val="tx1"/>
-                </a:solidFill>
-              </a:rPr>
-              <a:t> </a:t>
-            </a:r>
-            <a:r>
-              <a:rPr kumimoji="1" lang="en-US" altLang="zh-CN" dirty="0" smtClean="0">
-                <a:solidFill>
-                  <a:schemeClr val="tx1"/>
-                </a:solidFill>
-              </a:rPr>
-              <a:t>Payload</a:t>
-            </a:r>
-          </a:p>
-        </p:txBody>
-      </p:sp>
-      <p:sp>
-        <p:nvSpPr>
-          <p:cNvPr id="13" name="矩形 12"/>
-          <p:cNvSpPr/>
-          <p:nvPr/>
-        </p:nvSpPr>
-        <p:spPr>
-          <a:xfrm>
-            <a:off x="3357245" y="3761592"/>
-            <a:ext cx="1828800" cy="731520"/>
-          </a:xfrm>
-          <a:prstGeom prst="rect">
-            <a:avLst/>
-          </a:prstGeom>
-          <a:noFill/>
-          <a:ln>
-            <a:solidFill>
-              <a:schemeClr val="tx1"/>
-            </a:solidFill>
-          </a:ln>
-        </p:spPr>
-        <p:style>
-          <a:lnRef idx="1">
-            <a:schemeClr val="accent1"/>
-          </a:lnRef>
-          <a:fillRef idx="3">
-            <a:schemeClr val="accent1"/>
-          </a:fillRef>
-          <a:effectRef idx="2">
-            <a:schemeClr val="accent1"/>
-          </a:effectRef>
-          <a:fontRef idx="minor">
-            <a:schemeClr val="lt1"/>
-          </a:fontRef>
-        </p:style>
-        <p:txBody>
-          <a:bodyPr rtlCol="0" anchor="ctr"/>
-          <a:lstStyle/>
-          <a:p>
-            <a:pPr algn="ctr"/>
-            <a:r>
-              <a:rPr kumimoji="1" lang="en-US" altLang="zh-CN" dirty="0" smtClean="0">
-                <a:solidFill>
-                  <a:schemeClr val="tx1"/>
-                </a:solidFill>
-              </a:rPr>
-              <a:t>Constellation</a:t>
-            </a:r>
-          </a:p>
-          <a:p>
-            <a:pPr algn="ctr"/>
-            <a:r>
-              <a:rPr kumimoji="1" lang="en-US" altLang="zh-CN" dirty="0" smtClean="0">
-                <a:solidFill>
-                  <a:schemeClr val="tx1"/>
-                </a:solidFill>
-              </a:rPr>
-              <a:t>Decoder</a:t>
-            </a:r>
-          </a:p>
-        </p:txBody>
-      </p:sp>
-      <p:sp>
-        <p:nvSpPr>
-          <p:cNvPr id="14" name="矩形 13"/>
-          <p:cNvSpPr/>
-          <p:nvPr/>
-        </p:nvSpPr>
-        <p:spPr>
-          <a:xfrm>
-            <a:off x="3357245" y="4895702"/>
-            <a:ext cx="1828800" cy="731520"/>
-          </a:xfrm>
-          <a:prstGeom prst="rect">
-            <a:avLst/>
-          </a:prstGeom>
-          <a:noFill/>
-          <a:ln>
-            <a:solidFill>
-              <a:schemeClr val="tx1"/>
-            </a:solidFill>
-          </a:ln>
-        </p:spPr>
-        <p:style>
-          <a:lnRef idx="1">
-            <a:schemeClr val="accent1"/>
-          </a:lnRef>
-          <a:fillRef idx="3">
-            <a:schemeClr val="accent1"/>
-          </a:fillRef>
-          <a:effectRef idx="2">
-            <a:schemeClr val="accent1"/>
-          </a:effectRef>
-          <a:fontRef idx="minor">
-            <a:schemeClr val="lt1"/>
-          </a:fontRef>
-        </p:style>
-        <p:txBody>
-          <a:bodyPr rtlCol="0" anchor="ctr"/>
-          <a:lstStyle/>
-          <a:p>
-            <a:pPr algn="ctr"/>
-            <a:r>
-              <a:rPr kumimoji="1" lang="en-US" altLang="zh-CN" dirty="0" smtClean="0">
-                <a:solidFill>
-                  <a:schemeClr val="tx1"/>
-                </a:solidFill>
-              </a:rPr>
-              <a:t>Constellation</a:t>
-            </a:r>
-          </a:p>
-          <a:p>
-            <a:pPr algn="ctr"/>
-            <a:r>
-              <a:rPr kumimoji="1" lang="en-US" altLang="zh-CN" dirty="0" smtClean="0">
-                <a:solidFill>
-                  <a:schemeClr val="tx1"/>
-                </a:solidFill>
-              </a:rPr>
-              <a:t>Decoder</a:t>
-            </a:r>
-          </a:p>
-        </p:txBody>
-      </p:sp>
-      <p:sp>
-        <p:nvSpPr>
-          <p:cNvPr id="15" name="矩形 14"/>
-          <p:cNvSpPr/>
-          <p:nvPr/>
-        </p:nvSpPr>
-        <p:spPr>
-          <a:xfrm>
-            <a:off x="810260" y="4895702"/>
-            <a:ext cx="1828800" cy="731520"/>
-          </a:xfrm>
-          <a:prstGeom prst="rect">
-            <a:avLst/>
-          </a:prstGeom>
-          <a:noFill/>
-          <a:ln>
-            <a:solidFill>
-              <a:schemeClr val="tx1"/>
-            </a:solidFill>
-          </a:ln>
-        </p:spPr>
-        <p:style>
-          <a:lnRef idx="1">
-            <a:schemeClr val="accent1"/>
-          </a:lnRef>
-          <a:fillRef idx="3">
-            <a:schemeClr val="accent1"/>
-          </a:fillRef>
-          <a:effectRef idx="2">
-            <a:schemeClr val="accent1"/>
-          </a:effectRef>
-          <a:fontRef idx="minor">
-            <a:schemeClr val="lt1"/>
-          </a:fontRef>
-        </p:style>
-        <p:txBody>
-          <a:bodyPr rtlCol="0" anchor="ctr"/>
-          <a:lstStyle/>
-          <a:p>
-            <a:pPr algn="ctr"/>
-            <a:r>
-              <a:rPr kumimoji="1" lang="en-US" altLang="zh-CN" dirty="0" smtClean="0">
-                <a:solidFill>
-                  <a:schemeClr val="tx1"/>
-                </a:solidFill>
-              </a:rPr>
-              <a:t>CRC32</a:t>
-            </a:r>
-          </a:p>
-          <a:p>
-            <a:pPr algn="ctr"/>
-            <a:r>
-              <a:rPr kumimoji="1" lang="en-US" altLang="zh-CN" dirty="0" smtClean="0">
-                <a:solidFill>
-                  <a:schemeClr val="tx1"/>
-                </a:solidFill>
-              </a:rPr>
-              <a:t>Decoder</a:t>
-            </a:r>
-          </a:p>
-        </p:txBody>
-      </p:sp>
-      <p:grpSp>
-        <p:nvGrpSpPr>
-          <p:cNvPr id="21" name="组 20"/>
-          <p:cNvGrpSpPr/>
-          <p:nvPr/>
-        </p:nvGrpSpPr>
-        <p:grpSpPr>
-          <a:xfrm>
-            <a:off x="3556719" y="2203638"/>
-            <a:ext cx="381000" cy="381000"/>
-            <a:chOff x="5238750" y="698500"/>
-            <a:chExt cx="381000" cy="381000"/>
-          </a:xfrm>
-        </p:grpSpPr>
-        <p:sp>
-          <p:nvSpPr>
-            <p:cNvPr id="16" name="椭圆 15"/>
-            <p:cNvSpPr/>
-            <p:nvPr/>
-          </p:nvSpPr>
-          <p:spPr>
-            <a:xfrm>
-              <a:off x="5238750" y="698500"/>
-              <a:ext cx="381000" cy="381000"/>
-            </a:xfrm>
-            <a:prstGeom prst="ellipse">
-              <a:avLst/>
-            </a:prstGeom>
-            <a:noFill/>
-            <a:ln w="38100">
-              <a:solidFill>
-                <a:schemeClr val="tx1"/>
-              </a:solidFill>
-            </a:ln>
-          </p:spPr>
-          <p:style>
-            <a:lnRef idx="1">
-              <a:schemeClr val="accent1"/>
-            </a:lnRef>
-            <a:fillRef idx="3">
-              <a:schemeClr val="accent1"/>
-            </a:fillRef>
-            <a:effectRef idx="2">
-              <a:schemeClr val="accent1"/>
-            </a:effectRef>
-            <a:fontRef idx="minor">
-              <a:schemeClr val="lt1"/>
-            </a:fontRef>
-          </p:style>
-          <p:txBody>
-            <a:bodyPr rtlCol="0" anchor="ctr"/>
-            <a:lstStyle/>
-            <a:p>
-              <a:pPr algn="ctr"/>
-              <a:endParaRPr kumimoji="1" lang="zh-CN" altLang="en-US"/>
-            </a:p>
-          </p:txBody>
-        </p:sp>
-        <p:cxnSp>
-          <p:nvCxnSpPr>
-            <p:cNvPr id="18" name="直线连接符 17"/>
-            <p:cNvCxnSpPr>
-              <a:stCxn id="16" idx="1"/>
-              <a:endCxn id="16" idx="5"/>
-            </p:cNvCxnSpPr>
-            <p:nvPr/>
-          </p:nvCxnSpPr>
-          <p:spPr>
-            <a:xfrm>
-              <a:off x="5294546" y="754296"/>
-              <a:ext cx="269408" cy="269408"/>
-            </a:xfrm>
-            <a:prstGeom prst="line">
-              <a:avLst/>
-            </a:prstGeom>
-            <a:ln w="38100">
-              <a:solidFill>
-                <a:schemeClr val="tx1"/>
-              </a:solidFill>
-            </a:ln>
-          </p:spPr>
-          <p:style>
-            <a:lnRef idx="2">
-              <a:schemeClr val="accent1"/>
-            </a:lnRef>
-            <a:fillRef idx="0">
-              <a:schemeClr val="accent1"/>
-            </a:fillRef>
-            <a:effectRef idx="1">
-              <a:schemeClr val="accent1"/>
-            </a:effectRef>
-            <a:fontRef idx="minor">
-              <a:schemeClr val="tx1"/>
-            </a:fontRef>
-          </p:style>
-        </p:cxnSp>
-        <p:cxnSp>
-          <p:nvCxnSpPr>
-            <p:cNvPr id="20" name="直线连接符 19"/>
-            <p:cNvCxnSpPr>
-              <a:stCxn id="16" idx="7"/>
-              <a:endCxn id="16" idx="3"/>
-            </p:cNvCxnSpPr>
-            <p:nvPr/>
-          </p:nvCxnSpPr>
-          <p:spPr>
-            <a:xfrm flipH="1">
-              <a:off x="5294546" y="754296"/>
-              <a:ext cx="269408" cy="269408"/>
-            </a:xfrm>
-            <a:prstGeom prst="line">
-              <a:avLst/>
-            </a:prstGeom>
-            <a:ln w="38100">
-              <a:solidFill>
-                <a:schemeClr val="tx1"/>
-              </a:solidFill>
-            </a:ln>
-          </p:spPr>
-          <p:style>
-            <a:lnRef idx="2">
-              <a:schemeClr val="accent1"/>
-            </a:lnRef>
-            <a:fillRef idx="0">
-              <a:schemeClr val="accent1"/>
-            </a:fillRef>
-            <a:effectRef idx="1">
-              <a:schemeClr val="accent1"/>
-            </a:effectRef>
-            <a:fontRef idx="minor">
-              <a:schemeClr val="tx1"/>
-            </a:fontRef>
-          </p:style>
-        </p:cxnSp>
-      </p:grpSp>
-      <p:sp>
-        <p:nvSpPr>
-          <p:cNvPr id="25" name="矩形 24"/>
-          <p:cNvSpPr/>
-          <p:nvPr/>
-        </p:nvSpPr>
-        <p:spPr>
-          <a:xfrm>
-            <a:off x="3290019" y="1405332"/>
-            <a:ext cx="914400" cy="365760"/>
-          </a:xfrm>
-          <a:prstGeom prst="rect">
-            <a:avLst/>
-          </a:prstGeom>
-          <a:noFill/>
-          <a:ln>
-            <a:solidFill>
-              <a:schemeClr val="tx1"/>
-            </a:solidFill>
-          </a:ln>
-        </p:spPr>
-        <p:style>
-          <a:lnRef idx="1">
-            <a:schemeClr val="accent1"/>
-          </a:lnRef>
-          <a:fillRef idx="3">
-            <a:schemeClr val="accent1"/>
-          </a:fillRef>
-          <a:effectRef idx="2">
-            <a:schemeClr val="accent1"/>
-          </a:effectRef>
-          <a:fontRef idx="minor">
-            <a:schemeClr val="lt1"/>
-          </a:fontRef>
-        </p:style>
-        <p:txBody>
-          <a:bodyPr rtlCol="0" anchor="ctr"/>
-          <a:lstStyle/>
-          <a:p>
-            <a:pPr algn="ctr"/>
-            <a:r>
-              <a:rPr kumimoji="1" lang="en-US" altLang="zh-CN" dirty="0" smtClean="0">
-                <a:solidFill>
-                  <a:schemeClr val="tx1"/>
-                </a:solidFill>
-              </a:rPr>
-              <a:t>VCO</a:t>
-            </a:r>
-          </a:p>
-        </p:txBody>
-      </p:sp>
-      <p:sp>
-        <p:nvSpPr>
-          <p:cNvPr id="26" name="矩形 25"/>
-          <p:cNvSpPr/>
-          <p:nvPr/>
-        </p:nvSpPr>
-        <p:spPr>
-          <a:xfrm>
-            <a:off x="4470400" y="1405332"/>
-            <a:ext cx="914400" cy="365760"/>
-          </a:xfrm>
-          <a:prstGeom prst="rect">
-            <a:avLst/>
-          </a:prstGeom>
-          <a:noFill/>
-          <a:ln>
-            <a:solidFill>
-              <a:schemeClr val="tx1"/>
-            </a:solidFill>
-          </a:ln>
-        </p:spPr>
-        <p:style>
-          <a:lnRef idx="1">
-            <a:schemeClr val="accent1"/>
-          </a:lnRef>
-          <a:fillRef idx="3">
-            <a:schemeClr val="accent1"/>
-          </a:fillRef>
-          <a:effectRef idx="2">
-            <a:schemeClr val="accent1"/>
-          </a:effectRef>
-          <a:fontRef idx="minor">
-            <a:schemeClr val="lt1"/>
-          </a:fontRef>
-        </p:style>
-        <p:txBody>
-          <a:bodyPr rtlCol="0" anchor="ctr"/>
-          <a:lstStyle/>
-          <a:p>
-            <a:pPr algn="ctr"/>
-            <a:r>
-              <a:rPr kumimoji="1" lang="en-US" altLang="zh-CN" dirty="0" smtClean="0">
-                <a:solidFill>
-                  <a:schemeClr val="tx1"/>
-                </a:solidFill>
-              </a:rPr>
-              <a:t>×(-1)</a:t>
-            </a:r>
-          </a:p>
-        </p:txBody>
-      </p:sp>
-      <p:sp>
-        <p:nvSpPr>
-          <p:cNvPr id="27" name="矩形 26"/>
-          <p:cNvSpPr/>
-          <p:nvPr/>
-        </p:nvSpPr>
-        <p:spPr>
-          <a:xfrm>
-            <a:off x="7516411" y="1544041"/>
-            <a:ext cx="1828800" cy="731520"/>
-          </a:xfrm>
-          <a:prstGeom prst="rect">
-            <a:avLst/>
-          </a:prstGeom>
-          <a:noFill/>
-          <a:ln>
-            <a:solidFill>
-              <a:schemeClr val="tx1"/>
-            </a:solidFill>
-          </a:ln>
-        </p:spPr>
-        <p:style>
-          <a:lnRef idx="1">
-            <a:schemeClr val="accent1"/>
-          </a:lnRef>
-          <a:fillRef idx="3">
-            <a:schemeClr val="accent1"/>
-          </a:fillRef>
-          <a:effectRef idx="2">
-            <a:schemeClr val="accent1"/>
-          </a:effectRef>
-          <a:fontRef idx="minor">
-            <a:schemeClr val="lt1"/>
-          </a:fontRef>
-        </p:style>
-        <p:txBody>
-          <a:bodyPr rtlCol="0" anchor="ctr"/>
-          <a:lstStyle/>
-          <a:p>
-            <a:pPr algn="ctr"/>
-            <a:r>
-              <a:rPr kumimoji="1" lang="en-US" altLang="zh-CN" dirty="0" smtClean="0">
-                <a:solidFill>
-                  <a:schemeClr val="tx1"/>
-                </a:solidFill>
-              </a:rPr>
-              <a:t>Decimator</a:t>
-            </a:r>
-            <a:endParaRPr kumimoji="1" lang="en-US" altLang="zh-CN" dirty="0">
-              <a:solidFill>
-                <a:schemeClr val="tx1"/>
-              </a:solidFill>
-            </a:endParaRPr>
-          </a:p>
-          <a:p>
-            <a:pPr algn="ctr"/>
-            <a:r>
-              <a:rPr kumimoji="1" lang="en-US" altLang="zh-CN" dirty="0" smtClean="0">
-                <a:solidFill>
-                  <a:schemeClr val="tx1"/>
-                </a:solidFill>
-              </a:rPr>
-              <a:t>for</a:t>
-            </a:r>
-            <a:r>
-              <a:rPr kumimoji="1" lang="zh-CN" altLang="en-US" dirty="0" smtClean="0">
-                <a:solidFill>
-                  <a:schemeClr val="tx1"/>
-                </a:solidFill>
-              </a:rPr>
-              <a:t> </a:t>
-            </a:r>
-            <a:r>
-              <a:rPr kumimoji="1" lang="en-US" altLang="zh-CN" dirty="0" smtClean="0">
-                <a:solidFill>
-                  <a:schemeClr val="tx1"/>
-                </a:solidFill>
-              </a:rPr>
-              <a:t>training</a:t>
-            </a:r>
-            <a:r>
-              <a:rPr kumimoji="1" lang="zh-CN" altLang="en-US" dirty="0" smtClean="0">
-                <a:solidFill>
-                  <a:schemeClr val="tx1"/>
-                </a:solidFill>
-              </a:rPr>
-              <a:t> </a:t>
-            </a:r>
-            <a:r>
-              <a:rPr kumimoji="1" lang="en-US" altLang="zh-CN" dirty="0" err="1" smtClean="0">
-                <a:solidFill>
-                  <a:schemeClr val="tx1"/>
-                </a:solidFill>
-              </a:rPr>
-              <a:t>seq</a:t>
-            </a:r>
-            <a:endParaRPr kumimoji="1" lang="en-US" altLang="zh-CN" dirty="0" smtClean="0">
-              <a:solidFill>
-                <a:schemeClr val="tx1"/>
-              </a:solidFill>
-            </a:endParaRPr>
-          </a:p>
-        </p:txBody>
-      </p:sp>
-      <p:sp>
-        <p:nvSpPr>
-          <p:cNvPr id="28" name="矩形 27"/>
-          <p:cNvSpPr/>
-          <p:nvPr/>
-        </p:nvSpPr>
-        <p:spPr>
-          <a:xfrm>
-            <a:off x="810260" y="3761592"/>
-            <a:ext cx="1828800" cy="731520"/>
-          </a:xfrm>
-          <a:prstGeom prst="rect">
-            <a:avLst/>
-          </a:prstGeom>
-          <a:noFill/>
-          <a:ln>
-            <a:solidFill>
-              <a:schemeClr val="tx1"/>
-            </a:solidFill>
-          </a:ln>
-        </p:spPr>
-        <p:style>
-          <a:lnRef idx="1">
-            <a:schemeClr val="accent1"/>
-          </a:lnRef>
-          <a:fillRef idx="3">
-            <a:schemeClr val="accent1"/>
-          </a:fillRef>
-          <a:effectRef idx="2">
-            <a:schemeClr val="accent1"/>
-          </a:effectRef>
-          <a:fontRef idx="minor">
-            <a:schemeClr val="lt1"/>
-          </a:fontRef>
-        </p:style>
-        <p:txBody>
-          <a:bodyPr rtlCol="0" anchor="ctr"/>
-          <a:lstStyle/>
-          <a:p>
-            <a:pPr algn="ctr"/>
-            <a:r>
-              <a:rPr kumimoji="1" lang="en-US" altLang="zh-CN" dirty="0" smtClean="0">
-                <a:solidFill>
-                  <a:schemeClr val="tx1"/>
-                </a:solidFill>
-              </a:rPr>
-              <a:t>Header</a:t>
-            </a:r>
-            <a:r>
-              <a:rPr kumimoji="1" lang="zh-CN" altLang="en-US" dirty="0" smtClean="0">
-                <a:solidFill>
-                  <a:schemeClr val="tx1"/>
-                </a:solidFill>
-              </a:rPr>
-              <a:t> </a:t>
-            </a:r>
-            <a:r>
-              <a:rPr kumimoji="1" lang="en-US" altLang="zh-CN" dirty="0" smtClean="0">
-                <a:solidFill>
-                  <a:schemeClr val="tx1"/>
-                </a:solidFill>
-              </a:rPr>
-              <a:t>Parser</a:t>
-            </a:r>
-          </a:p>
-        </p:txBody>
-      </p:sp>
-      <p:sp>
-        <p:nvSpPr>
-          <p:cNvPr id="29" name="矩形 28"/>
-          <p:cNvSpPr/>
-          <p:nvPr/>
-        </p:nvSpPr>
-        <p:spPr>
-          <a:xfrm>
-            <a:off x="-1736725" y="4895702"/>
-            <a:ext cx="1828800" cy="731520"/>
-          </a:xfrm>
-          <a:prstGeom prst="rect">
-            <a:avLst/>
-          </a:prstGeom>
-          <a:noFill/>
-          <a:ln>
-            <a:solidFill>
-              <a:schemeClr val="tx1"/>
-            </a:solidFill>
-          </a:ln>
-        </p:spPr>
-        <p:style>
-          <a:lnRef idx="1">
-            <a:schemeClr val="accent1"/>
-          </a:lnRef>
-          <a:fillRef idx="3">
-            <a:schemeClr val="accent1"/>
-          </a:fillRef>
-          <a:effectRef idx="2">
-            <a:schemeClr val="accent1"/>
-          </a:effectRef>
-          <a:fontRef idx="minor">
-            <a:schemeClr val="lt1"/>
-          </a:fontRef>
-        </p:style>
-        <p:txBody>
-          <a:bodyPr rtlCol="0" anchor="ctr"/>
-          <a:lstStyle/>
-          <a:p>
-            <a:pPr algn="ctr"/>
-            <a:r>
-              <a:rPr kumimoji="1" lang="en-US" altLang="zh-CN" dirty="0" smtClean="0">
-                <a:solidFill>
-                  <a:schemeClr val="tx1"/>
-                </a:solidFill>
-              </a:rPr>
-              <a:t>Payload</a:t>
-            </a:r>
-          </a:p>
-        </p:txBody>
-      </p:sp>
-      <p:sp>
-        <p:nvSpPr>
-          <p:cNvPr id="30" name="矩形 29"/>
-          <p:cNvSpPr/>
-          <p:nvPr/>
-        </p:nvSpPr>
-        <p:spPr>
-          <a:xfrm>
-            <a:off x="-1736725" y="3761592"/>
-            <a:ext cx="1828800" cy="731520"/>
-          </a:xfrm>
-          <a:prstGeom prst="rect">
-            <a:avLst/>
-          </a:prstGeom>
-          <a:noFill/>
-          <a:ln>
-            <a:solidFill>
-              <a:schemeClr val="tx1"/>
-            </a:solidFill>
-          </a:ln>
-        </p:spPr>
-        <p:style>
-          <a:lnRef idx="1">
-            <a:schemeClr val="accent1"/>
-          </a:lnRef>
-          <a:fillRef idx="3">
-            <a:schemeClr val="accent1"/>
-          </a:fillRef>
-          <a:effectRef idx="2">
-            <a:schemeClr val="accent1"/>
-          </a:effectRef>
-          <a:fontRef idx="minor">
-            <a:schemeClr val="lt1"/>
-          </a:fontRef>
-        </p:style>
-        <p:txBody>
-          <a:bodyPr rtlCol="0" anchor="ctr"/>
-          <a:lstStyle/>
-          <a:p>
-            <a:pPr algn="ctr"/>
-            <a:r>
-              <a:rPr kumimoji="1" lang="en-US" altLang="zh-CN" dirty="0" smtClean="0">
-                <a:solidFill>
-                  <a:schemeClr val="tx1"/>
-                </a:solidFill>
-              </a:rPr>
-              <a:t>Packet</a:t>
-            </a:r>
-            <a:r>
-              <a:rPr kumimoji="1" lang="zh-CN" altLang="en-US" dirty="0" smtClean="0">
-                <a:solidFill>
-                  <a:schemeClr val="tx1"/>
-                </a:solidFill>
-              </a:rPr>
-              <a:t> </a:t>
-            </a:r>
-            <a:r>
-              <a:rPr kumimoji="1" lang="en-US" altLang="zh-CN" dirty="0" smtClean="0">
-                <a:solidFill>
-                  <a:schemeClr val="tx1"/>
-                </a:solidFill>
-              </a:rPr>
-              <a:t>Info</a:t>
-            </a:r>
-          </a:p>
-        </p:txBody>
-      </p:sp>
-      <p:cxnSp>
-        <p:nvCxnSpPr>
-          <p:cNvPr id="32" name="直线箭头连接符 31"/>
-          <p:cNvCxnSpPr>
-            <a:stCxn id="4" idx="3"/>
-            <a:endCxn id="5" idx="1"/>
-          </p:cNvCxnSpPr>
-          <p:nvPr/>
-        </p:nvCxnSpPr>
-        <p:spPr>
-          <a:xfrm>
-            <a:off x="92075" y="1504390"/>
-            <a:ext cx="718185" cy="0"/>
-          </a:xfrm>
-          <a:prstGeom prst="straightConnector1">
-            <a:avLst/>
-          </a:prstGeom>
-          <a:ln>
-            <a:solidFill>
-              <a:schemeClr val="tx1"/>
-            </a:solidFill>
-            <a:tailEnd type="arrow"/>
-          </a:ln>
-        </p:spPr>
-        <p:style>
-          <a:lnRef idx="2">
-            <a:schemeClr val="accent1"/>
-          </a:lnRef>
-          <a:fillRef idx="0">
-            <a:schemeClr val="accent1"/>
-          </a:fillRef>
-          <a:effectRef idx="1">
-            <a:schemeClr val="accent1"/>
-          </a:effectRef>
-          <a:fontRef idx="minor">
-            <a:schemeClr val="tx1"/>
-          </a:fontRef>
-        </p:style>
-      </p:cxnSp>
-      <p:cxnSp>
-        <p:nvCxnSpPr>
-          <p:cNvPr id="34" name="肘形连接符 33"/>
-          <p:cNvCxnSpPr>
-            <a:stCxn id="5" idx="3"/>
-            <a:endCxn id="6" idx="1"/>
-          </p:cNvCxnSpPr>
-          <p:nvPr/>
-        </p:nvCxnSpPr>
-        <p:spPr>
-          <a:xfrm flipV="1">
-            <a:off x="2639060" y="715233"/>
-            <a:ext cx="917659" cy="789157"/>
-          </a:xfrm>
-          <a:prstGeom prst="bentConnector3">
-            <a:avLst/>
-          </a:prstGeom>
-          <a:ln>
-            <a:solidFill>
-              <a:schemeClr val="tx1"/>
-            </a:solidFill>
-            <a:tailEnd type="arrow"/>
-          </a:ln>
-        </p:spPr>
-        <p:style>
-          <a:lnRef idx="2">
-            <a:schemeClr val="accent1"/>
-          </a:lnRef>
-          <a:fillRef idx="0">
-            <a:schemeClr val="accent1"/>
-          </a:fillRef>
-          <a:effectRef idx="1">
-            <a:schemeClr val="accent1"/>
-          </a:effectRef>
-          <a:fontRef idx="minor">
-            <a:schemeClr val="tx1"/>
-          </a:fontRef>
-        </p:style>
-      </p:cxnSp>
-      <p:cxnSp>
-        <p:nvCxnSpPr>
-          <p:cNvPr id="36" name="肘形连接符 35"/>
-          <p:cNvCxnSpPr>
-            <a:stCxn id="5" idx="3"/>
-            <a:endCxn id="16" idx="2"/>
-          </p:cNvCxnSpPr>
-          <p:nvPr/>
-        </p:nvCxnSpPr>
-        <p:spPr>
-          <a:xfrm>
-            <a:off x="2639060" y="1504390"/>
-            <a:ext cx="917659" cy="889748"/>
-          </a:xfrm>
-          <a:prstGeom prst="bentConnector3">
-            <a:avLst/>
-          </a:prstGeom>
-          <a:ln>
-            <a:solidFill>
-              <a:schemeClr val="tx1"/>
-            </a:solidFill>
-            <a:tailEnd type="arrow"/>
-          </a:ln>
-        </p:spPr>
-        <p:style>
-          <a:lnRef idx="2">
-            <a:schemeClr val="accent1"/>
-          </a:lnRef>
-          <a:fillRef idx="0">
-            <a:schemeClr val="accent1"/>
-          </a:fillRef>
-          <a:effectRef idx="1">
-            <a:schemeClr val="accent1"/>
-          </a:effectRef>
-          <a:fontRef idx="minor">
-            <a:schemeClr val="tx1"/>
-          </a:fontRef>
-        </p:style>
-      </p:cxnSp>
-      <p:cxnSp>
-        <p:nvCxnSpPr>
-          <p:cNvPr id="40" name="肘形连接符 39"/>
-          <p:cNvCxnSpPr>
-            <a:stCxn id="6" idx="2"/>
-            <a:endCxn id="26" idx="0"/>
-          </p:cNvCxnSpPr>
-          <p:nvPr/>
-        </p:nvCxnSpPr>
-        <p:spPr>
-          <a:xfrm rot="16200000" flipH="1">
-            <a:off x="4537190" y="1014921"/>
-            <a:ext cx="324339" cy="456481"/>
-          </a:xfrm>
-          <a:prstGeom prst="bentConnector3">
-            <a:avLst/>
-          </a:prstGeom>
-          <a:ln>
-            <a:solidFill>
-              <a:schemeClr val="tx1"/>
-            </a:solidFill>
-            <a:tailEnd type="arrow"/>
-          </a:ln>
-        </p:spPr>
-        <p:style>
-          <a:lnRef idx="2">
-            <a:schemeClr val="accent1"/>
-          </a:lnRef>
-          <a:fillRef idx="0">
-            <a:schemeClr val="accent1"/>
-          </a:fillRef>
-          <a:effectRef idx="1">
-            <a:schemeClr val="accent1"/>
-          </a:effectRef>
-          <a:fontRef idx="minor">
-            <a:schemeClr val="tx1"/>
-          </a:fontRef>
-        </p:style>
-      </p:cxnSp>
-      <p:cxnSp>
-        <p:nvCxnSpPr>
-          <p:cNvPr id="42" name="肘形连接符 41"/>
-          <p:cNvCxnSpPr>
-            <a:stCxn id="6" idx="3"/>
-            <a:endCxn id="8" idx="0"/>
-          </p:cNvCxnSpPr>
-          <p:nvPr/>
-        </p:nvCxnSpPr>
-        <p:spPr>
-          <a:xfrm>
-            <a:off x="5385519" y="715233"/>
-            <a:ext cx="639361" cy="1313145"/>
-          </a:xfrm>
-          <a:prstGeom prst="bentConnector2">
-            <a:avLst/>
-          </a:prstGeom>
-          <a:ln>
-            <a:solidFill>
-              <a:schemeClr val="tx1"/>
-            </a:solidFill>
-            <a:tailEnd type="arrow"/>
-          </a:ln>
-        </p:spPr>
-        <p:style>
-          <a:lnRef idx="2">
-            <a:schemeClr val="accent1"/>
-          </a:lnRef>
-          <a:fillRef idx="0">
-            <a:schemeClr val="accent1"/>
-          </a:fillRef>
-          <a:effectRef idx="1">
-            <a:schemeClr val="accent1"/>
-          </a:effectRef>
-          <a:fontRef idx="minor">
-            <a:schemeClr val="tx1"/>
-          </a:fontRef>
-        </p:style>
-      </p:cxnSp>
-      <p:cxnSp>
-        <p:nvCxnSpPr>
-          <p:cNvPr id="45" name="直线箭头连接符 44"/>
-          <p:cNvCxnSpPr>
-            <a:stCxn id="16" idx="6"/>
-            <a:endCxn id="8" idx="1"/>
-          </p:cNvCxnSpPr>
-          <p:nvPr/>
-        </p:nvCxnSpPr>
-        <p:spPr>
-          <a:xfrm>
-            <a:off x="3937719" y="2394138"/>
-            <a:ext cx="1172761" cy="0"/>
-          </a:xfrm>
-          <a:prstGeom prst="straightConnector1">
-            <a:avLst/>
-          </a:prstGeom>
-          <a:ln>
-            <a:solidFill>
-              <a:schemeClr val="tx1"/>
-            </a:solidFill>
-            <a:tailEnd type="arrow"/>
-          </a:ln>
-        </p:spPr>
-        <p:style>
-          <a:lnRef idx="2">
-            <a:schemeClr val="accent1"/>
-          </a:lnRef>
-          <a:fillRef idx="0">
-            <a:schemeClr val="accent1"/>
-          </a:fillRef>
-          <a:effectRef idx="1">
-            <a:schemeClr val="accent1"/>
-          </a:effectRef>
-          <a:fontRef idx="minor">
-            <a:schemeClr val="tx1"/>
-          </a:fontRef>
-        </p:style>
-      </p:cxnSp>
-      <p:cxnSp>
-        <p:nvCxnSpPr>
-          <p:cNvPr id="49" name="直线箭头连接符 48"/>
-          <p:cNvCxnSpPr>
-            <a:stCxn id="26" idx="1"/>
-            <a:endCxn id="25" idx="3"/>
-          </p:cNvCxnSpPr>
-          <p:nvPr/>
-        </p:nvCxnSpPr>
-        <p:spPr>
-          <a:xfrm flipH="1">
-            <a:off x="4204419" y="1588212"/>
-            <a:ext cx="265981" cy="0"/>
-          </a:xfrm>
-          <a:prstGeom prst="straightConnector1">
-            <a:avLst/>
-          </a:prstGeom>
-          <a:ln>
-            <a:solidFill>
-              <a:schemeClr val="tx1"/>
-            </a:solidFill>
-            <a:tailEnd type="arrow"/>
-          </a:ln>
-        </p:spPr>
-        <p:style>
-          <a:lnRef idx="2">
-            <a:schemeClr val="accent1"/>
-          </a:lnRef>
-          <a:fillRef idx="0">
-            <a:schemeClr val="accent1"/>
-          </a:fillRef>
-          <a:effectRef idx="1">
-            <a:schemeClr val="accent1"/>
-          </a:effectRef>
-          <a:fontRef idx="minor">
-            <a:schemeClr val="tx1"/>
-          </a:fontRef>
-        </p:style>
-      </p:cxnSp>
-      <p:cxnSp>
-        <p:nvCxnSpPr>
-          <p:cNvPr id="53" name="直线箭头连接符 52"/>
-          <p:cNvCxnSpPr>
-            <a:stCxn id="25" idx="2"/>
-            <a:endCxn id="16" idx="0"/>
-          </p:cNvCxnSpPr>
-          <p:nvPr/>
-        </p:nvCxnSpPr>
-        <p:spPr>
-          <a:xfrm>
-            <a:off x="3747219" y="1771092"/>
-            <a:ext cx="0" cy="432546"/>
-          </a:xfrm>
-          <a:prstGeom prst="straightConnector1">
-            <a:avLst/>
-          </a:prstGeom>
-          <a:ln>
-            <a:solidFill>
-              <a:schemeClr val="tx1"/>
-            </a:solidFill>
-            <a:tailEnd type="arrow"/>
-          </a:ln>
-        </p:spPr>
-        <p:style>
-          <a:lnRef idx="2">
-            <a:schemeClr val="accent1"/>
-          </a:lnRef>
-          <a:fillRef idx="0">
-            <a:schemeClr val="accent1"/>
-          </a:fillRef>
-          <a:effectRef idx="1">
-            <a:schemeClr val="accent1"/>
-          </a:effectRef>
-          <a:fontRef idx="minor">
-            <a:schemeClr val="tx1"/>
-          </a:fontRef>
-        </p:style>
-      </p:cxnSp>
-      <p:cxnSp>
-        <p:nvCxnSpPr>
-          <p:cNvPr id="68" name="肘形连接符 67"/>
-          <p:cNvCxnSpPr>
-            <a:stCxn id="8" idx="3"/>
-            <a:endCxn id="27" idx="1"/>
-          </p:cNvCxnSpPr>
-          <p:nvPr/>
-        </p:nvCxnSpPr>
-        <p:spPr>
-          <a:xfrm flipV="1">
-            <a:off x="6939280" y="1909801"/>
-            <a:ext cx="577131" cy="484337"/>
-          </a:xfrm>
-          <a:prstGeom prst="bentConnector3">
-            <a:avLst/>
-          </a:prstGeom>
-          <a:ln>
-            <a:solidFill>
-              <a:schemeClr val="tx1"/>
-            </a:solidFill>
-            <a:tailEnd type="arrow"/>
-          </a:ln>
-        </p:spPr>
-        <p:style>
-          <a:lnRef idx="2">
-            <a:schemeClr val="accent1"/>
-          </a:lnRef>
-          <a:fillRef idx="0">
-            <a:schemeClr val="accent1"/>
-          </a:fillRef>
-          <a:effectRef idx="1">
-            <a:schemeClr val="accent1"/>
-          </a:effectRef>
-          <a:fontRef idx="minor">
-            <a:schemeClr val="tx1"/>
-          </a:fontRef>
-        </p:style>
-      </p:cxnSp>
-      <p:cxnSp>
-        <p:nvCxnSpPr>
-          <p:cNvPr id="70" name="肘形连接符 69"/>
-          <p:cNvCxnSpPr>
-            <a:stCxn id="8" idx="3"/>
-            <a:endCxn id="10" idx="1"/>
-          </p:cNvCxnSpPr>
-          <p:nvPr/>
-        </p:nvCxnSpPr>
-        <p:spPr>
-          <a:xfrm>
-            <a:off x="6939280" y="2394138"/>
-            <a:ext cx="577131" cy="556260"/>
-          </a:xfrm>
-          <a:prstGeom prst="bentConnector3">
-            <a:avLst>
-              <a:gd name="adj1" fmla="val 50000"/>
-            </a:avLst>
-          </a:prstGeom>
-          <a:ln>
-            <a:solidFill>
-              <a:schemeClr val="tx1"/>
-            </a:solidFill>
-            <a:tailEnd type="arrow"/>
-          </a:ln>
-        </p:spPr>
-        <p:style>
-          <a:lnRef idx="2">
-            <a:schemeClr val="accent1"/>
-          </a:lnRef>
-          <a:fillRef idx="0">
-            <a:schemeClr val="accent1"/>
-          </a:fillRef>
-          <a:effectRef idx="1">
-            <a:schemeClr val="accent1"/>
-          </a:effectRef>
-          <a:fontRef idx="minor">
-            <a:schemeClr val="tx1"/>
-          </a:fontRef>
-        </p:style>
-      </p:cxnSp>
-      <p:cxnSp>
-        <p:nvCxnSpPr>
-          <p:cNvPr id="77" name="直线箭头连接符 76"/>
-          <p:cNvCxnSpPr>
-            <a:stCxn id="27" idx="0"/>
-            <a:endCxn id="9" idx="2"/>
-          </p:cNvCxnSpPr>
-          <p:nvPr/>
-        </p:nvCxnSpPr>
-        <p:spPr>
-          <a:xfrm flipV="1">
-            <a:off x="8430811" y="1138630"/>
-            <a:ext cx="0" cy="405411"/>
-          </a:xfrm>
-          <a:prstGeom prst="straightConnector1">
-            <a:avLst/>
-          </a:prstGeom>
-          <a:ln>
-            <a:solidFill>
-              <a:schemeClr val="tx1"/>
-            </a:solidFill>
-            <a:tailEnd type="arrow"/>
-          </a:ln>
-        </p:spPr>
-        <p:style>
-          <a:lnRef idx="2">
-            <a:schemeClr val="accent1"/>
-          </a:lnRef>
-          <a:fillRef idx="0">
-            <a:schemeClr val="accent1"/>
-          </a:fillRef>
-          <a:effectRef idx="1">
-            <a:schemeClr val="accent1"/>
-          </a:effectRef>
-          <a:fontRef idx="minor">
-            <a:schemeClr val="tx1"/>
-          </a:fontRef>
-        </p:style>
-      </p:cxnSp>
-      <p:cxnSp>
-        <p:nvCxnSpPr>
-          <p:cNvPr id="79" name="直线箭头连接符 78"/>
-          <p:cNvCxnSpPr>
-            <a:stCxn id="11" idx="1"/>
-            <a:endCxn id="13" idx="3"/>
-          </p:cNvCxnSpPr>
-          <p:nvPr/>
-        </p:nvCxnSpPr>
-        <p:spPr>
-          <a:xfrm flipH="1">
-            <a:off x="5186045" y="4127352"/>
-            <a:ext cx="718185" cy="0"/>
-          </a:xfrm>
-          <a:prstGeom prst="straightConnector1">
-            <a:avLst/>
-          </a:prstGeom>
-          <a:ln>
-            <a:solidFill>
-              <a:schemeClr val="tx1"/>
-            </a:solidFill>
-            <a:tailEnd type="arrow"/>
-          </a:ln>
-        </p:spPr>
-        <p:style>
-          <a:lnRef idx="2">
-            <a:schemeClr val="accent1"/>
-          </a:lnRef>
-          <a:fillRef idx="0">
-            <a:schemeClr val="accent1"/>
-          </a:fillRef>
-          <a:effectRef idx="1">
-            <a:schemeClr val="accent1"/>
-          </a:effectRef>
-          <a:fontRef idx="minor">
-            <a:schemeClr val="tx1"/>
-          </a:fontRef>
-        </p:style>
-      </p:cxnSp>
-      <p:cxnSp>
-        <p:nvCxnSpPr>
-          <p:cNvPr id="81" name="直线箭头连接符 80"/>
-          <p:cNvCxnSpPr>
-            <a:stCxn id="13" idx="1"/>
-            <a:endCxn id="28" idx="3"/>
-          </p:cNvCxnSpPr>
-          <p:nvPr/>
-        </p:nvCxnSpPr>
-        <p:spPr>
-          <a:xfrm flipH="1">
-            <a:off x="2639060" y="4127352"/>
-            <a:ext cx="718185" cy="0"/>
-          </a:xfrm>
-          <a:prstGeom prst="straightConnector1">
-            <a:avLst/>
-          </a:prstGeom>
-          <a:ln>
-            <a:solidFill>
-              <a:schemeClr val="tx1"/>
-            </a:solidFill>
-            <a:tailEnd type="arrow"/>
-          </a:ln>
-        </p:spPr>
-        <p:style>
-          <a:lnRef idx="2">
-            <a:schemeClr val="accent1"/>
-          </a:lnRef>
-          <a:fillRef idx="0">
-            <a:schemeClr val="accent1"/>
-          </a:fillRef>
-          <a:effectRef idx="1">
-            <a:schemeClr val="accent1"/>
-          </a:effectRef>
-          <a:fontRef idx="minor">
-            <a:schemeClr val="tx1"/>
-          </a:fontRef>
-        </p:style>
-      </p:cxnSp>
-      <p:cxnSp>
-        <p:nvCxnSpPr>
-          <p:cNvPr id="83" name="直线箭头连接符 82"/>
-          <p:cNvCxnSpPr>
-            <a:stCxn id="28" idx="1"/>
-            <a:endCxn id="30" idx="3"/>
-          </p:cNvCxnSpPr>
-          <p:nvPr/>
-        </p:nvCxnSpPr>
-        <p:spPr>
-          <a:xfrm flipH="1">
-            <a:off x="92075" y="4127352"/>
-            <a:ext cx="718185" cy="0"/>
-          </a:xfrm>
-          <a:prstGeom prst="straightConnector1">
-            <a:avLst/>
-          </a:prstGeom>
-          <a:ln>
-            <a:solidFill>
-              <a:schemeClr val="tx1"/>
-            </a:solidFill>
-            <a:tailEnd type="arrow"/>
-          </a:ln>
-        </p:spPr>
-        <p:style>
-          <a:lnRef idx="2">
-            <a:schemeClr val="accent1"/>
-          </a:lnRef>
-          <a:fillRef idx="0">
-            <a:schemeClr val="accent1"/>
-          </a:fillRef>
-          <a:effectRef idx="1">
-            <a:schemeClr val="accent1"/>
-          </a:effectRef>
-          <a:fontRef idx="minor">
-            <a:schemeClr val="tx1"/>
-          </a:fontRef>
-        </p:style>
-      </p:cxnSp>
-      <p:cxnSp>
-        <p:nvCxnSpPr>
-          <p:cNvPr id="85" name="直线箭头连接符 84"/>
-          <p:cNvCxnSpPr>
-            <a:stCxn id="12" idx="1"/>
-            <a:endCxn id="14" idx="3"/>
-          </p:cNvCxnSpPr>
-          <p:nvPr/>
-        </p:nvCxnSpPr>
-        <p:spPr>
-          <a:xfrm flipH="1">
-            <a:off x="5186045" y="5261462"/>
-            <a:ext cx="718185" cy="0"/>
-          </a:xfrm>
-          <a:prstGeom prst="straightConnector1">
-            <a:avLst/>
-          </a:prstGeom>
-          <a:ln>
-            <a:solidFill>
-              <a:schemeClr val="tx1"/>
-            </a:solidFill>
-            <a:tailEnd type="arrow"/>
-          </a:ln>
-        </p:spPr>
-        <p:style>
-          <a:lnRef idx="2">
-            <a:schemeClr val="accent1"/>
-          </a:lnRef>
-          <a:fillRef idx="0">
-            <a:schemeClr val="accent1"/>
-          </a:fillRef>
-          <a:effectRef idx="1">
-            <a:schemeClr val="accent1"/>
-          </a:effectRef>
-          <a:fontRef idx="minor">
-            <a:schemeClr val="tx1"/>
-          </a:fontRef>
-        </p:style>
-      </p:cxnSp>
-      <p:cxnSp>
-        <p:nvCxnSpPr>
-          <p:cNvPr id="87" name="直线箭头连接符 86"/>
-          <p:cNvCxnSpPr>
-            <a:stCxn id="14" idx="1"/>
-            <a:endCxn id="15" idx="3"/>
-          </p:cNvCxnSpPr>
-          <p:nvPr/>
-        </p:nvCxnSpPr>
-        <p:spPr>
-          <a:xfrm flipH="1">
-            <a:off x="2639060" y="5261462"/>
-            <a:ext cx="718185" cy="0"/>
-          </a:xfrm>
-          <a:prstGeom prst="straightConnector1">
-            <a:avLst/>
-          </a:prstGeom>
-          <a:ln>
-            <a:solidFill>
-              <a:schemeClr val="tx1"/>
-            </a:solidFill>
-            <a:tailEnd type="arrow"/>
-          </a:ln>
-        </p:spPr>
-        <p:style>
-          <a:lnRef idx="2">
-            <a:schemeClr val="accent1"/>
-          </a:lnRef>
-          <a:fillRef idx="0">
-            <a:schemeClr val="accent1"/>
-          </a:fillRef>
-          <a:effectRef idx="1">
-            <a:schemeClr val="accent1"/>
-          </a:effectRef>
-          <a:fontRef idx="minor">
-            <a:schemeClr val="tx1"/>
-          </a:fontRef>
-        </p:style>
-      </p:cxnSp>
-      <p:cxnSp>
-        <p:nvCxnSpPr>
-          <p:cNvPr id="89" name="直线箭头连接符 88"/>
-          <p:cNvCxnSpPr>
-            <a:stCxn id="15" idx="1"/>
-            <a:endCxn id="29" idx="3"/>
-          </p:cNvCxnSpPr>
-          <p:nvPr/>
-        </p:nvCxnSpPr>
-        <p:spPr>
-          <a:xfrm flipH="1">
-            <a:off x="92075" y="5261462"/>
-            <a:ext cx="718185" cy="0"/>
-          </a:xfrm>
-          <a:prstGeom prst="straightConnector1">
-            <a:avLst/>
-          </a:prstGeom>
-          <a:ln>
-            <a:solidFill>
-              <a:schemeClr val="tx1"/>
-            </a:solidFill>
-            <a:tailEnd type="arrow"/>
-          </a:ln>
-        </p:spPr>
-        <p:style>
-          <a:lnRef idx="2">
-            <a:schemeClr val="accent1"/>
-          </a:lnRef>
-          <a:fillRef idx="0">
-            <a:schemeClr val="accent1"/>
-          </a:fillRef>
-          <a:effectRef idx="1">
-            <a:schemeClr val="accent1"/>
-          </a:effectRef>
-          <a:fontRef idx="minor">
-            <a:schemeClr val="tx1"/>
-          </a:fontRef>
-        </p:style>
-      </p:cxnSp>
-      <p:cxnSp>
-        <p:nvCxnSpPr>
-          <p:cNvPr id="91" name="肘形连接符 90"/>
-          <p:cNvCxnSpPr>
-            <a:stCxn id="10" idx="2"/>
-            <a:endCxn id="11" idx="3"/>
-          </p:cNvCxnSpPr>
-          <p:nvPr/>
-        </p:nvCxnSpPr>
-        <p:spPr>
-          <a:xfrm rot="5400000">
-            <a:off x="7676324" y="3372865"/>
-            <a:ext cx="811194" cy="697781"/>
-          </a:xfrm>
-          <a:prstGeom prst="bentConnector2">
-            <a:avLst/>
-          </a:prstGeom>
-          <a:ln>
-            <a:solidFill>
-              <a:schemeClr val="tx1"/>
-            </a:solidFill>
-            <a:tailEnd type="arrow"/>
-          </a:ln>
-        </p:spPr>
-        <p:style>
-          <a:lnRef idx="2">
-            <a:schemeClr val="accent1"/>
-          </a:lnRef>
-          <a:fillRef idx="0">
-            <a:schemeClr val="accent1"/>
-          </a:fillRef>
-          <a:effectRef idx="1">
-            <a:schemeClr val="accent1"/>
-          </a:effectRef>
-          <a:fontRef idx="minor">
-            <a:schemeClr val="tx1"/>
-          </a:fontRef>
-        </p:style>
-      </p:cxnSp>
-      <p:cxnSp>
-        <p:nvCxnSpPr>
-          <p:cNvPr id="93" name="肘形连接符 92"/>
-          <p:cNvCxnSpPr>
-            <a:stCxn id="10" idx="2"/>
-            <a:endCxn id="12" idx="3"/>
-          </p:cNvCxnSpPr>
-          <p:nvPr/>
-        </p:nvCxnSpPr>
-        <p:spPr>
-          <a:xfrm rot="5400000">
-            <a:off x="7109269" y="3939920"/>
-            <a:ext cx="1945304" cy="697781"/>
-          </a:xfrm>
-          <a:prstGeom prst="bentConnector2">
-            <a:avLst/>
-          </a:prstGeom>
-          <a:ln>
-            <a:solidFill>
-              <a:schemeClr val="tx1"/>
-            </a:solidFill>
-            <a:tailEnd type="arrow"/>
-          </a:ln>
-        </p:spPr>
-        <p:style>
-          <a:lnRef idx="2">
-            <a:schemeClr val="accent1"/>
-          </a:lnRef>
-          <a:fillRef idx="0">
-            <a:schemeClr val="accent1"/>
-          </a:fillRef>
-          <a:effectRef idx="1">
-            <a:schemeClr val="accent1"/>
-          </a:effectRef>
-          <a:fontRef idx="minor">
-            <a:schemeClr val="tx1"/>
-          </a:fontRef>
-        </p:style>
-      </p:cxnSp>
-      <p:grpSp>
-        <p:nvGrpSpPr>
-          <p:cNvPr id="116" name="组 115"/>
-          <p:cNvGrpSpPr/>
-          <p:nvPr/>
-        </p:nvGrpSpPr>
-        <p:grpSpPr>
-          <a:xfrm>
-            <a:off x="4927600" y="1349375"/>
-            <a:ext cx="4756150" cy="2184400"/>
-            <a:chOff x="4927600" y="1349375"/>
-            <a:chExt cx="4756150" cy="2184400"/>
-          </a:xfrm>
-        </p:grpSpPr>
-        <p:cxnSp>
-          <p:nvCxnSpPr>
-            <p:cNvPr id="97" name="直线连接符 96"/>
-            <p:cNvCxnSpPr/>
-            <p:nvPr/>
-          </p:nvCxnSpPr>
-          <p:spPr>
-            <a:xfrm>
-              <a:off x="6939280" y="1349375"/>
-              <a:ext cx="2744470" cy="0"/>
-            </a:xfrm>
-            <a:prstGeom prst="line">
-              <a:avLst/>
-            </a:prstGeom>
-            <a:ln>
-              <a:solidFill>
-                <a:schemeClr val="tx1"/>
-              </a:solidFill>
-              <a:prstDash val="dash"/>
-            </a:ln>
-          </p:spPr>
-          <p:style>
-            <a:lnRef idx="2">
-              <a:schemeClr val="accent1"/>
-            </a:lnRef>
-            <a:fillRef idx="0">
-              <a:schemeClr val="accent1"/>
-            </a:fillRef>
-            <a:effectRef idx="1">
-              <a:schemeClr val="accent1"/>
-            </a:effectRef>
-            <a:fontRef idx="minor">
-              <a:schemeClr val="tx1"/>
-            </a:fontRef>
-          </p:style>
-        </p:cxnSp>
-        <p:cxnSp>
-          <p:nvCxnSpPr>
-            <p:cNvPr id="98" name="直线连接符 97"/>
-            <p:cNvCxnSpPr/>
-            <p:nvPr/>
-          </p:nvCxnSpPr>
-          <p:spPr>
-            <a:xfrm>
-              <a:off x="4927600" y="3533775"/>
-              <a:ext cx="4756150" cy="0"/>
-            </a:xfrm>
-            <a:prstGeom prst="line">
-              <a:avLst/>
-            </a:prstGeom>
-            <a:ln>
-              <a:solidFill>
-                <a:schemeClr val="tx1"/>
-              </a:solidFill>
-              <a:prstDash val="dash"/>
-            </a:ln>
-          </p:spPr>
-          <p:style>
-            <a:lnRef idx="2">
-              <a:schemeClr val="accent1"/>
-            </a:lnRef>
-            <a:fillRef idx="0">
-              <a:schemeClr val="accent1"/>
-            </a:fillRef>
-            <a:effectRef idx="1">
-              <a:schemeClr val="accent1"/>
-            </a:effectRef>
-            <a:fontRef idx="minor">
-              <a:schemeClr val="tx1"/>
-            </a:fontRef>
-          </p:style>
-        </p:cxnSp>
-        <p:cxnSp>
-          <p:nvCxnSpPr>
-            <p:cNvPr id="100" name="直线连接符 99"/>
-            <p:cNvCxnSpPr/>
-            <p:nvPr/>
-          </p:nvCxnSpPr>
-          <p:spPr>
-            <a:xfrm flipV="1">
-              <a:off x="9683750" y="1349375"/>
-              <a:ext cx="0" cy="2184400"/>
-            </a:xfrm>
-            <a:prstGeom prst="line">
-              <a:avLst/>
-            </a:prstGeom>
-            <a:ln>
-              <a:solidFill>
-                <a:schemeClr val="tx1"/>
-              </a:solidFill>
-              <a:prstDash val="dash"/>
-            </a:ln>
-          </p:spPr>
-          <p:style>
-            <a:lnRef idx="2">
-              <a:schemeClr val="accent1"/>
-            </a:lnRef>
-            <a:fillRef idx="0">
-              <a:schemeClr val="accent1"/>
-            </a:fillRef>
-            <a:effectRef idx="1">
-              <a:schemeClr val="accent1"/>
-            </a:effectRef>
-            <a:fontRef idx="minor">
-              <a:schemeClr val="tx1"/>
-            </a:fontRef>
-          </p:style>
-        </p:cxnSp>
-        <p:cxnSp>
-          <p:nvCxnSpPr>
-            <p:cNvPr id="104" name="直线连接符 103"/>
-            <p:cNvCxnSpPr/>
-            <p:nvPr/>
-          </p:nvCxnSpPr>
-          <p:spPr>
-            <a:xfrm flipV="1">
-              <a:off x="6939280" y="1349375"/>
-              <a:ext cx="0" cy="520775"/>
-            </a:xfrm>
-            <a:prstGeom prst="line">
-              <a:avLst/>
-            </a:prstGeom>
-            <a:ln>
-              <a:solidFill>
-                <a:schemeClr val="tx1"/>
-              </a:solidFill>
-              <a:prstDash val="dash"/>
-            </a:ln>
-          </p:spPr>
-          <p:style>
-            <a:lnRef idx="2">
-              <a:schemeClr val="accent1"/>
-            </a:lnRef>
-            <a:fillRef idx="0">
-              <a:schemeClr val="accent1"/>
-            </a:fillRef>
-            <a:effectRef idx="1">
-              <a:schemeClr val="accent1"/>
-            </a:effectRef>
-            <a:fontRef idx="minor">
-              <a:schemeClr val="tx1"/>
-            </a:fontRef>
-          </p:style>
-        </p:cxnSp>
-        <p:cxnSp>
-          <p:nvCxnSpPr>
-            <p:cNvPr id="112" name="直线连接符 111"/>
-            <p:cNvCxnSpPr/>
-            <p:nvPr/>
-          </p:nvCxnSpPr>
-          <p:spPr>
-            <a:xfrm>
-              <a:off x="4927600" y="1870150"/>
-              <a:ext cx="2021289" cy="0"/>
-            </a:xfrm>
-            <a:prstGeom prst="line">
-              <a:avLst/>
-            </a:prstGeom>
-            <a:ln>
-              <a:solidFill>
-                <a:schemeClr val="tx1"/>
-              </a:solidFill>
-              <a:prstDash val="dash"/>
-            </a:ln>
-          </p:spPr>
-          <p:style>
-            <a:lnRef idx="2">
-              <a:schemeClr val="accent1"/>
-            </a:lnRef>
-            <a:fillRef idx="0">
-              <a:schemeClr val="accent1"/>
-            </a:fillRef>
-            <a:effectRef idx="1">
-              <a:schemeClr val="accent1"/>
-            </a:effectRef>
-            <a:fontRef idx="minor">
-              <a:schemeClr val="tx1"/>
-            </a:fontRef>
-          </p:style>
-        </p:cxnSp>
-        <p:cxnSp>
-          <p:nvCxnSpPr>
-            <p:cNvPr id="114" name="直线连接符 113"/>
-            <p:cNvCxnSpPr/>
-            <p:nvPr/>
-          </p:nvCxnSpPr>
-          <p:spPr>
-            <a:xfrm flipV="1">
-              <a:off x="4927600" y="1870150"/>
-              <a:ext cx="0" cy="1663625"/>
-            </a:xfrm>
-            <a:prstGeom prst="line">
-              <a:avLst/>
-            </a:prstGeom>
-            <a:ln>
-              <a:solidFill>
-                <a:schemeClr val="tx1"/>
-              </a:solidFill>
-              <a:prstDash val="dash"/>
-            </a:ln>
-          </p:spPr>
-          <p:style>
-            <a:lnRef idx="2">
-              <a:schemeClr val="accent1"/>
-            </a:lnRef>
-            <a:fillRef idx="0">
-              <a:schemeClr val="accent1"/>
-            </a:fillRef>
-            <a:effectRef idx="1">
-              <a:schemeClr val="accent1"/>
-            </a:effectRef>
-            <a:fontRef idx="minor">
-              <a:schemeClr val="tx1"/>
-            </a:fontRef>
-          </p:style>
-        </p:cxnSp>
-      </p:grpSp>
-      <p:sp>
-        <p:nvSpPr>
-          <p:cNvPr id="117" name="文本框 116"/>
-          <p:cNvSpPr txBox="1"/>
-          <p:nvPr/>
-        </p:nvSpPr>
-        <p:spPr>
-          <a:xfrm>
-            <a:off x="5110480" y="2950398"/>
-            <a:ext cx="2036397" cy="369332"/>
-          </a:xfrm>
-          <a:prstGeom prst="rect">
-            <a:avLst/>
-          </a:prstGeom>
-          <a:noFill/>
-        </p:spPr>
-        <p:txBody>
-          <a:bodyPr wrap="none" rtlCol="0">
-            <a:spAutoFit/>
-          </a:bodyPr>
-          <a:lstStyle/>
-          <a:p>
-            <a:r>
-              <a:rPr kumimoji="1" lang="en-US" altLang="zh-CN" b="1" dirty="0" smtClean="0"/>
-              <a:t>Chopper</a:t>
-            </a:r>
-            <a:r>
-              <a:rPr kumimoji="1" lang="zh-CN" altLang="en-US" b="1" dirty="0" smtClean="0"/>
-              <a:t> </a:t>
-            </a:r>
-            <a:r>
-              <a:rPr kumimoji="1" lang="en-US" altLang="zh-CN" b="1" dirty="0" err="1" smtClean="0"/>
-              <a:t>Correlator</a:t>
-            </a:r>
-            <a:endParaRPr kumimoji="1" lang="zh-CN" altLang="en-US" b="1" dirty="0" smtClean="0"/>
-          </a:p>
-        </p:txBody>
-      </p:sp>
-      <p:sp>
-        <p:nvSpPr>
-          <p:cNvPr id="120" name="五角星 119"/>
-          <p:cNvSpPr/>
-          <p:nvPr/>
-        </p:nvSpPr>
-        <p:spPr>
-          <a:xfrm>
-            <a:off x="4975860" y="3058536"/>
-            <a:ext cx="175260" cy="175260"/>
-          </a:xfrm>
-          <a:prstGeom prst="star5">
-            <a:avLst/>
-          </a:prstGeom>
-          <a:solidFill>
-            <a:schemeClr val="tx1"/>
-          </a:solidFill>
-          <a:ln>
-            <a:solidFill>
-              <a:schemeClr val="tx1"/>
-            </a:solidFill>
-          </a:ln>
-        </p:spPr>
-        <p:style>
-          <a:lnRef idx="1">
-            <a:schemeClr val="accent1"/>
-          </a:lnRef>
-          <a:fillRef idx="3">
-            <a:schemeClr val="accent1"/>
-          </a:fillRef>
-          <a:effectRef idx="2">
-            <a:schemeClr val="accent1"/>
-          </a:effectRef>
-          <a:fontRef idx="minor">
-            <a:schemeClr val="lt1"/>
-          </a:fontRef>
-        </p:style>
-        <p:txBody>
-          <a:bodyPr rtlCol="0" anchor="ctr"/>
-          <a:lstStyle/>
-          <a:p>
-            <a:pPr algn="ctr"/>
-            <a:endParaRPr kumimoji="1" lang="zh-CN" altLang="en-US"/>
-          </a:p>
-        </p:txBody>
-      </p:sp>
-      <p:sp>
-        <p:nvSpPr>
-          <p:cNvPr id="121" name="五角星 120"/>
-          <p:cNvSpPr/>
-          <p:nvPr/>
-        </p:nvSpPr>
-        <p:spPr>
-          <a:xfrm>
-            <a:off x="3612515" y="511885"/>
-            <a:ext cx="175260" cy="175260"/>
-          </a:xfrm>
-          <a:prstGeom prst="star5">
-            <a:avLst/>
-          </a:prstGeom>
-          <a:solidFill>
-            <a:schemeClr val="tx1"/>
-          </a:solidFill>
-          <a:ln>
-            <a:solidFill>
-              <a:schemeClr val="tx1"/>
-            </a:solidFill>
-          </a:ln>
-        </p:spPr>
-        <p:style>
-          <a:lnRef idx="1">
-            <a:schemeClr val="accent1"/>
-          </a:lnRef>
-          <a:fillRef idx="3">
-            <a:schemeClr val="accent1"/>
-          </a:fillRef>
-          <a:effectRef idx="2">
-            <a:schemeClr val="accent1"/>
-          </a:effectRef>
-          <a:fontRef idx="minor">
-            <a:schemeClr val="lt1"/>
-          </a:fontRef>
-        </p:style>
-        <p:txBody>
-          <a:bodyPr rtlCol="0" anchor="ctr"/>
-          <a:lstStyle/>
-          <a:p>
-            <a:pPr algn="ctr"/>
-            <a:endParaRPr kumimoji="1" lang="zh-CN" altLang="en-US"/>
-          </a:p>
-        </p:txBody>
-      </p:sp>
-    </p:spTree>
-    <p:extLst>
-      <p:ext uri="{BB962C8B-B14F-4D97-AF65-F5344CB8AC3E}">
-        <p14:creationId xmlns:p14="http://schemas.microsoft.com/office/powerpoint/2010/main" val="954556828"/>
-      </p:ext>
-    </p:extLst>
-  </p:cSld>
-  <p:clrMapOvr>
-    <a:masterClrMapping/>
-  </p:clrMapOvr>
-</p:sld>
-</file>
-
-<file path=ppt/slides/slide6.xml><?xml version="1.0" encoding="utf-8"?>
-<p:sld xmlns:a="http://schemas.openxmlformats.org/drawingml/2006/main" xmlns:r="http://schemas.openxmlformats.org/officeDocument/2006/relationships" xmlns:p="http://schemas.openxmlformats.org/presentationml/2006/main">
-  <p:cSld>
-    <p:spTree>
-      <p:nvGrpSpPr>
-        <p:cNvPr id="1" name=""/>
-        <p:cNvGrpSpPr/>
-        <p:nvPr/>
-      </p:nvGrpSpPr>
-      <p:grpSpPr>
-        <a:xfrm>
-          <a:off x="0" y="0"/>
-          <a:ext cx="0" cy="0"/>
-          <a:chOff x="0" y="0"/>
-          <a:chExt cx="0" cy="0"/>
-        </a:xfrm>
-      </p:grpSpPr>
-      <p:sp>
-        <p:nvSpPr>
-          <p:cNvPr id="4" name="矩形 3"/>
-          <p:cNvSpPr/>
-          <p:nvPr/>
-        </p:nvSpPr>
-        <p:spPr>
-          <a:xfrm>
-            <a:off x="0" y="1116289"/>
-            <a:ext cx="1828800" cy="731520"/>
-          </a:xfrm>
-          <a:prstGeom prst="rect">
-            <a:avLst/>
-          </a:prstGeom>
-          <a:noFill/>
-          <a:ln>
-            <a:solidFill>
-              <a:schemeClr val="tx1"/>
-            </a:solidFill>
-          </a:ln>
-        </p:spPr>
-        <p:style>
-          <a:lnRef idx="1">
-            <a:schemeClr val="accent1"/>
-          </a:lnRef>
-          <a:fillRef idx="3">
-            <a:schemeClr val="accent1"/>
-          </a:fillRef>
-          <a:effectRef idx="2">
-            <a:schemeClr val="accent1"/>
-          </a:effectRef>
-          <a:fontRef idx="minor">
-            <a:schemeClr val="lt1"/>
-          </a:fontRef>
-        </p:style>
-        <p:txBody>
-          <a:bodyPr rtlCol="0" anchor="ctr"/>
-          <a:lstStyle/>
-          <a:p>
-            <a:pPr algn="ctr"/>
-            <a:r>
-              <a:rPr kumimoji="1" lang="en-US" altLang="zh-CN" dirty="0" smtClean="0">
-                <a:solidFill>
-                  <a:schemeClr val="tx1"/>
-                </a:solidFill>
-              </a:rPr>
-              <a:t>Payload</a:t>
-            </a:r>
-          </a:p>
-        </p:txBody>
-      </p:sp>
-      <p:sp>
-        <p:nvSpPr>
-          <p:cNvPr id="5" name="矩形 4"/>
-          <p:cNvSpPr/>
-          <p:nvPr/>
-        </p:nvSpPr>
-        <p:spPr>
-          <a:xfrm>
-            <a:off x="2563411" y="1140863"/>
-            <a:ext cx="1828800" cy="731520"/>
-          </a:xfrm>
-          <a:prstGeom prst="rect">
-            <a:avLst/>
-          </a:prstGeom>
-          <a:noFill/>
-          <a:ln>
-            <a:solidFill>
-              <a:schemeClr val="tx1"/>
-            </a:solidFill>
-          </a:ln>
-        </p:spPr>
-        <p:style>
-          <a:lnRef idx="1">
-            <a:schemeClr val="accent1"/>
-          </a:lnRef>
-          <a:fillRef idx="3">
-            <a:schemeClr val="accent1"/>
-          </a:fillRef>
-          <a:effectRef idx="2">
-            <a:schemeClr val="accent1"/>
-          </a:effectRef>
-          <a:fontRef idx="minor">
-            <a:schemeClr val="lt1"/>
-          </a:fontRef>
-        </p:style>
-        <p:txBody>
-          <a:bodyPr rtlCol="0" anchor="ctr"/>
-          <a:lstStyle/>
-          <a:p>
-            <a:pPr algn="ctr"/>
-            <a:r>
-              <a:rPr kumimoji="1" lang="en-US" altLang="zh-CN" dirty="0" smtClean="0">
-                <a:solidFill>
-                  <a:schemeClr val="tx1"/>
-                </a:solidFill>
-              </a:rPr>
-              <a:t>CRC32</a:t>
-            </a:r>
-          </a:p>
-          <a:p>
-            <a:pPr algn="ctr"/>
-            <a:r>
-              <a:rPr kumimoji="1" lang="en-US" altLang="zh-CN" dirty="0" smtClean="0">
-                <a:solidFill>
-                  <a:schemeClr val="tx1"/>
-                </a:solidFill>
-              </a:rPr>
-              <a:t>Encoder</a:t>
-            </a:r>
-          </a:p>
-        </p:txBody>
-      </p:sp>
-      <p:sp>
-        <p:nvSpPr>
-          <p:cNvPr id="7" name="矩形 6"/>
-          <p:cNvSpPr/>
-          <p:nvPr/>
-        </p:nvSpPr>
-        <p:spPr>
-          <a:xfrm>
-            <a:off x="4978400" y="2595013"/>
-            <a:ext cx="1828800" cy="731520"/>
-          </a:xfrm>
-          <a:prstGeom prst="rect">
-            <a:avLst/>
-          </a:prstGeom>
-          <a:noFill/>
-          <a:ln>
-            <a:solidFill>
-              <a:schemeClr val="tx1"/>
-            </a:solidFill>
-          </a:ln>
-        </p:spPr>
-        <p:style>
-          <a:lnRef idx="1">
-            <a:schemeClr val="accent1"/>
-          </a:lnRef>
-          <a:fillRef idx="3">
-            <a:schemeClr val="accent1"/>
-          </a:fillRef>
-          <a:effectRef idx="2">
-            <a:schemeClr val="accent1"/>
-          </a:effectRef>
-          <a:fontRef idx="minor">
-            <a:schemeClr val="lt1"/>
-          </a:fontRef>
-        </p:style>
-        <p:txBody>
-          <a:bodyPr rtlCol="0" anchor="ctr"/>
-          <a:lstStyle/>
-          <a:p>
-            <a:pPr algn="ctr"/>
-            <a:r>
-              <a:rPr kumimoji="1" lang="en-US" altLang="zh-CN" dirty="0" smtClean="0">
-                <a:solidFill>
-                  <a:schemeClr val="tx1"/>
-                </a:solidFill>
-              </a:rPr>
-              <a:t>Redundant</a:t>
-            </a:r>
-            <a:r>
-              <a:rPr kumimoji="1" lang="zh-CN" altLang="en-US" dirty="0" smtClean="0">
-                <a:solidFill>
-                  <a:schemeClr val="tx1"/>
-                </a:solidFill>
-              </a:rPr>
-              <a:t> </a:t>
-            </a:r>
-            <a:r>
-              <a:rPr kumimoji="1" lang="en-US" altLang="zh-CN" dirty="0" smtClean="0">
-                <a:solidFill>
-                  <a:schemeClr val="tx1"/>
-                </a:solidFill>
-              </a:rPr>
-              <a:t>Bits</a:t>
-            </a:r>
-          </a:p>
-        </p:txBody>
-      </p:sp>
-      <p:sp>
-        <p:nvSpPr>
-          <p:cNvPr id="8" name="矩形 7"/>
-          <p:cNvSpPr/>
-          <p:nvPr/>
-        </p:nvSpPr>
-        <p:spPr>
-          <a:xfrm>
-            <a:off x="7601669" y="1590570"/>
-            <a:ext cx="1828800" cy="731520"/>
-          </a:xfrm>
-          <a:prstGeom prst="rect">
-            <a:avLst/>
-          </a:prstGeom>
-          <a:noFill/>
-          <a:ln>
-            <a:solidFill>
-              <a:schemeClr val="tx1"/>
-            </a:solidFill>
-          </a:ln>
-        </p:spPr>
-        <p:style>
-          <a:lnRef idx="1">
-            <a:schemeClr val="accent1"/>
-          </a:lnRef>
-          <a:fillRef idx="3">
-            <a:schemeClr val="accent1"/>
-          </a:fillRef>
-          <a:effectRef idx="2">
-            <a:schemeClr val="accent1"/>
-          </a:effectRef>
-          <a:fontRef idx="minor">
-            <a:schemeClr val="lt1"/>
-          </a:fontRef>
-        </p:style>
-        <p:txBody>
-          <a:bodyPr rtlCol="0" anchor="ctr"/>
-          <a:lstStyle/>
-          <a:p>
-            <a:pPr algn="ctr"/>
-            <a:r>
-              <a:rPr kumimoji="1" lang="en-US" altLang="zh-CN" dirty="0" smtClean="0">
-                <a:solidFill>
-                  <a:schemeClr val="tx1"/>
-                </a:solidFill>
-              </a:rPr>
-              <a:t>Tag</a:t>
-            </a:r>
-            <a:r>
-              <a:rPr kumimoji="1" lang="zh-CN" altLang="en-US" dirty="0" smtClean="0">
-                <a:solidFill>
-                  <a:schemeClr val="tx1"/>
-                </a:solidFill>
-              </a:rPr>
-              <a:t> </a:t>
-            </a:r>
-            <a:r>
-              <a:rPr kumimoji="1" lang="en-US" altLang="zh-CN" dirty="0" smtClean="0">
-                <a:solidFill>
-                  <a:schemeClr val="tx1"/>
-                </a:solidFill>
-              </a:rPr>
-              <a:t>Mixer</a:t>
-            </a:r>
-          </a:p>
-        </p:txBody>
-      </p:sp>
-      <p:sp>
-        <p:nvSpPr>
-          <p:cNvPr id="9" name="矩形 8"/>
-          <p:cNvSpPr/>
-          <p:nvPr/>
-        </p:nvSpPr>
-        <p:spPr>
-          <a:xfrm>
-            <a:off x="-4718050" y="3623057"/>
-            <a:ext cx="1828800" cy="731520"/>
-          </a:xfrm>
-          <a:prstGeom prst="rect">
-            <a:avLst/>
-          </a:prstGeom>
-          <a:noFill/>
-          <a:ln>
-            <a:solidFill>
-              <a:schemeClr val="tx1"/>
-            </a:solidFill>
-          </a:ln>
-        </p:spPr>
-        <p:style>
-          <a:lnRef idx="1">
-            <a:schemeClr val="accent1"/>
-          </a:lnRef>
-          <a:fillRef idx="3">
-            <a:schemeClr val="accent1"/>
-          </a:fillRef>
-          <a:effectRef idx="2">
-            <a:schemeClr val="accent1"/>
-          </a:effectRef>
-          <a:fontRef idx="minor">
-            <a:schemeClr val="lt1"/>
-          </a:fontRef>
-        </p:style>
-        <p:txBody>
-          <a:bodyPr rtlCol="0" anchor="ctr"/>
-          <a:lstStyle/>
-          <a:p>
-            <a:pPr algn="ctr"/>
-            <a:r>
-              <a:rPr kumimoji="1" lang="en-US" altLang="zh-CN" dirty="0" smtClean="0">
-                <a:solidFill>
-                  <a:schemeClr val="tx1"/>
-                </a:solidFill>
-              </a:rPr>
-              <a:t>Data</a:t>
-            </a:r>
-            <a:r>
-              <a:rPr kumimoji="1" lang="zh-CN" altLang="en-US" dirty="0" smtClean="0">
-                <a:solidFill>
-                  <a:schemeClr val="tx1"/>
-                </a:solidFill>
-              </a:rPr>
-              <a:t> </a:t>
-            </a:r>
-            <a:r>
-              <a:rPr kumimoji="1" lang="en-US" altLang="zh-CN" dirty="0" smtClean="0">
-                <a:solidFill>
-                  <a:schemeClr val="tx1"/>
-                </a:solidFill>
-              </a:rPr>
-              <a:t>String</a:t>
-            </a:r>
-            <a:r>
-              <a:rPr kumimoji="1" lang="zh-CN" altLang="en-US" dirty="0" smtClean="0">
-                <a:solidFill>
-                  <a:schemeClr val="tx1"/>
-                </a:solidFill>
-              </a:rPr>
-              <a:t> </a:t>
-            </a:r>
-            <a:r>
-              <a:rPr kumimoji="1" lang="en-US" altLang="zh-CN" dirty="0" smtClean="0">
-                <a:solidFill>
-                  <a:schemeClr val="tx1"/>
-                </a:solidFill>
-              </a:rPr>
-              <a:t>Power</a:t>
-            </a:r>
-          </a:p>
-        </p:txBody>
-      </p:sp>
-      <p:grpSp>
-        <p:nvGrpSpPr>
-          <p:cNvPr id="10" name="组 9"/>
-          <p:cNvGrpSpPr/>
-          <p:nvPr/>
-        </p:nvGrpSpPr>
-        <p:grpSpPr>
-          <a:xfrm>
-            <a:off x="9430469" y="3636497"/>
-            <a:ext cx="381000" cy="381000"/>
-            <a:chOff x="5238750" y="698500"/>
-            <a:chExt cx="381000" cy="381000"/>
-          </a:xfrm>
-        </p:grpSpPr>
-        <p:sp>
-          <p:nvSpPr>
-            <p:cNvPr id="11" name="椭圆 10"/>
-            <p:cNvSpPr/>
-            <p:nvPr/>
-          </p:nvSpPr>
-          <p:spPr>
-            <a:xfrm>
-              <a:off x="5238750" y="698500"/>
-              <a:ext cx="381000" cy="381000"/>
-            </a:xfrm>
-            <a:prstGeom prst="ellipse">
-              <a:avLst/>
-            </a:prstGeom>
-            <a:noFill/>
-            <a:ln w="38100">
-              <a:solidFill>
-                <a:schemeClr val="tx1"/>
-              </a:solidFill>
-            </a:ln>
-          </p:spPr>
-          <p:style>
-            <a:lnRef idx="1">
-              <a:schemeClr val="accent1"/>
-            </a:lnRef>
-            <a:fillRef idx="3">
-              <a:schemeClr val="accent1"/>
-            </a:fillRef>
-            <a:effectRef idx="2">
-              <a:schemeClr val="accent1"/>
-            </a:effectRef>
-            <a:fontRef idx="minor">
-              <a:schemeClr val="lt1"/>
-            </a:fontRef>
-          </p:style>
-          <p:txBody>
-            <a:bodyPr rtlCol="0" anchor="ctr"/>
-            <a:lstStyle/>
-            <a:p>
-              <a:pPr algn="ctr"/>
-              <a:endParaRPr kumimoji="1" lang="zh-CN" altLang="en-US"/>
-            </a:p>
-          </p:txBody>
-        </p:sp>
-        <p:cxnSp>
-          <p:nvCxnSpPr>
-            <p:cNvPr id="12" name="直线连接符 11"/>
-            <p:cNvCxnSpPr>
-              <a:stCxn id="11" idx="1"/>
-              <a:endCxn id="11" idx="5"/>
-            </p:cNvCxnSpPr>
-            <p:nvPr/>
-          </p:nvCxnSpPr>
-          <p:spPr>
-            <a:xfrm>
-              <a:off x="5294546" y="754296"/>
-              <a:ext cx="269408" cy="269408"/>
-            </a:xfrm>
-            <a:prstGeom prst="line">
-              <a:avLst/>
-            </a:prstGeom>
-            <a:ln w="38100">
-              <a:solidFill>
-                <a:schemeClr val="tx1"/>
-              </a:solidFill>
-            </a:ln>
-          </p:spPr>
-          <p:style>
-            <a:lnRef idx="2">
-              <a:schemeClr val="accent1"/>
-            </a:lnRef>
-            <a:fillRef idx="0">
-              <a:schemeClr val="accent1"/>
-            </a:fillRef>
-            <a:effectRef idx="1">
-              <a:schemeClr val="accent1"/>
-            </a:effectRef>
-            <a:fontRef idx="minor">
-              <a:schemeClr val="tx1"/>
-            </a:fontRef>
-          </p:style>
-        </p:cxnSp>
-        <p:cxnSp>
-          <p:nvCxnSpPr>
-            <p:cNvPr id="13" name="直线连接符 12"/>
-            <p:cNvCxnSpPr>
-              <a:stCxn id="11" idx="7"/>
-              <a:endCxn id="11" idx="3"/>
-            </p:cNvCxnSpPr>
-            <p:nvPr/>
-          </p:nvCxnSpPr>
-          <p:spPr>
-            <a:xfrm flipH="1">
-              <a:off x="5294546" y="754296"/>
-              <a:ext cx="269408" cy="269408"/>
-            </a:xfrm>
-            <a:prstGeom prst="line">
-              <a:avLst/>
-            </a:prstGeom>
-            <a:ln w="38100">
-              <a:solidFill>
-                <a:schemeClr val="tx1"/>
-              </a:solidFill>
-            </a:ln>
-          </p:spPr>
-          <p:style>
-            <a:lnRef idx="2">
-              <a:schemeClr val="accent1"/>
-            </a:lnRef>
-            <a:fillRef idx="0">
-              <a:schemeClr val="accent1"/>
-            </a:fillRef>
-            <a:effectRef idx="1">
-              <a:schemeClr val="accent1"/>
-            </a:effectRef>
-            <a:fontRef idx="minor">
-              <a:schemeClr val="tx1"/>
-            </a:fontRef>
-          </p:style>
-        </p:cxnSp>
-      </p:grpSp>
-      <p:grpSp>
-        <p:nvGrpSpPr>
-          <p:cNvPr id="14" name="组 13"/>
-          <p:cNvGrpSpPr/>
-          <p:nvPr/>
-        </p:nvGrpSpPr>
-        <p:grpSpPr>
-          <a:xfrm>
-            <a:off x="3422015" y="2904977"/>
-            <a:ext cx="381000" cy="381000"/>
-            <a:chOff x="5238750" y="698500"/>
-            <a:chExt cx="381000" cy="381000"/>
-          </a:xfrm>
-        </p:grpSpPr>
-        <p:sp>
-          <p:nvSpPr>
-            <p:cNvPr id="15" name="椭圆 14"/>
-            <p:cNvSpPr/>
-            <p:nvPr/>
-          </p:nvSpPr>
-          <p:spPr>
-            <a:xfrm>
-              <a:off x="5238750" y="698500"/>
-              <a:ext cx="381000" cy="381000"/>
-            </a:xfrm>
-            <a:prstGeom prst="ellipse">
-              <a:avLst/>
-            </a:prstGeom>
-            <a:noFill/>
-            <a:ln w="38100">
-              <a:solidFill>
-                <a:schemeClr val="tx1"/>
-              </a:solidFill>
-            </a:ln>
-          </p:spPr>
-          <p:style>
-            <a:lnRef idx="1">
-              <a:schemeClr val="accent1"/>
-            </a:lnRef>
-            <a:fillRef idx="3">
-              <a:schemeClr val="accent1"/>
-            </a:fillRef>
-            <a:effectRef idx="2">
-              <a:schemeClr val="accent1"/>
-            </a:effectRef>
-            <a:fontRef idx="minor">
-              <a:schemeClr val="lt1"/>
-            </a:fontRef>
-          </p:style>
-          <p:txBody>
-            <a:bodyPr rtlCol="0" anchor="ctr"/>
-            <a:lstStyle/>
-            <a:p>
-              <a:pPr algn="ctr"/>
-              <a:endParaRPr kumimoji="1" lang="zh-CN" altLang="en-US"/>
-            </a:p>
-          </p:txBody>
-        </p:sp>
-        <p:cxnSp>
-          <p:nvCxnSpPr>
-            <p:cNvPr id="16" name="直线连接符 15"/>
-            <p:cNvCxnSpPr>
-              <a:stCxn id="15" idx="1"/>
-              <a:endCxn id="15" idx="5"/>
-            </p:cNvCxnSpPr>
-            <p:nvPr/>
-          </p:nvCxnSpPr>
-          <p:spPr>
-            <a:xfrm>
-              <a:off x="5294546" y="754296"/>
-              <a:ext cx="269408" cy="269408"/>
-            </a:xfrm>
-            <a:prstGeom prst="line">
-              <a:avLst/>
-            </a:prstGeom>
-            <a:ln w="38100">
-              <a:solidFill>
-                <a:schemeClr val="tx1"/>
-              </a:solidFill>
-            </a:ln>
-          </p:spPr>
-          <p:style>
-            <a:lnRef idx="2">
-              <a:schemeClr val="accent1"/>
-            </a:lnRef>
-            <a:fillRef idx="0">
-              <a:schemeClr val="accent1"/>
-            </a:fillRef>
-            <a:effectRef idx="1">
-              <a:schemeClr val="accent1"/>
-            </a:effectRef>
-            <a:fontRef idx="minor">
-              <a:schemeClr val="tx1"/>
-            </a:fontRef>
-          </p:style>
-        </p:cxnSp>
-        <p:cxnSp>
-          <p:nvCxnSpPr>
-            <p:cNvPr id="17" name="直线连接符 16"/>
-            <p:cNvCxnSpPr>
-              <a:stCxn id="15" idx="7"/>
-              <a:endCxn id="15" idx="3"/>
-            </p:cNvCxnSpPr>
-            <p:nvPr/>
-          </p:nvCxnSpPr>
-          <p:spPr>
-            <a:xfrm flipH="1">
-              <a:off x="5294546" y="754296"/>
-              <a:ext cx="269408" cy="269408"/>
-            </a:xfrm>
-            <a:prstGeom prst="line">
-              <a:avLst/>
-            </a:prstGeom>
-            <a:ln w="38100">
-              <a:solidFill>
-                <a:schemeClr val="tx1"/>
-              </a:solidFill>
-            </a:ln>
-          </p:spPr>
-          <p:style>
-            <a:lnRef idx="2">
-              <a:schemeClr val="accent1"/>
-            </a:lnRef>
-            <a:fillRef idx="0">
-              <a:schemeClr val="accent1"/>
-            </a:fillRef>
-            <a:effectRef idx="1">
-              <a:schemeClr val="accent1"/>
-            </a:effectRef>
-            <a:fontRef idx="minor">
-              <a:schemeClr val="tx1"/>
-            </a:fontRef>
-          </p:style>
-        </p:cxnSp>
-      </p:grpSp>
-      <p:sp>
-        <p:nvSpPr>
-          <p:cNvPr id="18" name="矩形 17"/>
-          <p:cNvSpPr/>
-          <p:nvPr/>
-        </p:nvSpPr>
-        <p:spPr>
-          <a:xfrm>
-            <a:off x="-4626610" y="4506977"/>
-            <a:ext cx="1828800" cy="731520"/>
-          </a:xfrm>
-          <a:prstGeom prst="rect">
-            <a:avLst/>
-          </a:prstGeom>
-          <a:noFill/>
-          <a:ln>
-            <a:solidFill>
-              <a:schemeClr val="tx1"/>
-            </a:solidFill>
-          </a:ln>
-        </p:spPr>
-        <p:style>
-          <a:lnRef idx="1">
-            <a:schemeClr val="accent1"/>
-          </a:lnRef>
-          <a:fillRef idx="3">
-            <a:schemeClr val="accent1"/>
-          </a:fillRef>
-          <a:effectRef idx="2">
-            <a:schemeClr val="accent1"/>
-          </a:effectRef>
-          <a:fontRef idx="minor">
-            <a:schemeClr val="lt1"/>
-          </a:fontRef>
-        </p:style>
-        <p:txBody>
-          <a:bodyPr rtlCol="0" anchor="ctr"/>
-          <a:lstStyle/>
-          <a:p>
-            <a:pPr algn="ctr"/>
-            <a:r>
-              <a:rPr kumimoji="1" lang="en-US" altLang="zh-CN" dirty="0" smtClean="0">
-                <a:solidFill>
-                  <a:schemeClr val="tx1"/>
-                </a:solidFill>
-              </a:rPr>
-              <a:t>Training</a:t>
-            </a:r>
-            <a:r>
-              <a:rPr kumimoji="1" lang="zh-CN" altLang="en-US" dirty="0" smtClean="0">
-                <a:solidFill>
-                  <a:schemeClr val="tx1"/>
-                </a:solidFill>
-              </a:rPr>
-              <a:t> </a:t>
-            </a:r>
-            <a:r>
-              <a:rPr kumimoji="1" lang="en-US" altLang="zh-CN" dirty="0" smtClean="0">
-                <a:solidFill>
-                  <a:schemeClr val="tx1"/>
-                </a:solidFill>
-              </a:rPr>
-              <a:t>String</a:t>
-            </a:r>
-            <a:r>
-              <a:rPr kumimoji="1" lang="zh-CN" altLang="en-US" dirty="0" smtClean="0">
-                <a:solidFill>
-                  <a:schemeClr val="tx1"/>
-                </a:solidFill>
-              </a:rPr>
-              <a:t> </a:t>
-            </a:r>
-            <a:r>
-              <a:rPr kumimoji="1" lang="en-US" altLang="zh-CN" dirty="0" smtClean="0">
-                <a:solidFill>
-                  <a:schemeClr val="tx1"/>
-                </a:solidFill>
-              </a:rPr>
-              <a:t>Power</a:t>
-            </a:r>
-          </a:p>
-        </p:txBody>
-      </p:sp>
-      <p:sp>
-        <p:nvSpPr>
-          <p:cNvPr id="19" name="矩形 18"/>
-          <p:cNvSpPr/>
-          <p:nvPr/>
-        </p:nvSpPr>
-        <p:spPr>
-          <a:xfrm>
-            <a:off x="-2889250" y="1956330"/>
-            <a:ext cx="1828800" cy="731520"/>
-          </a:xfrm>
-          <a:prstGeom prst="rect">
-            <a:avLst/>
-          </a:prstGeom>
-          <a:noFill/>
-          <a:ln>
-            <a:solidFill>
-              <a:schemeClr val="tx1"/>
-            </a:solidFill>
-          </a:ln>
-        </p:spPr>
-        <p:style>
-          <a:lnRef idx="1">
-            <a:schemeClr val="accent1"/>
-          </a:lnRef>
-          <a:fillRef idx="3">
-            <a:schemeClr val="accent1"/>
-          </a:fillRef>
-          <a:effectRef idx="2">
-            <a:schemeClr val="accent1"/>
-          </a:effectRef>
-          <a:fontRef idx="minor">
-            <a:schemeClr val="lt1"/>
-          </a:fontRef>
-        </p:style>
-        <p:txBody>
-          <a:bodyPr rtlCol="0" anchor="ctr"/>
-          <a:lstStyle/>
-          <a:p>
-            <a:pPr algn="ctr"/>
-            <a:r>
-              <a:rPr kumimoji="1" lang="en-US" altLang="zh-CN" dirty="0" err="1" smtClean="0">
-                <a:solidFill>
-                  <a:schemeClr val="tx1"/>
-                </a:solidFill>
-              </a:rPr>
-              <a:t>Convoluion</a:t>
-            </a:r>
-            <a:endParaRPr kumimoji="1" lang="en-US" altLang="zh-CN" dirty="0" smtClean="0">
-              <a:solidFill>
-                <a:schemeClr val="tx1"/>
-              </a:solidFill>
-            </a:endParaRPr>
-          </a:p>
-        </p:txBody>
-      </p:sp>
-      <p:sp>
-        <p:nvSpPr>
-          <p:cNvPr id="20" name="矩形 19"/>
-          <p:cNvSpPr/>
-          <p:nvPr/>
-        </p:nvSpPr>
-        <p:spPr>
-          <a:xfrm>
-            <a:off x="-2736850" y="2840250"/>
-            <a:ext cx="1828800" cy="731520"/>
-          </a:xfrm>
-          <a:prstGeom prst="rect">
-            <a:avLst/>
-          </a:prstGeom>
-          <a:noFill/>
-          <a:ln>
-            <a:solidFill>
-              <a:schemeClr val="tx1"/>
-            </a:solidFill>
-          </a:ln>
-        </p:spPr>
-        <p:style>
-          <a:lnRef idx="1">
-            <a:schemeClr val="accent1"/>
-          </a:lnRef>
-          <a:fillRef idx="3">
-            <a:schemeClr val="accent1"/>
-          </a:fillRef>
-          <a:effectRef idx="2">
-            <a:schemeClr val="accent1"/>
-          </a:effectRef>
-          <a:fontRef idx="minor">
-            <a:schemeClr val="lt1"/>
-          </a:fontRef>
-        </p:style>
-        <p:txBody>
-          <a:bodyPr rtlCol="0" anchor="ctr"/>
-          <a:lstStyle/>
-          <a:p>
-            <a:pPr algn="ctr"/>
-            <a:r>
-              <a:rPr kumimoji="1" lang="en-US" altLang="zh-CN" dirty="0" err="1" smtClean="0">
-                <a:solidFill>
-                  <a:schemeClr val="tx1"/>
-                </a:solidFill>
-              </a:rPr>
-              <a:t>Convoluion</a:t>
-            </a:r>
-            <a:endParaRPr kumimoji="1" lang="en-US" altLang="zh-CN" dirty="0" smtClean="0">
-              <a:solidFill>
-                <a:schemeClr val="tx1"/>
-              </a:solidFill>
-            </a:endParaRPr>
-          </a:p>
-        </p:txBody>
-      </p:sp>
-      <p:sp>
-        <p:nvSpPr>
-          <p:cNvPr id="21" name="矩形 20"/>
-          <p:cNvSpPr/>
-          <p:nvPr/>
-        </p:nvSpPr>
-        <p:spPr>
-          <a:xfrm>
-            <a:off x="-2501900" y="3824500"/>
-            <a:ext cx="1828800" cy="731520"/>
-          </a:xfrm>
-          <a:prstGeom prst="rect">
-            <a:avLst/>
-          </a:prstGeom>
-          <a:noFill/>
-          <a:ln>
-            <a:solidFill>
-              <a:schemeClr val="tx1"/>
-            </a:solidFill>
-          </a:ln>
-        </p:spPr>
-        <p:style>
-          <a:lnRef idx="1">
-            <a:schemeClr val="accent1"/>
-          </a:lnRef>
-          <a:fillRef idx="3">
-            <a:schemeClr val="accent1"/>
-          </a:fillRef>
-          <a:effectRef idx="2">
-            <a:schemeClr val="accent1"/>
-          </a:effectRef>
-          <a:fontRef idx="minor">
-            <a:schemeClr val="lt1"/>
-          </a:fontRef>
-        </p:style>
-        <p:txBody>
-          <a:bodyPr rtlCol="0" anchor="ctr"/>
-          <a:lstStyle/>
-          <a:p>
-            <a:pPr algn="ctr"/>
-            <a:r>
-              <a:rPr kumimoji="1" lang="en-US" altLang="zh-CN" dirty="0" err="1" smtClean="0">
-                <a:solidFill>
-                  <a:schemeClr val="tx1"/>
-                </a:solidFill>
-              </a:rPr>
-              <a:t>Convoluion</a:t>
-            </a:r>
-            <a:endParaRPr kumimoji="1" lang="en-US" altLang="zh-CN" dirty="0" smtClean="0">
-              <a:solidFill>
-                <a:schemeClr val="tx1"/>
-              </a:solidFill>
-            </a:endParaRPr>
-          </a:p>
-        </p:txBody>
-      </p:sp>
-      <p:sp>
-        <p:nvSpPr>
-          <p:cNvPr id="22" name="矩形 21"/>
-          <p:cNvSpPr/>
-          <p:nvPr/>
-        </p:nvSpPr>
-        <p:spPr>
-          <a:xfrm>
-            <a:off x="-2320925" y="4682237"/>
-            <a:ext cx="1828800" cy="731520"/>
-          </a:xfrm>
-          <a:prstGeom prst="rect">
-            <a:avLst/>
-          </a:prstGeom>
-          <a:noFill/>
-          <a:ln>
-            <a:solidFill>
-              <a:schemeClr val="tx1"/>
-            </a:solidFill>
-          </a:ln>
-        </p:spPr>
-        <p:style>
-          <a:lnRef idx="1">
-            <a:schemeClr val="accent1"/>
-          </a:lnRef>
-          <a:fillRef idx="3">
-            <a:schemeClr val="accent1"/>
-          </a:fillRef>
-          <a:effectRef idx="2">
-            <a:schemeClr val="accent1"/>
-          </a:effectRef>
-          <a:fontRef idx="minor">
-            <a:schemeClr val="lt1"/>
-          </a:fontRef>
-        </p:style>
-        <p:txBody>
-          <a:bodyPr rtlCol="0" anchor="ctr"/>
-          <a:lstStyle/>
-          <a:p>
-            <a:pPr algn="ctr"/>
-            <a:r>
-              <a:rPr kumimoji="1" lang="en-US" altLang="zh-CN" dirty="0" smtClean="0">
-                <a:solidFill>
-                  <a:schemeClr val="tx1"/>
-                </a:solidFill>
-              </a:rPr>
-              <a:t>Root</a:t>
-            </a:r>
-            <a:r>
-              <a:rPr kumimoji="1" lang="zh-CN" altLang="en-US" dirty="0" smtClean="0">
-                <a:solidFill>
-                  <a:schemeClr val="tx1"/>
-                </a:solidFill>
-              </a:rPr>
-              <a:t> </a:t>
-            </a:r>
-            <a:r>
-              <a:rPr kumimoji="1" lang="en-US" altLang="zh-CN" dirty="0" smtClean="0">
-                <a:solidFill>
-                  <a:schemeClr val="tx1"/>
-                </a:solidFill>
-              </a:rPr>
-              <a:t>Raise-Cosine</a:t>
-            </a:r>
-            <a:r>
-              <a:rPr kumimoji="1" lang="zh-CN" altLang="en-US" dirty="0" smtClean="0">
-                <a:solidFill>
-                  <a:schemeClr val="tx1"/>
-                </a:solidFill>
-              </a:rPr>
-              <a:t> </a:t>
-            </a:r>
-            <a:r>
-              <a:rPr kumimoji="1" lang="en-US" altLang="zh-CN" dirty="0" smtClean="0">
-                <a:solidFill>
-                  <a:schemeClr val="tx1"/>
-                </a:solidFill>
-              </a:rPr>
-              <a:t>Filter</a:t>
-            </a:r>
-          </a:p>
-        </p:txBody>
-      </p:sp>
-      <p:sp>
-        <p:nvSpPr>
-          <p:cNvPr id="6" name="矩形 5"/>
-          <p:cNvSpPr/>
-          <p:nvPr/>
-        </p:nvSpPr>
-        <p:spPr>
-          <a:xfrm>
-            <a:off x="4978400" y="656146"/>
-            <a:ext cx="1828800" cy="731520"/>
-          </a:xfrm>
-          <a:prstGeom prst="rect">
-            <a:avLst/>
-          </a:prstGeom>
-          <a:noFill/>
-          <a:ln>
-            <a:solidFill>
-              <a:schemeClr val="tx1"/>
-            </a:solidFill>
-          </a:ln>
-        </p:spPr>
-        <p:style>
-          <a:lnRef idx="1">
-            <a:schemeClr val="accent1"/>
-          </a:lnRef>
-          <a:fillRef idx="3">
-            <a:schemeClr val="accent1"/>
-          </a:fillRef>
-          <a:effectRef idx="2">
-            <a:schemeClr val="accent1"/>
-          </a:effectRef>
-          <a:fontRef idx="minor">
-            <a:schemeClr val="lt1"/>
-          </a:fontRef>
-        </p:style>
-        <p:txBody>
-          <a:bodyPr rtlCol="0" anchor="ctr"/>
-          <a:lstStyle/>
-          <a:p>
-            <a:pPr algn="ctr"/>
-            <a:r>
-              <a:rPr kumimoji="1" lang="en-US" altLang="zh-CN" dirty="0" smtClean="0">
-                <a:solidFill>
-                  <a:schemeClr val="tx1"/>
-                </a:solidFill>
-              </a:rPr>
-              <a:t>Packet</a:t>
-            </a:r>
-            <a:r>
-              <a:rPr kumimoji="1" lang="zh-CN" altLang="en-US" dirty="0" smtClean="0">
-                <a:solidFill>
-                  <a:schemeClr val="tx1"/>
-                </a:solidFill>
-              </a:rPr>
-              <a:t> </a:t>
-            </a:r>
-            <a:r>
-              <a:rPr kumimoji="1" lang="en-US" altLang="zh-CN" dirty="0" smtClean="0">
-                <a:solidFill>
-                  <a:schemeClr val="tx1"/>
-                </a:solidFill>
-              </a:rPr>
-              <a:t>Header</a:t>
-            </a:r>
-            <a:r>
-              <a:rPr kumimoji="1" lang="zh-CN" altLang="en-US" dirty="0" smtClean="0">
-                <a:solidFill>
-                  <a:schemeClr val="tx1"/>
-                </a:solidFill>
-              </a:rPr>
-              <a:t> </a:t>
-            </a:r>
-            <a:r>
-              <a:rPr kumimoji="1" lang="en-US" altLang="zh-CN" dirty="0" smtClean="0">
-                <a:solidFill>
-                  <a:schemeClr val="tx1"/>
-                </a:solidFill>
-              </a:rPr>
-              <a:t>Formatter</a:t>
-            </a:r>
-          </a:p>
-        </p:txBody>
-      </p:sp>
-      <p:sp>
-        <p:nvSpPr>
-          <p:cNvPr id="23" name="矩形 22"/>
-          <p:cNvSpPr/>
-          <p:nvPr/>
-        </p:nvSpPr>
-        <p:spPr>
-          <a:xfrm>
-            <a:off x="4978400" y="1625580"/>
-            <a:ext cx="1828800" cy="731520"/>
-          </a:xfrm>
-          <a:prstGeom prst="rect">
-            <a:avLst/>
-          </a:prstGeom>
-          <a:noFill/>
-          <a:ln>
-            <a:solidFill>
-              <a:schemeClr val="tx1"/>
-            </a:solidFill>
-          </a:ln>
-        </p:spPr>
-        <p:style>
-          <a:lnRef idx="1">
-            <a:schemeClr val="accent1"/>
-          </a:lnRef>
-          <a:fillRef idx="3">
-            <a:schemeClr val="accent1"/>
-          </a:fillRef>
-          <a:effectRef idx="2">
-            <a:schemeClr val="accent1"/>
-          </a:effectRef>
-          <a:fontRef idx="minor">
-            <a:schemeClr val="lt1"/>
-          </a:fontRef>
-        </p:style>
-        <p:txBody>
-          <a:bodyPr rtlCol="0" anchor="ctr"/>
-          <a:lstStyle/>
-          <a:p>
-            <a:pPr algn="ctr"/>
-            <a:r>
-              <a:rPr kumimoji="1" lang="en-US" altLang="zh-CN" dirty="0" smtClean="0">
-                <a:solidFill>
-                  <a:schemeClr val="tx1"/>
-                </a:solidFill>
-              </a:rPr>
-              <a:t>Repack</a:t>
-            </a:r>
-            <a:r>
-              <a:rPr kumimoji="1" lang="zh-CN" altLang="en-US" dirty="0" smtClean="0">
-                <a:solidFill>
-                  <a:schemeClr val="tx1"/>
-                </a:solidFill>
-              </a:rPr>
-              <a:t> </a:t>
-            </a:r>
-            <a:r>
-              <a:rPr kumimoji="1" lang="en-US" altLang="zh-CN" dirty="0" smtClean="0">
-                <a:solidFill>
-                  <a:schemeClr val="tx1"/>
-                </a:solidFill>
-              </a:rPr>
-              <a:t>Bits</a:t>
-            </a:r>
-          </a:p>
-        </p:txBody>
-      </p:sp>
-      <p:sp>
-        <p:nvSpPr>
-          <p:cNvPr id="25" name="矩形 24"/>
-          <p:cNvSpPr/>
-          <p:nvPr/>
-        </p:nvSpPr>
-        <p:spPr>
-          <a:xfrm>
-            <a:off x="0" y="3574119"/>
-            <a:ext cx="1828800" cy="731520"/>
-          </a:xfrm>
-          <a:prstGeom prst="rect">
-            <a:avLst/>
-          </a:prstGeom>
-          <a:noFill/>
-          <a:ln>
-            <a:solidFill>
-              <a:schemeClr val="tx1"/>
-            </a:solidFill>
-          </a:ln>
-        </p:spPr>
-        <p:style>
-          <a:lnRef idx="1">
-            <a:schemeClr val="accent1"/>
-          </a:lnRef>
-          <a:fillRef idx="3">
-            <a:schemeClr val="accent1"/>
-          </a:fillRef>
-          <a:effectRef idx="2">
-            <a:schemeClr val="accent1"/>
-          </a:effectRef>
-          <a:fontRef idx="minor">
-            <a:schemeClr val="lt1"/>
-          </a:fontRef>
-        </p:style>
-        <p:txBody>
-          <a:bodyPr rtlCol="0" anchor="ctr"/>
-          <a:lstStyle/>
-          <a:p>
-            <a:pPr algn="ctr"/>
-            <a:r>
-              <a:rPr kumimoji="1" lang="en-US" altLang="zh-CN" dirty="0" smtClean="0">
-                <a:solidFill>
-                  <a:schemeClr val="tx1"/>
-                </a:solidFill>
-              </a:rPr>
-              <a:t>Training</a:t>
-            </a:r>
-            <a:r>
-              <a:rPr kumimoji="1" lang="zh-CN" altLang="en-US" dirty="0" smtClean="0">
-                <a:solidFill>
-                  <a:schemeClr val="tx1"/>
-                </a:solidFill>
-              </a:rPr>
-              <a:t> </a:t>
-            </a:r>
-            <a:r>
-              <a:rPr kumimoji="1" lang="en-US" altLang="zh-CN" dirty="0" err="1" smtClean="0">
-                <a:solidFill>
-                  <a:schemeClr val="tx1"/>
-                </a:solidFill>
-              </a:rPr>
-              <a:t>Seq</a:t>
-            </a:r>
-            <a:endParaRPr kumimoji="1" lang="en-US" altLang="zh-CN" dirty="0" smtClean="0">
-              <a:solidFill>
-                <a:schemeClr val="tx1"/>
-              </a:solidFill>
-            </a:endParaRPr>
-          </a:p>
-        </p:txBody>
-      </p:sp>
-      <p:grpSp>
-        <p:nvGrpSpPr>
-          <p:cNvPr id="34" name="组 33"/>
-          <p:cNvGrpSpPr/>
-          <p:nvPr/>
-        </p:nvGrpSpPr>
-        <p:grpSpPr>
-          <a:xfrm>
-            <a:off x="-5081102" y="2649750"/>
-            <a:ext cx="381000" cy="381000"/>
-            <a:chOff x="2967523" y="3788897"/>
-            <a:chExt cx="381000" cy="381000"/>
-          </a:xfrm>
-        </p:grpSpPr>
-        <p:sp>
-          <p:nvSpPr>
-            <p:cNvPr id="27" name="椭圆 26"/>
-            <p:cNvSpPr/>
-            <p:nvPr/>
-          </p:nvSpPr>
-          <p:spPr>
-            <a:xfrm>
-              <a:off x="2967523" y="3788897"/>
-              <a:ext cx="381000" cy="381000"/>
-            </a:xfrm>
-            <a:prstGeom prst="ellipse">
-              <a:avLst/>
-            </a:prstGeom>
-            <a:noFill/>
-            <a:ln w="38100">
-              <a:solidFill>
-                <a:schemeClr val="tx1"/>
-              </a:solidFill>
-            </a:ln>
-          </p:spPr>
-          <p:style>
-            <a:lnRef idx="1">
-              <a:schemeClr val="accent1"/>
-            </a:lnRef>
-            <a:fillRef idx="3">
-              <a:schemeClr val="accent1"/>
-            </a:fillRef>
-            <a:effectRef idx="2">
-              <a:schemeClr val="accent1"/>
-            </a:effectRef>
-            <a:fontRef idx="minor">
-              <a:schemeClr val="lt1"/>
-            </a:fontRef>
-          </p:style>
-          <p:txBody>
-            <a:bodyPr rtlCol="0" anchor="ctr"/>
-            <a:lstStyle/>
-            <a:p>
-              <a:pPr algn="ctr"/>
-              <a:endParaRPr kumimoji="1" lang="zh-CN" altLang="en-US"/>
-            </a:p>
-          </p:txBody>
-        </p:sp>
-        <p:cxnSp>
-          <p:nvCxnSpPr>
-            <p:cNvPr id="28" name="直线连接符 27"/>
-            <p:cNvCxnSpPr>
-              <a:stCxn id="27" idx="2"/>
-              <a:endCxn id="27" idx="6"/>
-            </p:cNvCxnSpPr>
-            <p:nvPr/>
-          </p:nvCxnSpPr>
-          <p:spPr>
-            <a:xfrm>
-              <a:off x="2967523" y="3979397"/>
-              <a:ext cx="381000" cy="0"/>
-            </a:xfrm>
-            <a:prstGeom prst="line">
-              <a:avLst/>
-            </a:prstGeom>
-            <a:ln w="38100">
-              <a:solidFill>
-                <a:schemeClr val="tx1"/>
-              </a:solidFill>
-            </a:ln>
-          </p:spPr>
-          <p:style>
-            <a:lnRef idx="2">
-              <a:schemeClr val="accent1"/>
-            </a:lnRef>
-            <a:fillRef idx="0">
-              <a:schemeClr val="accent1"/>
-            </a:fillRef>
-            <a:effectRef idx="1">
-              <a:schemeClr val="accent1"/>
-            </a:effectRef>
-            <a:fontRef idx="minor">
-              <a:schemeClr val="tx1"/>
-            </a:fontRef>
-          </p:style>
-        </p:cxnSp>
-        <p:cxnSp>
-          <p:nvCxnSpPr>
-            <p:cNvPr id="29" name="直线连接符 28"/>
-            <p:cNvCxnSpPr>
-              <a:stCxn id="27" idx="0"/>
-              <a:endCxn id="27" idx="4"/>
-            </p:cNvCxnSpPr>
-            <p:nvPr/>
-          </p:nvCxnSpPr>
-          <p:spPr>
-            <a:xfrm>
-              <a:off x="3158023" y="3788897"/>
-              <a:ext cx="0" cy="381000"/>
-            </a:xfrm>
-            <a:prstGeom prst="line">
-              <a:avLst/>
-            </a:prstGeom>
-            <a:ln w="38100">
-              <a:solidFill>
-                <a:schemeClr val="tx1"/>
-              </a:solidFill>
-            </a:ln>
-          </p:spPr>
-          <p:style>
-            <a:lnRef idx="2">
-              <a:schemeClr val="accent1"/>
-            </a:lnRef>
-            <a:fillRef idx="0">
-              <a:schemeClr val="accent1"/>
-            </a:fillRef>
-            <a:effectRef idx="1">
-              <a:schemeClr val="accent1"/>
-            </a:effectRef>
-            <a:fontRef idx="minor">
-              <a:schemeClr val="tx1"/>
-            </a:fontRef>
-          </p:style>
-        </p:cxnSp>
-      </p:grpSp>
-      <p:cxnSp>
-        <p:nvCxnSpPr>
-          <p:cNvPr id="37" name="肘形连接符 36"/>
-          <p:cNvCxnSpPr>
-            <a:stCxn id="5" idx="3"/>
-            <a:endCxn id="6" idx="1"/>
-          </p:cNvCxnSpPr>
-          <p:nvPr/>
-        </p:nvCxnSpPr>
-        <p:spPr>
-          <a:xfrm flipV="1">
-            <a:off x="4392211" y="1021906"/>
-            <a:ext cx="586189" cy="484717"/>
-          </a:xfrm>
-          <a:prstGeom prst="bentConnector3">
-            <a:avLst/>
-          </a:prstGeom>
-          <a:ln>
-            <a:solidFill>
-              <a:schemeClr val="tx1"/>
-            </a:solidFill>
-            <a:tailEnd type="arrow"/>
-          </a:ln>
-        </p:spPr>
-        <p:style>
-          <a:lnRef idx="2">
-            <a:schemeClr val="accent1"/>
-          </a:lnRef>
-          <a:fillRef idx="0">
-            <a:schemeClr val="accent1"/>
-          </a:fillRef>
-          <a:effectRef idx="1">
-            <a:schemeClr val="accent1"/>
-          </a:effectRef>
-          <a:fontRef idx="minor">
-            <a:schemeClr val="tx1"/>
-          </a:fontRef>
-        </p:style>
-      </p:cxnSp>
-      <p:cxnSp>
-        <p:nvCxnSpPr>
-          <p:cNvPr id="39" name="肘形连接符 38"/>
-          <p:cNvCxnSpPr>
-            <a:stCxn id="5" idx="3"/>
-            <a:endCxn id="23" idx="1"/>
-          </p:cNvCxnSpPr>
-          <p:nvPr/>
-        </p:nvCxnSpPr>
-        <p:spPr>
-          <a:xfrm>
-            <a:off x="4392211" y="1506623"/>
-            <a:ext cx="586189" cy="484717"/>
-          </a:xfrm>
-          <a:prstGeom prst="bentConnector3">
-            <a:avLst/>
-          </a:prstGeom>
-          <a:ln>
-            <a:solidFill>
-              <a:schemeClr val="tx1"/>
-            </a:solidFill>
-            <a:tailEnd type="arrow"/>
-          </a:ln>
-        </p:spPr>
-        <p:style>
-          <a:lnRef idx="2">
-            <a:schemeClr val="accent1"/>
-          </a:lnRef>
-          <a:fillRef idx="0">
-            <a:schemeClr val="accent1"/>
-          </a:fillRef>
-          <a:effectRef idx="1">
-            <a:schemeClr val="accent1"/>
-          </a:effectRef>
-          <a:fontRef idx="minor">
-            <a:schemeClr val="tx1"/>
-          </a:fontRef>
-        </p:style>
-      </p:cxnSp>
-      <p:cxnSp>
-        <p:nvCxnSpPr>
-          <p:cNvPr id="43" name="直线箭头连接符 42"/>
-          <p:cNvCxnSpPr>
-            <a:stCxn id="4" idx="3"/>
-            <a:endCxn id="5" idx="1"/>
-          </p:cNvCxnSpPr>
-          <p:nvPr/>
-        </p:nvCxnSpPr>
-        <p:spPr>
-          <a:xfrm>
-            <a:off x="1828800" y="1482049"/>
-            <a:ext cx="734611" cy="24574"/>
-          </a:xfrm>
-          <a:prstGeom prst="straightConnector1">
-            <a:avLst/>
-          </a:prstGeom>
-          <a:ln>
-            <a:solidFill>
-              <a:schemeClr val="tx1"/>
-            </a:solidFill>
-            <a:tailEnd type="arrow"/>
-          </a:ln>
-        </p:spPr>
-        <p:style>
-          <a:lnRef idx="2">
-            <a:schemeClr val="accent1"/>
-          </a:lnRef>
-          <a:fillRef idx="0">
-            <a:schemeClr val="accent1"/>
-          </a:fillRef>
-          <a:effectRef idx="1">
-            <a:schemeClr val="accent1"/>
-          </a:effectRef>
-          <a:fontRef idx="minor">
-            <a:schemeClr val="tx1"/>
-          </a:fontRef>
-        </p:style>
-      </p:cxnSp>
-    </p:spTree>
-    <p:extLst>
-      <p:ext uri="{BB962C8B-B14F-4D97-AF65-F5344CB8AC3E}">
-        <p14:creationId xmlns:p14="http://schemas.microsoft.com/office/powerpoint/2010/main" val="3085580383"/>
-      </p:ext>
-    </p:extLst>
-  </p:cSld>
-  <p:clrMapOvr>
-    <a:masterClrMapping/>
-  </p:clrMapOvr>
-</p:sld>
-</file>
-
 <file path=ppt/theme/theme1.xml><?xml version="1.0" encoding="utf-8"?>
 <a:theme xmlns:a="http://schemas.openxmlformats.org/drawingml/2006/main" name="Office 主题">
   <a:themeElements>

</xml_diff>

<commit_message>
finished the diagram for tx and rx
</commit_message>
<xml_diff>
--- a/Documents/get_start_with_gr-cdma/figure/figure_source.pptx
+++ b/Documents/get_start_with_gr-cdma/figure/figure_source.pptx
@@ -293,7 +293,7 @@
           <a:p>
             <a:fld id="{74A26211-2DA7-E74A-AB9C-A5C9F972D1F5}" type="datetimeFigureOut">
               <a:rPr kumimoji="1" lang="zh-CN" altLang="en-US" smtClean="0"/>
-              <a:t>6/18/16</a:t>
+              <a:t>7/9/16</a:t>
             </a:fld>
             <a:endParaRPr kumimoji="1" lang="zh-CN" altLang="en-US"/>
           </a:p>
@@ -463,7 +463,7 @@
           <a:p>
             <a:fld id="{74A26211-2DA7-E74A-AB9C-A5C9F972D1F5}" type="datetimeFigureOut">
               <a:rPr kumimoji="1" lang="zh-CN" altLang="en-US" smtClean="0"/>
-              <a:t>6/18/16</a:t>
+              <a:t>7/9/16</a:t>
             </a:fld>
             <a:endParaRPr kumimoji="1" lang="zh-CN" altLang="en-US"/>
           </a:p>
@@ -643,7 +643,7 @@
           <a:p>
             <a:fld id="{74A26211-2DA7-E74A-AB9C-A5C9F972D1F5}" type="datetimeFigureOut">
               <a:rPr kumimoji="1" lang="zh-CN" altLang="en-US" smtClean="0"/>
-              <a:t>6/18/16</a:t>
+              <a:t>7/9/16</a:t>
             </a:fld>
             <a:endParaRPr kumimoji="1" lang="zh-CN" altLang="en-US"/>
           </a:p>
@@ -813,7 +813,7 @@
           <a:p>
             <a:fld id="{74A26211-2DA7-E74A-AB9C-A5C9F972D1F5}" type="datetimeFigureOut">
               <a:rPr kumimoji="1" lang="zh-CN" altLang="en-US" smtClean="0"/>
-              <a:t>6/18/16</a:t>
+              <a:t>7/9/16</a:t>
             </a:fld>
             <a:endParaRPr kumimoji="1" lang="zh-CN" altLang="en-US"/>
           </a:p>
@@ -1059,7 +1059,7 @@
           <a:p>
             <a:fld id="{74A26211-2DA7-E74A-AB9C-A5C9F972D1F5}" type="datetimeFigureOut">
               <a:rPr kumimoji="1" lang="zh-CN" altLang="en-US" smtClean="0"/>
-              <a:t>6/18/16</a:t>
+              <a:t>7/9/16</a:t>
             </a:fld>
             <a:endParaRPr kumimoji="1" lang="zh-CN" altLang="en-US"/>
           </a:p>
@@ -1347,7 +1347,7 @@
           <a:p>
             <a:fld id="{74A26211-2DA7-E74A-AB9C-A5C9F972D1F5}" type="datetimeFigureOut">
               <a:rPr kumimoji="1" lang="zh-CN" altLang="en-US" smtClean="0"/>
-              <a:t>6/18/16</a:t>
+              <a:t>7/9/16</a:t>
             </a:fld>
             <a:endParaRPr kumimoji="1" lang="zh-CN" altLang="en-US"/>
           </a:p>
@@ -1769,7 +1769,7 @@
           <a:p>
             <a:fld id="{74A26211-2DA7-E74A-AB9C-A5C9F972D1F5}" type="datetimeFigureOut">
               <a:rPr kumimoji="1" lang="zh-CN" altLang="en-US" smtClean="0"/>
-              <a:t>6/18/16</a:t>
+              <a:t>7/9/16</a:t>
             </a:fld>
             <a:endParaRPr kumimoji="1" lang="zh-CN" altLang="en-US"/>
           </a:p>
@@ -1887,7 +1887,7 @@
           <a:p>
             <a:fld id="{74A26211-2DA7-E74A-AB9C-A5C9F972D1F5}" type="datetimeFigureOut">
               <a:rPr kumimoji="1" lang="zh-CN" altLang="en-US" smtClean="0"/>
-              <a:t>6/18/16</a:t>
+              <a:t>7/9/16</a:t>
             </a:fld>
             <a:endParaRPr kumimoji="1" lang="zh-CN" altLang="en-US"/>
           </a:p>
@@ -1982,7 +1982,7 @@
           <a:p>
             <a:fld id="{74A26211-2DA7-E74A-AB9C-A5C9F972D1F5}" type="datetimeFigureOut">
               <a:rPr kumimoji="1" lang="zh-CN" altLang="en-US" smtClean="0"/>
-              <a:t>6/18/16</a:t>
+              <a:t>7/9/16</a:t>
             </a:fld>
             <a:endParaRPr kumimoji="1" lang="zh-CN" altLang="en-US"/>
           </a:p>
@@ -2259,7 +2259,7 @@
           <a:p>
             <a:fld id="{74A26211-2DA7-E74A-AB9C-A5C9F972D1F5}" type="datetimeFigureOut">
               <a:rPr kumimoji="1" lang="zh-CN" altLang="en-US" smtClean="0"/>
-              <a:t>6/18/16</a:t>
+              <a:t>7/9/16</a:t>
             </a:fld>
             <a:endParaRPr kumimoji="1" lang="zh-CN" altLang="en-US"/>
           </a:p>
@@ -2512,7 +2512,7 @@
           <a:p>
             <a:fld id="{74A26211-2DA7-E74A-AB9C-A5C9F972D1F5}" type="datetimeFigureOut">
               <a:rPr kumimoji="1" lang="zh-CN" altLang="en-US" smtClean="0"/>
-              <a:t>6/18/16</a:t>
+              <a:t>7/9/16</a:t>
             </a:fld>
             <a:endParaRPr kumimoji="1" lang="zh-CN" altLang="en-US"/>
           </a:p>
@@ -2725,7 +2725,7 @@
           <a:p>
             <a:fld id="{74A26211-2DA7-E74A-AB9C-A5C9F972D1F5}" type="datetimeFigureOut">
               <a:rPr kumimoji="1" lang="zh-CN" altLang="en-US" smtClean="0"/>
-              <a:t>6/18/16</a:t>
+              <a:t>7/9/16</a:t>
             </a:fld>
             <a:endParaRPr kumimoji="1" lang="zh-CN" altLang="en-US"/>
           </a:p>
@@ -17627,15 +17627,7 @@
                   <a:schemeClr val="tx1"/>
                 </a:solidFill>
               </a:rPr>
-              <a:t>Pulse</a:t>
-            </a:r>
-            <a:r>
-              <a:rPr kumimoji="1" lang="en-US" altLang="zh-CN" dirty="0" smtClean="0">
-                <a:solidFill>
-                  <a:schemeClr val="tx1"/>
-                </a:solidFill>
-              </a:rPr>
-              <a:t>-wise</a:t>
+              <a:t>Pulse-wise</a:t>
             </a:r>
           </a:p>
           <a:p>
@@ -17763,11 +17755,6 @@
               </a:rPr>
               <a:t>Estimator</a:t>
             </a:r>
-            <a:endParaRPr kumimoji="1" lang="en-US" altLang="zh-CN" dirty="0" smtClean="0">
-              <a:solidFill>
-                <a:schemeClr val="tx1"/>
-              </a:solidFill>
-            </a:endParaRPr>
           </a:p>
         </p:txBody>
       </p:sp>
@@ -20008,7 +19995,7 @@
         </p:nvSpPr>
         <p:spPr>
           <a:xfrm>
-            <a:off x="0" y="1116289"/>
+            <a:off x="0" y="414382"/>
             <a:ext cx="1828800" cy="731520"/>
           </a:xfrm>
           <a:prstGeom prst="rect">
@@ -20059,7 +20046,7 @@
         </p:nvSpPr>
         <p:spPr>
           <a:xfrm>
-            <a:off x="2563411" y="1140863"/>
+            <a:off x="0" y="1637117"/>
             <a:ext cx="1828800" cy="731520"/>
           </a:xfrm>
           <a:prstGeom prst="rect">
@@ -20121,7 +20108,7 @@
         </p:nvSpPr>
         <p:spPr>
           <a:xfrm>
-            <a:off x="4978400" y="2595013"/>
+            <a:off x="2619207" y="66764"/>
             <a:ext cx="1828800" cy="731520"/>
           </a:xfrm>
           <a:prstGeom prst="rect">
@@ -20188,7 +20175,74 @@
         </p:nvSpPr>
         <p:spPr>
           <a:xfrm>
-            <a:off x="7601669" y="1590570"/>
+            <a:off x="5433696" y="1113666"/>
+            <a:ext cx="1249849" cy="731520"/>
+          </a:xfrm>
+          <a:prstGeom prst="rect">
+            <a:avLst/>
+          </a:prstGeom>
+          <a:noFill/>
+          <a:ln>
+            <a:solidFill>
+              <a:schemeClr val="tx1"/>
+            </a:solidFill>
+          </a:ln>
+        </p:spPr>
+        <p:style>
+          <a:lnRef idx="1">
+            <a:schemeClr val="accent1"/>
+          </a:lnRef>
+          <a:fillRef idx="3">
+            <a:schemeClr val="accent1"/>
+          </a:fillRef>
+          <a:effectRef idx="2">
+            <a:schemeClr val="accent1"/>
+          </a:effectRef>
+          <a:fontRef idx="minor">
+            <a:schemeClr val="lt1"/>
+          </a:fontRef>
+        </p:style>
+        <p:txBody>
+          <a:bodyPr rtlCol="0" anchor="ctr"/>
+          <a:lstStyle/>
+          <a:p>
+            <a:pPr algn="ctr"/>
+            <a:r>
+              <a:rPr kumimoji="1" lang="en-US" altLang="zh-CN" dirty="0" smtClean="0">
+                <a:solidFill>
+                  <a:schemeClr val="tx1"/>
+                </a:solidFill>
+              </a:rPr>
+              <a:t>Tag</a:t>
+            </a:r>
+            <a:r>
+              <a:rPr kumimoji="1" lang="zh-CN" altLang="en-US" dirty="0" smtClean="0">
+                <a:solidFill>
+                  <a:schemeClr val="tx1"/>
+                </a:solidFill>
+              </a:rPr>
+              <a:t> </a:t>
+            </a:r>
+            <a:r>
+              <a:rPr kumimoji="1" lang="en-US" altLang="zh-CN" dirty="0" smtClean="0">
+                <a:solidFill>
+                  <a:schemeClr val="tx1"/>
+                </a:solidFill>
+              </a:rPr>
+              <a:t>Mixer</a:t>
+            </a:r>
+          </a:p>
+        </p:txBody>
+      </p:sp>
+      <p:sp>
+        <p:nvSpPr>
+          <p:cNvPr id="9" name="矩形 8"/>
+          <p:cNvSpPr/>
+          <p:nvPr/>
+        </p:nvSpPr>
+        <p:spPr>
+          <a:xfrm>
+            <a:off x="5144220" y="2160568"/>
             <a:ext cx="1828800" cy="731520"/>
           </a:xfrm>
           <a:prstGeom prst="rect">
@@ -20226,73 +20280,6 @@
                   <a:schemeClr val="tx1"/>
                 </a:solidFill>
               </a:rPr>
-              <a:t>Tag</a:t>
-            </a:r>
-            <a:r>
-              <a:rPr kumimoji="1" lang="zh-CN" altLang="en-US" dirty="0" smtClean="0">
-                <a:solidFill>
-                  <a:schemeClr val="tx1"/>
-                </a:solidFill>
-              </a:rPr>
-              <a:t> </a:t>
-            </a:r>
-            <a:r>
-              <a:rPr kumimoji="1" lang="en-US" altLang="zh-CN" dirty="0" smtClean="0">
-                <a:solidFill>
-                  <a:schemeClr val="tx1"/>
-                </a:solidFill>
-              </a:rPr>
-              <a:t>Mixer</a:t>
-            </a:r>
-          </a:p>
-        </p:txBody>
-      </p:sp>
-      <p:sp>
-        <p:nvSpPr>
-          <p:cNvPr id="9" name="矩形 8"/>
-          <p:cNvSpPr/>
-          <p:nvPr/>
-        </p:nvSpPr>
-        <p:spPr>
-          <a:xfrm>
-            <a:off x="-4718050" y="3623057"/>
-            <a:ext cx="1828800" cy="731520"/>
-          </a:xfrm>
-          <a:prstGeom prst="rect">
-            <a:avLst/>
-          </a:prstGeom>
-          <a:noFill/>
-          <a:ln>
-            <a:solidFill>
-              <a:schemeClr val="tx1"/>
-            </a:solidFill>
-          </a:ln>
-        </p:spPr>
-        <p:style>
-          <a:lnRef idx="1">
-            <a:schemeClr val="accent1"/>
-          </a:lnRef>
-          <a:fillRef idx="3">
-            <a:schemeClr val="accent1"/>
-          </a:fillRef>
-          <a:effectRef idx="2">
-            <a:schemeClr val="accent1"/>
-          </a:effectRef>
-          <a:fontRef idx="minor">
-            <a:schemeClr val="lt1"/>
-          </a:fontRef>
-        </p:style>
-        <p:txBody>
-          <a:bodyPr rtlCol="0" anchor="ctr"/>
-          <a:lstStyle/>
-          <a:p>
-            <a:pPr algn="ctr"/>
-            <a:r>
-              <a:rPr kumimoji="1" lang="en-US" altLang="zh-CN" dirty="0" smtClean="0">
-                <a:solidFill>
-                  <a:schemeClr val="tx1"/>
-                </a:solidFill>
-              </a:rPr>
               <a:t>Data</a:t>
             </a:r>
             <a:r>
@@ -20338,7 +20325,7 @@
         </p:nvGrpSpPr>
         <p:grpSpPr>
           <a:xfrm>
-            <a:off x="9430469" y="3636497"/>
+            <a:off x="7909644" y="2335828"/>
             <a:ext cx="381000" cy="381000"/>
             <a:chOff x="5238750" y="698500"/>
             <a:chExt cx="381000" cy="381000"/>
@@ -20473,7 +20460,7 @@
         </p:nvGrpSpPr>
         <p:grpSpPr>
           <a:xfrm>
-            <a:off x="3422015" y="2904977"/>
+            <a:off x="5243196" y="3368379"/>
             <a:ext cx="381000" cy="381000"/>
             <a:chOff x="5238750" y="698500"/>
             <a:chExt cx="381000" cy="381000"/>
@@ -20608,7 +20595,7 @@
         </p:nvSpPr>
         <p:spPr>
           <a:xfrm>
-            <a:off x="-4626610" y="4506977"/>
+            <a:off x="4519296" y="4311283"/>
             <a:ext cx="1828800" cy="731520"/>
           </a:xfrm>
           <a:prstGeom prst="rect">
@@ -20685,70 +20672,14 @@
       </p:sp>
       <p:sp>
         <p:nvSpPr>
-          <p:cNvPr id="19" name="矩形 18"/>
-          <p:cNvSpPr/>
-          <p:nvPr/>
-        </p:nvSpPr>
-        <p:spPr>
-          <a:xfrm>
-            <a:off x="-2889250" y="1956330"/>
-            <a:ext cx="1828800" cy="731520"/>
-          </a:xfrm>
-          <a:prstGeom prst="rect">
-            <a:avLst/>
-          </a:prstGeom>
-          <a:noFill/>
-          <a:ln>
-            <a:solidFill>
-              <a:schemeClr val="tx1"/>
-            </a:solidFill>
-          </a:ln>
-        </p:spPr>
-        <p:style>
-          <a:lnRef idx="1">
-            <a:schemeClr val="accent1"/>
-          </a:lnRef>
-          <a:fillRef idx="3">
-            <a:schemeClr val="accent1"/>
-          </a:fillRef>
-          <a:effectRef idx="2">
-            <a:schemeClr val="accent1"/>
-          </a:effectRef>
-          <a:fontRef idx="minor">
-            <a:schemeClr val="lt1"/>
-          </a:fontRef>
-        </p:style>
-        <p:txBody>
-          <a:bodyPr rtlCol="0" anchor="ctr"/>
-          <a:lstStyle/>
-          <a:p>
-            <a:pPr algn="ctr"/>
-            <a:r>
-              <a:rPr kumimoji="1" lang="en-US" altLang="zh-CN" dirty="0" err="1" smtClean="0">
-                <a:solidFill>
-                  <a:schemeClr val="tx1"/>
-                </a:solidFill>
-              </a:rPr>
-              <a:t>Convoluion</a:t>
-            </a:r>
-            <a:endParaRPr kumimoji="1" lang="en-US" altLang="zh-CN" dirty="0" smtClean="0">
-              <a:solidFill>
-                <a:schemeClr val="tx1"/>
-              </a:solidFill>
-            </a:endParaRPr>
-          </a:p>
-        </p:txBody>
-      </p:sp>
-      <p:sp>
-        <p:nvSpPr>
           <p:cNvPr id="20" name="矩形 19"/>
           <p:cNvSpPr/>
           <p:nvPr/>
         </p:nvSpPr>
         <p:spPr>
           <a:xfrm>
-            <a:off x="-2736850" y="2840250"/>
-            <a:ext cx="1828800" cy="731520"/>
+            <a:off x="7465145" y="1113666"/>
+            <a:ext cx="1269999" cy="731520"/>
           </a:xfrm>
           <a:prstGeom prst="rect">
             <a:avLst/>
@@ -20803,8 +20734,8 @@
         </p:nvSpPr>
         <p:spPr>
           <a:xfrm>
-            <a:off x="-2501900" y="3824500"/>
-            <a:ext cx="1828800" cy="731520"/>
+            <a:off x="2619207" y="3193119"/>
+            <a:ext cx="1269999" cy="731520"/>
           </a:xfrm>
           <a:prstGeom prst="rect">
             <a:avLst/>
@@ -20859,7 +20790,7 @@
         </p:nvSpPr>
         <p:spPr>
           <a:xfrm>
-            <a:off x="-2320925" y="4682237"/>
+            <a:off x="6610687" y="4311283"/>
             <a:ext cx="1828800" cy="731520"/>
           </a:xfrm>
           <a:prstGeom prst="rect">
@@ -20942,7 +20873,7 @@
         </p:nvSpPr>
         <p:spPr>
           <a:xfrm>
-            <a:off x="4978400" y="656146"/>
+            <a:off x="2619207" y="1113666"/>
             <a:ext cx="1828800" cy="731520"/>
           </a:xfrm>
           <a:prstGeom prst="rect">
@@ -21025,7 +20956,7 @@
         </p:nvSpPr>
         <p:spPr>
           <a:xfrm>
-            <a:off x="4978400" y="1625580"/>
+            <a:off x="2619207" y="2160568"/>
             <a:ext cx="1828800" cy="731520"/>
           </a:xfrm>
           <a:prstGeom prst="rect">
@@ -21092,7 +21023,7 @@
         </p:nvSpPr>
         <p:spPr>
           <a:xfrm>
-            <a:off x="0" y="3574119"/>
+            <a:off x="0" y="3193119"/>
             <a:ext cx="1828800" cy="731520"/>
           </a:xfrm>
           <a:prstGeom prst="rect">
@@ -21164,7 +21095,7 @@
         </p:nvGrpSpPr>
         <p:grpSpPr>
           <a:xfrm>
-            <a:off x="-5081102" y="2649750"/>
+            <a:off x="7334587" y="3378962"/>
             <a:ext cx="381000" cy="381000"/>
             <a:chOff x="2967523" y="3788897"/>
             <a:chExt cx="381000" cy="381000"/>
@@ -21302,8 +21233,8 @@
         </p:nvCxnSpPr>
         <p:spPr>
           <a:xfrm flipV="1">
-            <a:off x="4392211" y="1021906"/>
-            <a:ext cx="586189" cy="484717"/>
+            <a:off x="1828800" y="1479426"/>
+            <a:ext cx="790407" cy="523451"/>
           </a:xfrm>
           <a:prstGeom prst="bentConnector3">
             <a:avLst/>
@@ -21341,8 +21272,8 @@
         </p:nvCxnSpPr>
         <p:spPr>
           <a:xfrm>
-            <a:off x="4392211" y="1506623"/>
-            <a:ext cx="586189" cy="484717"/>
+            <a:off x="1828800" y="2002877"/>
+            <a:ext cx="790407" cy="523451"/>
           </a:xfrm>
           <a:prstGeom prst="bentConnector3">
             <a:avLst/>
@@ -21373,15 +21304,15 @@
         <p:nvCxnSpPr>
           <p:cNvPr id="43" name="直线箭头连接符 42"/>
           <p:cNvCxnSpPr>
-            <a:stCxn id="4" idx="3"/>
-            <a:endCxn id="5" idx="1"/>
+            <a:stCxn id="4" idx="2"/>
+            <a:endCxn id="5" idx="0"/>
           </p:cNvCxnSpPr>
           <p:nvPr/>
         </p:nvCxnSpPr>
         <p:spPr>
           <a:xfrm>
-            <a:off x="1828800" y="1482049"/>
-            <a:ext cx="734611" cy="24574"/>
+            <a:off x="914400" y="1145902"/>
+            <a:ext cx="0" cy="491215"/>
           </a:xfrm>
           <a:prstGeom prst="straightConnector1">
             <a:avLst/>
@@ -21408,6 +21339,855 @@
           </a:fontRef>
         </p:style>
       </p:cxnSp>
+      <p:cxnSp>
+        <p:nvCxnSpPr>
+          <p:cNvPr id="3" name="直线箭头连接符 2"/>
+          <p:cNvCxnSpPr>
+            <a:stCxn id="6" idx="3"/>
+            <a:endCxn id="8" idx="1"/>
+          </p:cNvCxnSpPr>
+          <p:nvPr/>
+        </p:nvCxnSpPr>
+        <p:spPr>
+          <a:xfrm>
+            <a:off x="4448007" y="1479426"/>
+            <a:ext cx="985689" cy="0"/>
+          </a:xfrm>
+          <a:prstGeom prst="straightConnector1">
+            <a:avLst/>
+          </a:prstGeom>
+          <a:ln>
+            <a:solidFill>
+              <a:schemeClr val="tx1"/>
+            </a:solidFill>
+            <a:tailEnd type="arrow"/>
+          </a:ln>
+        </p:spPr>
+        <p:style>
+          <a:lnRef idx="2">
+            <a:schemeClr val="accent1"/>
+          </a:lnRef>
+          <a:fillRef idx="0">
+            <a:schemeClr val="accent1"/>
+          </a:fillRef>
+          <a:effectRef idx="1">
+            <a:schemeClr val="accent1"/>
+          </a:effectRef>
+          <a:fontRef idx="minor">
+            <a:schemeClr val="tx1"/>
+          </a:fontRef>
+        </p:style>
+      </p:cxnSp>
+      <p:cxnSp>
+        <p:nvCxnSpPr>
+          <p:cNvPr id="30" name="肘形连接符 29"/>
+          <p:cNvCxnSpPr>
+            <a:stCxn id="23" idx="3"/>
+            <a:endCxn id="8" idx="1"/>
+          </p:cNvCxnSpPr>
+          <p:nvPr/>
+        </p:nvCxnSpPr>
+        <p:spPr>
+          <a:xfrm flipV="1">
+            <a:off x="4448007" y="1479426"/>
+            <a:ext cx="985689" cy="1046902"/>
+          </a:xfrm>
+          <a:prstGeom prst="bentConnector3">
+            <a:avLst/>
+          </a:prstGeom>
+          <a:ln>
+            <a:solidFill>
+              <a:schemeClr val="tx1"/>
+            </a:solidFill>
+            <a:tailEnd type="arrow"/>
+          </a:ln>
+        </p:spPr>
+        <p:style>
+          <a:lnRef idx="2">
+            <a:schemeClr val="accent1"/>
+          </a:lnRef>
+          <a:fillRef idx="0">
+            <a:schemeClr val="accent1"/>
+          </a:fillRef>
+          <a:effectRef idx="1">
+            <a:schemeClr val="accent1"/>
+          </a:effectRef>
+          <a:fontRef idx="minor">
+            <a:schemeClr val="tx1"/>
+          </a:fontRef>
+        </p:style>
+      </p:cxnSp>
+      <p:cxnSp>
+        <p:nvCxnSpPr>
+          <p:cNvPr id="32" name="肘形连接符 31"/>
+          <p:cNvCxnSpPr>
+            <a:stCxn id="7" idx="3"/>
+            <a:endCxn id="8" idx="1"/>
+          </p:cNvCxnSpPr>
+          <p:nvPr/>
+        </p:nvCxnSpPr>
+        <p:spPr>
+          <a:xfrm>
+            <a:off x="4448007" y="432524"/>
+            <a:ext cx="985689" cy="1046902"/>
+          </a:xfrm>
+          <a:prstGeom prst="bentConnector3">
+            <a:avLst/>
+          </a:prstGeom>
+          <a:ln>
+            <a:solidFill>
+              <a:schemeClr val="tx1"/>
+            </a:solidFill>
+            <a:tailEnd type="arrow"/>
+          </a:ln>
+        </p:spPr>
+        <p:style>
+          <a:lnRef idx="2">
+            <a:schemeClr val="accent1"/>
+          </a:lnRef>
+          <a:fillRef idx="0">
+            <a:schemeClr val="accent1"/>
+          </a:fillRef>
+          <a:effectRef idx="1">
+            <a:schemeClr val="accent1"/>
+          </a:effectRef>
+          <a:fontRef idx="minor">
+            <a:schemeClr val="tx1"/>
+          </a:fontRef>
+        </p:style>
+      </p:cxnSp>
+      <p:sp>
+        <p:nvSpPr>
+          <p:cNvPr id="38" name="矩形 37"/>
+          <p:cNvSpPr/>
+          <p:nvPr/>
+        </p:nvSpPr>
+        <p:spPr>
+          <a:xfrm>
+            <a:off x="2339807" y="4311283"/>
+            <a:ext cx="1828800" cy="731520"/>
+          </a:xfrm>
+          <a:prstGeom prst="rect">
+            <a:avLst/>
+          </a:prstGeom>
+          <a:noFill/>
+          <a:ln>
+            <a:solidFill>
+              <a:schemeClr val="tx1"/>
+            </a:solidFill>
+          </a:ln>
+        </p:spPr>
+        <p:style>
+          <a:lnRef idx="1">
+            <a:schemeClr val="accent1"/>
+          </a:lnRef>
+          <a:fillRef idx="3">
+            <a:schemeClr val="accent1"/>
+          </a:fillRef>
+          <a:effectRef idx="2">
+            <a:schemeClr val="accent1"/>
+          </a:effectRef>
+          <a:fontRef idx="minor">
+            <a:schemeClr val="lt1"/>
+          </a:fontRef>
+        </p:style>
+        <p:txBody>
+          <a:bodyPr rtlCol="0" anchor="ctr"/>
+          <a:lstStyle/>
+          <a:p>
+            <a:pPr algn="ctr"/>
+            <a:r>
+              <a:rPr kumimoji="1" lang="en-US" altLang="zh-CN" dirty="0" smtClean="0">
+                <a:solidFill>
+                  <a:schemeClr val="tx1"/>
+                </a:solidFill>
+              </a:rPr>
+              <a:t>Spread</a:t>
+            </a:r>
+            <a:r>
+              <a:rPr kumimoji="1" lang="zh-CN" altLang="en-US" dirty="0" smtClean="0">
+                <a:solidFill>
+                  <a:schemeClr val="tx1"/>
+                </a:solidFill>
+              </a:rPr>
+              <a:t> </a:t>
+            </a:r>
+            <a:r>
+              <a:rPr kumimoji="1" lang="en-US" altLang="zh-CN" dirty="0" smtClean="0">
+                <a:solidFill>
+                  <a:schemeClr val="tx1"/>
+                </a:solidFill>
+              </a:rPr>
+              <a:t>Code</a:t>
+            </a:r>
+            <a:r>
+              <a:rPr kumimoji="1" lang="zh-CN" altLang="en-US" dirty="0" smtClean="0">
+                <a:solidFill>
+                  <a:schemeClr val="tx1"/>
+                </a:solidFill>
+              </a:rPr>
+              <a:t> </a:t>
+            </a:r>
+            <a:r>
+              <a:rPr kumimoji="1" lang="en-US" altLang="zh-CN" dirty="0" smtClean="0">
+                <a:solidFill>
+                  <a:schemeClr val="tx1"/>
+                </a:solidFill>
+              </a:rPr>
+              <a:t>for</a:t>
+            </a:r>
+            <a:r>
+              <a:rPr kumimoji="1" lang="zh-CN" altLang="en-US" dirty="0" smtClean="0">
+                <a:solidFill>
+                  <a:schemeClr val="tx1"/>
+                </a:solidFill>
+              </a:rPr>
+              <a:t> </a:t>
+            </a:r>
+            <a:r>
+              <a:rPr kumimoji="1" lang="en-US" altLang="zh-CN" dirty="0" smtClean="0">
+                <a:solidFill>
+                  <a:schemeClr val="tx1"/>
+                </a:solidFill>
+              </a:rPr>
+              <a:t>Training</a:t>
+            </a:r>
+            <a:endParaRPr kumimoji="1" lang="en-US" altLang="zh-CN" dirty="0" smtClean="0">
+              <a:solidFill>
+                <a:schemeClr val="tx1"/>
+              </a:solidFill>
+            </a:endParaRPr>
+          </a:p>
+        </p:txBody>
+      </p:sp>
+      <p:sp>
+        <p:nvSpPr>
+          <p:cNvPr id="40" name="矩形 39"/>
+          <p:cNvSpPr/>
+          <p:nvPr/>
+        </p:nvSpPr>
+        <p:spPr>
+          <a:xfrm>
+            <a:off x="7185744" y="66764"/>
+            <a:ext cx="1828800" cy="731520"/>
+          </a:xfrm>
+          <a:prstGeom prst="rect">
+            <a:avLst/>
+          </a:prstGeom>
+          <a:noFill/>
+          <a:ln>
+            <a:solidFill>
+              <a:schemeClr val="tx1"/>
+            </a:solidFill>
+          </a:ln>
+        </p:spPr>
+        <p:style>
+          <a:lnRef idx="1">
+            <a:schemeClr val="accent1"/>
+          </a:lnRef>
+          <a:fillRef idx="3">
+            <a:schemeClr val="accent1"/>
+          </a:fillRef>
+          <a:effectRef idx="2">
+            <a:schemeClr val="accent1"/>
+          </a:effectRef>
+          <a:fontRef idx="minor">
+            <a:schemeClr val="lt1"/>
+          </a:fontRef>
+        </p:style>
+        <p:txBody>
+          <a:bodyPr rtlCol="0" anchor="ctr"/>
+          <a:lstStyle/>
+          <a:p>
+            <a:pPr algn="ctr"/>
+            <a:r>
+              <a:rPr kumimoji="1" lang="en-US" altLang="zh-CN" dirty="0" smtClean="0">
+                <a:solidFill>
+                  <a:schemeClr val="tx1"/>
+                </a:solidFill>
+              </a:rPr>
+              <a:t>Spread</a:t>
+            </a:r>
+            <a:r>
+              <a:rPr kumimoji="1" lang="zh-CN" altLang="en-US" dirty="0" smtClean="0">
+                <a:solidFill>
+                  <a:schemeClr val="tx1"/>
+                </a:solidFill>
+              </a:rPr>
+              <a:t> </a:t>
+            </a:r>
+            <a:r>
+              <a:rPr kumimoji="1" lang="en-US" altLang="zh-CN" dirty="0" smtClean="0">
+                <a:solidFill>
+                  <a:schemeClr val="tx1"/>
+                </a:solidFill>
+              </a:rPr>
+              <a:t>Code</a:t>
+            </a:r>
+            <a:r>
+              <a:rPr kumimoji="1" lang="zh-CN" altLang="en-US" dirty="0" smtClean="0">
+                <a:solidFill>
+                  <a:schemeClr val="tx1"/>
+                </a:solidFill>
+              </a:rPr>
+              <a:t> </a:t>
+            </a:r>
+            <a:r>
+              <a:rPr kumimoji="1" lang="en-US" altLang="zh-CN" dirty="0" smtClean="0">
+                <a:solidFill>
+                  <a:schemeClr val="tx1"/>
+                </a:solidFill>
+              </a:rPr>
+              <a:t>for</a:t>
+            </a:r>
+            <a:r>
+              <a:rPr kumimoji="1" lang="zh-CN" altLang="en-US" dirty="0" smtClean="0">
+                <a:solidFill>
+                  <a:schemeClr val="tx1"/>
+                </a:solidFill>
+              </a:rPr>
+              <a:t> </a:t>
+            </a:r>
+            <a:r>
+              <a:rPr kumimoji="1" lang="en-US" altLang="zh-CN" dirty="0" smtClean="0">
+                <a:solidFill>
+                  <a:schemeClr val="tx1"/>
+                </a:solidFill>
+              </a:rPr>
+              <a:t>Data</a:t>
+            </a:r>
+            <a:endParaRPr kumimoji="1" lang="en-US" altLang="zh-CN" dirty="0" smtClean="0">
+              <a:solidFill>
+                <a:schemeClr val="tx1"/>
+              </a:solidFill>
+            </a:endParaRPr>
+          </a:p>
+        </p:txBody>
+      </p:sp>
+      <p:cxnSp>
+        <p:nvCxnSpPr>
+          <p:cNvPr id="58" name="直线箭头连接符 57"/>
+          <p:cNvCxnSpPr>
+            <a:stCxn id="8" idx="3"/>
+            <a:endCxn id="20" idx="1"/>
+          </p:cNvCxnSpPr>
+          <p:nvPr/>
+        </p:nvCxnSpPr>
+        <p:spPr>
+          <a:xfrm>
+            <a:off x="6683545" y="1479426"/>
+            <a:ext cx="781600" cy="0"/>
+          </a:xfrm>
+          <a:prstGeom prst="straightConnector1">
+            <a:avLst/>
+          </a:prstGeom>
+          <a:ln>
+            <a:solidFill>
+              <a:schemeClr val="tx1"/>
+            </a:solidFill>
+            <a:tailEnd type="arrow"/>
+          </a:ln>
+        </p:spPr>
+        <p:style>
+          <a:lnRef idx="2">
+            <a:schemeClr val="accent1"/>
+          </a:lnRef>
+          <a:fillRef idx="0">
+            <a:schemeClr val="accent1"/>
+          </a:fillRef>
+          <a:effectRef idx="1">
+            <a:schemeClr val="accent1"/>
+          </a:effectRef>
+          <a:fontRef idx="minor">
+            <a:schemeClr val="tx1"/>
+          </a:fontRef>
+        </p:style>
+      </p:cxnSp>
+      <p:cxnSp>
+        <p:nvCxnSpPr>
+          <p:cNvPr id="61" name="直线箭头连接符 60"/>
+          <p:cNvCxnSpPr>
+            <a:stCxn id="40" idx="2"/>
+            <a:endCxn id="20" idx="0"/>
+          </p:cNvCxnSpPr>
+          <p:nvPr/>
+        </p:nvCxnSpPr>
+        <p:spPr>
+          <a:xfrm>
+            <a:off x="8100144" y="798284"/>
+            <a:ext cx="1" cy="315382"/>
+          </a:xfrm>
+          <a:prstGeom prst="straightConnector1">
+            <a:avLst/>
+          </a:prstGeom>
+          <a:ln>
+            <a:solidFill>
+              <a:schemeClr val="tx1"/>
+            </a:solidFill>
+            <a:tailEnd type="arrow"/>
+          </a:ln>
+        </p:spPr>
+        <p:style>
+          <a:lnRef idx="2">
+            <a:schemeClr val="accent1"/>
+          </a:lnRef>
+          <a:fillRef idx="0">
+            <a:schemeClr val="accent1"/>
+          </a:fillRef>
+          <a:effectRef idx="1">
+            <a:schemeClr val="accent1"/>
+          </a:effectRef>
+          <a:fontRef idx="minor">
+            <a:schemeClr val="tx1"/>
+          </a:fontRef>
+        </p:style>
+      </p:cxnSp>
+      <p:cxnSp>
+        <p:nvCxnSpPr>
+          <p:cNvPr id="64" name="直线箭头连接符 63"/>
+          <p:cNvCxnSpPr>
+            <a:stCxn id="20" idx="2"/>
+            <a:endCxn id="11" idx="0"/>
+          </p:cNvCxnSpPr>
+          <p:nvPr/>
+        </p:nvCxnSpPr>
+        <p:spPr>
+          <a:xfrm flipH="1">
+            <a:off x="8100144" y="1845186"/>
+            <a:ext cx="1" cy="490642"/>
+          </a:xfrm>
+          <a:prstGeom prst="straightConnector1">
+            <a:avLst/>
+          </a:prstGeom>
+          <a:ln>
+            <a:solidFill>
+              <a:schemeClr val="tx1"/>
+            </a:solidFill>
+            <a:tailEnd type="arrow"/>
+          </a:ln>
+        </p:spPr>
+        <p:style>
+          <a:lnRef idx="2">
+            <a:schemeClr val="accent1"/>
+          </a:lnRef>
+          <a:fillRef idx="0">
+            <a:schemeClr val="accent1"/>
+          </a:fillRef>
+          <a:effectRef idx="1">
+            <a:schemeClr val="accent1"/>
+          </a:effectRef>
+          <a:fontRef idx="minor">
+            <a:schemeClr val="tx1"/>
+          </a:fontRef>
+        </p:style>
+      </p:cxnSp>
+      <p:cxnSp>
+        <p:nvCxnSpPr>
+          <p:cNvPr id="68" name="直线箭头连接符 67"/>
+          <p:cNvCxnSpPr>
+            <a:stCxn id="25" idx="3"/>
+            <a:endCxn id="21" idx="1"/>
+          </p:cNvCxnSpPr>
+          <p:nvPr/>
+        </p:nvCxnSpPr>
+        <p:spPr>
+          <a:xfrm>
+            <a:off x="1828800" y="3558879"/>
+            <a:ext cx="790407" cy="0"/>
+          </a:xfrm>
+          <a:prstGeom prst="straightConnector1">
+            <a:avLst/>
+          </a:prstGeom>
+          <a:ln>
+            <a:solidFill>
+              <a:schemeClr val="tx1"/>
+            </a:solidFill>
+            <a:tailEnd type="arrow"/>
+          </a:ln>
+        </p:spPr>
+        <p:style>
+          <a:lnRef idx="2">
+            <a:schemeClr val="accent1"/>
+          </a:lnRef>
+          <a:fillRef idx="0">
+            <a:schemeClr val="accent1"/>
+          </a:fillRef>
+          <a:effectRef idx="1">
+            <a:schemeClr val="accent1"/>
+          </a:effectRef>
+          <a:fontRef idx="minor">
+            <a:schemeClr val="tx1"/>
+          </a:fontRef>
+        </p:style>
+      </p:cxnSp>
+      <p:cxnSp>
+        <p:nvCxnSpPr>
+          <p:cNvPr id="71" name="直线箭头连接符 70"/>
+          <p:cNvCxnSpPr>
+            <a:stCxn id="21" idx="3"/>
+            <a:endCxn id="15" idx="2"/>
+          </p:cNvCxnSpPr>
+          <p:nvPr/>
+        </p:nvCxnSpPr>
+        <p:spPr>
+          <a:xfrm>
+            <a:off x="3889206" y="3558879"/>
+            <a:ext cx="1353990" cy="0"/>
+          </a:xfrm>
+          <a:prstGeom prst="straightConnector1">
+            <a:avLst/>
+          </a:prstGeom>
+          <a:ln>
+            <a:solidFill>
+              <a:schemeClr val="tx1"/>
+            </a:solidFill>
+            <a:tailEnd type="arrow"/>
+          </a:ln>
+        </p:spPr>
+        <p:style>
+          <a:lnRef idx="2">
+            <a:schemeClr val="accent1"/>
+          </a:lnRef>
+          <a:fillRef idx="0">
+            <a:schemeClr val="accent1"/>
+          </a:fillRef>
+          <a:effectRef idx="1">
+            <a:schemeClr val="accent1"/>
+          </a:effectRef>
+          <a:fontRef idx="minor">
+            <a:schemeClr val="tx1"/>
+          </a:fontRef>
+        </p:style>
+      </p:cxnSp>
+      <p:cxnSp>
+        <p:nvCxnSpPr>
+          <p:cNvPr id="74" name="直线箭头连接符 73"/>
+          <p:cNvCxnSpPr>
+            <a:stCxn id="38" idx="0"/>
+            <a:endCxn id="21" idx="2"/>
+          </p:cNvCxnSpPr>
+          <p:nvPr/>
+        </p:nvCxnSpPr>
+        <p:spPr>
+          <a:xfrm flipV="1">
+            <a:off x="3254207" y="3924639"/>
+            <a:ext cx="0" cy="386644"/>
+          </a:xfrm>
+          <a:prstGeom prst="straightConnector1">
+            <a:avLst/>
+          </a:prstGeom>
+          <a:ln>
+            <a:solidFill>
+              <a:schemeClr val="tx1"/>
+            </a:solidFill>
+            <a:tailEnd type="arrow"/>
+          </a:ln>
+        </p:spPr>
+        <p:style>
+          <a:lnRef idx="2">
+            <a:schemeClr val="accent1"/>
+          </a:lnRef>
+          <a:fillRef idx="0">
+            <a:schemeClr val="accent1"/>
+          </a:fillRef>
+          <a:effectRef idx="1">
+            <a:schemeClr val="accent1"/>
+          </a:effectRef>
+          <a:fontRef idx="minor">
+            <a:schemeClr val="tx1"/>
+          </a:fontRef>
+        </p:style>
+      </p:cxnSp>
+      <p:cxnSp>
+        <p:nvCxnSpPr>
+          <p:cNvPr id="78" name="直线箭头连接符 77"/>
+          <p:cNvCxnSpPr>
+            <a:stCxn id="18" idx="0"/>
+            <a:endCxn id="15" idx="4"/>
+          </p:cNvCxnSpPr>
+          <p:nvPr/>
+        </p:nvCxnSpPr>
+        <p:spPr>
+          <a:xfrm flipV="1">
+            <a:off x="5433696" y="3749379"/>
+            <a:ext cx="0" cy="561904"/>
+          </a:xfrm>
+          <a:prstGeom prst="straightConnector1">
+            <a:avLst/>
+          </a:prstGeom>
+          <a:ln>
+            <a:solidFill>
+              <a:schemeClr val="tx1"/>
+            </a:solidFill>
+            <a:tailEnd type="arrow"/>
+          </a:ln>
+        </p:spPr>
+        <p:style>
+          <a:lnRef idx="2">
+            <a:schemeClr val="accent1"/>
+          </a:lnRef>
+          <a:fillRef idx="0">
+            <a:schemeClr val="accent1"/>
+          </a:fillRef>
+          <a:effectRef idx="1">
+            <a:schemeClr val="accent1"/>
+          </a:effectRef>
+          <a:fontRef idx="minor">
+            <a:schemeClr val="tx1"/>
+          </a:fontRef>
+        </p:style>
+      </p:cxnSp>
+      <p:cxnSp>
+        <p:nvCxnSpPr>
+          <p:cNvPr id="81" name="直线箭头连接符 80"/>
+          <p:cNvCxnSpPr>
+            <a:stCxn id="15" idx="6"/>
+            <a:endCxn id="27" idx="2"/>
+          </p:cNvCxnSpPr>
+          <p:nvPr/>
+        </p:nvCxnSpPr>
+        <p:spPr>
+          <a:xfrm>
+            <a:off x="5624196" y="3558879"/>
+            <a:ext cx="1710391" cy="10583"/>
+          </a:xfrm>
+          <a:prstGeom prst="straightConnector1">
+            <a:avLst/>
+          </a:prstGeom>
+          <a:ln>
+            <a:solidFill>
+              <a:schemeClr val="tx1"/>
+            </a:solidFill>
+            <a:tailEnd type="arrow"/>
+          </a:ln>
+        </p:spPr>
+        <p:style>
+          <a:lnRef idx="2">
+            <a:schemeClr val="accent1"/>
+          </a:lnRef>
+          <a:fillRef idx="0">
+            <a:schemeClr val="accent1"/>
+          </a:fillRef>
+          <a:effectRef idx="1">
+            <a:schemeClr val="accent1"/>
+          </a:effectRef>
+          <a:fontRef idx="minor">
+            <a:schemeClr val="tx1"/>
+          </a:fontRef>
+        </p:style>
+      </p:cxnSp>
+      <p:cxnSp>
+        <p:nvCxnSpPr>
+          <p:cNvPr id="85" name="肘形连接符 84"/>
+          <p:cNvCxnSpPr>
+            <a:stCxn id="11" idx="4"/>
+            <a:endCxn id="27" idx="6"/>
+          </p:cNvCxnSpPr>
+          <p:nvPr/>
+        </p:nvCxnSpPr>
+        <p:spPr>
+          <a:xfrm rot="5400000">
+            <a:off x="7481549" y="2950867"/>
+            <a:ext cx="852634" cy="384557"/>
+          </a:xfrm>
+          <a:prstGeom prst="bentConnector2">
+            <a:avLst/>
+          </a:prstGeom>
+          <a:ln>
+            <a:solidFill>
+              <a:schemeClr val="tx1"/>
+            </a:solidFill>
+            <a:tailEnd type="arrow"/>
+          </a:ln>
+        </p:spPr>
+        <p:style>
+          <a:lnRef idx="2">
+            <a:schemeClr val="accent1"/>
+          </a:lnRef>
+          <a:fillRef idx="0">
+            <a:schemeClr val="accent1"/>
+          </a:fillRef>
+          <a:effectRef idx="1">
+            <a:schemeClr val="accent1"/>
+          </a:effectRef>
+          <a:fontRef idx="minor">
+            <a:schemeClr val="tx1"/>
+          </a:fontRef>
+        </p:style>
+      </p:cxnSp>
+      <p:cxnSp>
+        <p:nvCxnSpPr>
+          <p:cNvPr id="86" name="直线箭头连接符 85"/>
+          <p:cNvCxnSpPr>
+            <a:stCxn id="9" idx="3"/>
+            <a:endCxn id="11" idx="2"/>
+          </p:cNvCxnSpPr>
+          <p:nvPr/>
+        </p:nvCxnSpPr>
+        <p:spPr>
+          <a:xfrm>
+            <a:off x="6973020" y="2526328"/>
+            <a:ext cx="936624" cy="0"/>
+          </a:xfrm>
+          <a:prstGeom prst="straightConnector1">
+            <a:avLst/>
+          </a:prstGeom>
+          <a:ln>
+            <a:solidFill>
+              <a:schemeClr val="tx1"/>
+            </a:solidFill>
+            <a:tailEnd type="arrow"/>
+          </a:ln>
+        </p:spPr>
+        <p:style>
+          <a:lnRef idx="2">
+            <a:schemeClr val="accent1"/>
+          </a:lnRef>
+          <a:fillRef idx="0">
+            <a:schemeClr val="accent1"/>
+          </a:fillRef>
+          <a:effectRef idx="1">
+            <a:schemeClr val="accent1"/>
+          </a:effectRef>
+          <a:fontRef idx="minor">
+            <a:schemeClr val="tx1"/>
+          </a:fontRef>
+        </p:style>
+      </p:cxnSp>
+      <p:cxnSp>
+        <p:nvCxnSpPr>
+          <p:cNvPr id="89" name="直线箭头连接符 88"/>
+          <p:cNvCxnSpPr>
+            <a:stCxn id="27" idx="4"/>
+            <a:endCxn id="22" idx="0"/>
+          </p:cNvCxnSpPr>
+          <p:nvPr/>
+        </p:nvCxnSpPr>
+        <p:spPr>
+          <a:xfrm>
+            <a:off x="7525087" y="3759962"/>
+            <a:ext cx="0" cy="551321"/>
+          </a:xfrm>
+          <a:prstGeom prst="straightConnector1">
+            <a:avLst/>
+          </a:prstGeom>
+          <a:ln>
+            <a:solidFill>
+              <a:schemeClr val="tx1"/>
+            </a:solidFill>
+            <a:tailEnd type="arrow"/>
+          </a:ln>
+        </p:spPr>
+        <p:style>
+          <a:lnRef idx="2">
+            <a:schemeClr val="accent1"/>
+          </a:lnRef>
+          <a:fillRef idx="0">
+            <a:schemeClr val="accent1"/>
+          </a:fillRef>
+          <a:effectRef idx="1">
+            <a:schemeClr val="accent1"/>
+          </a:effectRef>
+          <a:fontRef idx="minor">
+            <a:schemeClr val="tx1"/>
+          </a:fontRef>
+        </p:style>
+      </p:cxnSp>
+      <p:cxnSp>
+        <p:nvCxnSpPr>
+          <p:cNvPr id="118" name="直线箭头连接符 117"/>
+          <p:cNvCxnSpPr>
+            <a:stCxn id="22" idx="2"/>
+            <a:endCxn id="119" idx="0"/>
+          </p:cNvCxnSpPr>
+          <p:nvPr/>
+        </p:nvCxnSpPr>
+        <p:spPr>
+          <a:xfrm>
+            <a:off x="7525087" y="5042803"/>
+            <a:ext cx="0" cy="513447"/>
+          </a:xfrm>
+          <a:prstGeom prst="straightConnector1">
+            <a:avLst/>
+          </a:prstGeom>
+          <a:ln>
+            <a:solidFill>
+              <a:schemeClr val="tx1"/>
+            </a:solidFill>
+            <a:tailEnd type="arrow"/>
+          </a:ln>
+        </p:spPr>
+        <p:style>
+          <a:lnRef idx="2">
+            <a:schemeClr val="accent1"/>
+          </a:lnRef>
+          <a:fillRef idx="0">
+            <a:schemeClr val="accent1"/>
+          </a:fillRef>
+          <a:effectRef idx="1">
+            <a:schemeClr val="accent1"/>
+          </a:effectRef>
+          <a:fontRef idx="minor">
+            <a:schemeClr val="tx1"/>
+          </a:fontRef>
+        </p:style>
+      </p:cxnSp>
+      <p:sp>
+        <p:nvSpPr>
+          <p:cNvPr id="119" name="矩形 118"/>
+          <p:cNvSpPr/>
+          <p:nvPr/>
+        </p:nvSpPr>
+        <p:spPr>
+          <a:xfrm>
+            <a:off x="6610687" y="5556250"/>
+            <a:ext cx="1828800" cy="731520"/>
+          </a:xfrm>
+          <a:prstGeom prst="rect">
+            <a:avLst/>
+          </a:prstGeom>
+          <a:noFill/>
+          <a:ln>
+            <a:solidFill>
+              <a:schemeClr val="tx1"/>
+            </a:solidFill>
+          </a:ln>
+        </p:spPr>
+        <p:style>
+          <a:lnRef idx="1">
+            <a:schemeClr val="accent1"/>
+          </a:lnRef>
+          <a:fillRef idx="3">
+            <a:schemeClr val="accent1"/>
+          </a:fillRef>
+          <a:effectRef idx="2">
+            <a:schemeClr val="accent1"/>
+          </a:effectRef>
+          <a:fontRef idx="minor">
+            <a:schemeClr val="lt1"/>
+          </a:fontRef>
+        </p:style>
+        <p:txBody>
+          <a:bodyPr rtlCol="0" anchor="ctr"/>
+          <a:lstStyle/>
+          <a:p>
+            <a:pPr algn="ctr"/>
+            <a:r>
+              <a:rPr kumimoji="1" lang="en-US" altLang="zh-CN" dirty="0" smtClean="0">
+                <a:solidFill>
+                  <a:schemeClr val="tx1"/>
+                </a:solidFill>
+              </a:rPr>
+              <a:t>Output</a:t>
+            </a:r>
+            <a:endParaRPr kumimoji="1" lang="en-US" altLang="zh-CN" dirty="0" smtClean="0">
+              <a:solidFill>
+                <a:schemeClr val="tx1"/>
+              </a:solidFill>
+            </a:endParaRPr>
+          </a:p>
+        </p:txBody>
+      </p:sp>
     </p:spTree>
     <p:extLst>
       <p:ext uri="{BB962C8B-B14F-4D97-AF65-F5344CB8AC3E}">

</xml_diff>

<commit_message>
finished the first version of document get_start_with_gr-cdma
</commit_message>
<xml_diff>
--- a/Documents/get_start_with_gr-cdma/figure/figure_source.pptx
+++ b/Documents/get_start_with_gr-cdma/figure/figure_source.pptx
@@ -294,7 +294,7 @@
           <a:p>
             <a:fld id="{74A26211-2DA7-E74A-AB9C-A5C9F972D1F5}" type="datetimeFigureOut">
               <a:rPr kumimoji="1" lang="zh-CN" altLang="en-US" smtClean="0"/>
-              <a:t>7/9/16</a:t>
+              <a:t>8/31/16</a:t>
             </a:fld>
             <a:endParaRPr kumimoji="1" lang="zh-CN" altLang="en-US"/>
           </a:p>
@@ -464,7 +464,7 @@
           <a:p>
             <a:fld id="{74A26211-2DA7-E74A-AB9C-A5C9F972D1F5}" type="datetimeFigureOut">
               <a:rPr kumimoji="1" lang="zh-CN" altLang="en-US" smtClean="0"/>
-              <a:t>7/9/16</a:t>
+              <a:t>8/31/16</a:t>
             </a:fld>
             <a:endParaRPr kumimoji="1" lang="zh-CN" altLang="en-US"/>
           </a:p>
@@ -644,7 +644,7 @@
           <a:p>
             <a:fld id="{74A26211-2DA7-E74A-AB9C-A5C9F972D1F5}" type="datetimeFigureOut">
               <a:rPr kumimoji="1" lang="zh-CN" altLang="en-US" smtClean="0"/>
-              <a:t>7/9/16</a:t>
+              <a:t>8/31/16</a:t>
             </a:fld>
             <a:endParaRPr kumimoji="1" lang="zh-CN" altLang="en-US"/>
           </a:p>
@@ -814,7 +814,7 @@
           <a:p>
             <a:fld id="{74A26211-2DA7-E74A-AB9C-A5C9F972D1F5}" type="datetimeFigureOut">
               <a:rPr kumimoji="1" lang="zh-CN" altLang="en-US" smtClean="0"/>
-              <a:t>7/9/16</a:t>
+              <a:t>8/31/16</a:t>
             </a:fld>
             <a:endParaRPr kumimoji="1" lang="zh-CN" altLang="en-US"/>
           </a:p>
@@ -1060,7 +1060,7 @@
           <a:p>
             <a:fld id="{74A26211-2DA7-E74A-AB9C-A5C9F972D1F5}" type="datetimeFigureOut">
               <a:rPr kumimoji="1" lang="zh-CN" altLang="en-US" smtClean="0"/>
-              <a:t>7/9/16</a:t>
+              <a:t>8/31/16</a:t>
             </a:fld>
             <a:endParaRPr kumimoji="1" lang="zh-CN" altLang="en-US"/>
           </a:p>
@@ -1348,7 +1348,7 @@
           <a:p>
             <a:fld id="{74A26211-2DA7-E74A-AB9C-A5C9F972D1F5}" type="datetimeFigureOut">
               <a:rPr kumimoji="1" lang="zh-CN" altLang="en-US" smtClean="0"/>
-              <a:t>7/9/16</a:t>
+              <a:t>8/31/16</a:t>
             </a:fld>
             <a:endParaRPr kumimoji="1" lang="zh-CN" altLang="en-US"/>
           </a:p>
@@ -1770,7 +1770,7 @@
           <a:p>
             <a:fld id="{74A26211-2DA7-E74A-AB9C-A5C9F972D1F5}" type="datetimeFigureOut">
               <a:rPr kumimoji="1" lang="zh-CN" altLang="en-US" smtClean="0"/>
-              <a:t>7/9/16</a:t>
+              <a:t>8/31/16</a:t>
             </a:fld>
             <a:endParaRPr kumimoji="1" lang="zh-CN" altLang="en-US"/>
           </a:p>
@@ -1888,7 +1888,7 @@
           <a:p>
             <a:fld id="{74A26211-2DA7-E74A-AB9C-A5C9F972D1F5}" type="datetimeFigureOut">
               <a:rPr kumimoji="1" lang="zh-CN" altLang="en-US" smtClean="0"/>
-              <a:t>7/9/16</a:t>
+              <a:t>8/31/16</a:t>
             </a:fld>
             <a:endParaRPr kumimoji="1" lang="zh-CN" altLang="en-US"/>
           </a:p>
@@ -1983,7 +1983,7 @@
           <a:p>
             <a:fld id="{74A26211-2DA7-E74A-AB9C-A5C9F972D1F5}" type="datetimeFigureOut">
               <a:rPr kumimoji="1" lang="zh-CN" altLang="en-US" smtClean="0"/>
-              <a:t>7/9/16</a:t>
+              <a:t>8/31/16</a:t>
             </a:fld>
             <a:endParaRPr kumimoji="1" lang="zh-CN" altLang="en-US"/>
           </a:p>
@@ -2260,7 +2260,7 @@
           <a:p>
             <a:fld id="{74A26211-2DA7-E74A-AB9C-A5C9F972D1F5}" type="datetimeFigureOut">
               <a:rPr kumimoji="1" lang="zh-CN" altLang="en-US" smtClean="0"/>
-              <a:t>7/9/16</a:t>
+              <a:t>8/31/16</a:t>
             </a:fld>
             <a:endParaRPr kumimoji="1" lang="zh-CN" altLang="en-US"/>
           </a:p>
@@ -2513,7 +2513,7 @@
           <a:p>
             <a:fld id="{74A26211-2DA7-E74A-AB9C-A5C9F972D1F5}" type="datetimeFigureOut">
               <a:rPr kumimoji="1" lang="zh-CN" altLang="en-US" smtClean="0"/>
-              <a:t>7/9/16</a:t>
+              <a:t>8/31/16</a:t>
             </a:fld>
             <a:endParaRPr kumimoji="1" lang="zh-CN" altLang="en-US"/>
           </a:p>
@@ -2726,7 +2726,7 @@
           <a:p>
             <a:fld id="{74A26211-2DA7-E74A-AB9C-A5C9F972D1F5}" type="datetimeFigureOut">
               <a:rPr kumimoji="1" lang="zh-CN" altLang="en-US" smtClean="0"/>
-              <a:t>7/9/16</a:t>
+              <a:t>8/31/16</a:t>
             </a:fld>
             <a:endParaRPr kumimoji="1" lang="zh-CN" altLang="en-US"/>
           </a:p>
@@ -22485,19 +22485,11 @@
           <a:p>
             <a:r>
               <a:rPr kumimoji="1" lang="en-US" altLang="zh-CN" sz="1600" dirty="0" smtClean="0"/>
-              <a:t>Auto</a:t>
-            </a:r>
-            <a:r>
-              <a:rPr kumimoji="1" lang="en-US" altLang="zh-CN" sz="1600" dirty="0" smtClean="0"/>
-              <a:t>-</a:t>
+              <a:t>Auto-</a:t>
             </a:r>
             <a:r>
               <a:rPr kumimoji="1" lang="en-US" altLang="zh-CN" sz="1600" dirty="0" err="1" smtClean="0"/>
-              <a:t>c</a:t>
-            </a:r>
-            <a:r>
-              <a:rPr kumimoji="1" lang="en-US" altLang="zh-CN" sz="1600" dirty="0" err="1" smtClean="0"/>
-              <a:t>orr</a:t>
+              <a:t>corr</a:t>
             </a:r>
             <a:r>
               <a:rPr kumimoji="1" lang="en-US" altLang="zh-CN" sz="1600" dirty="0" smtClean="0"/>
@@ -22818,19 +22810,11 @@
           <a:p>
             <a:r>
               <a:rPr kumimoji="1" lang="en-US" altLang="zh-CN" sz="1600" dirty="0" smtClean="0"/>
-              <a:t>Auto</a:t>
-            </a:r>
-            <a:r>
-              <a:rPr kumimoji="1" lang="en-US" altLang="zh-CN" sz="1600" dirty="0" smtClean="0"/>
-              <a:t>-</a:t>
+              <a:t>Auto-</a:t>
             </a:r>
             <a:r>
               <a:rPr kumimoji="1" lang="en-US" altLang="zh-CN" sz="1600" dirty="0" err="1" smtClean="0"/>
-              <a:t>c</a:t>
-            </a:r>
-            <a:r>
-              <a:rPr kumimoji="1" lang="en-US" altLang="zh-CN" sz="1600" dirty="0" err="1" smtClean="0"/>
-              <a:t>orr</a:t>
+              <a:t>corr</a:t>
             </a:r>
             <a:r>
               <a:rPr kumimoji="1" lang="en-US" altLang="zh-CN" sz="1600" dirty="0" smtClean="0"/>
@@ -22867,6 +22851,1206 @@
               <a:t>δ</a:t>
             </a:r>
             <a:endParaRPr kumimoji="1" lang="zh-CN" altLang="en-US" sz="1600" dirty="0" smtClean="0"/>
+          </a:p>
+        </p:txBody>
+      </p:sp>
+      <p:grpSp>
+        <p:nvGrpSpPr>
+          <p:cNvPr id="60" name="组 59"/>
+          <p:cNvGrpSpPr/>
+          <p:nvPr/>
+        </p:nvGrpSpPr>
+        <p:grpSpPr>
+          <a:xfrm>
+            <a:off x="2164658" y="2774390"/>
+            <a:ext cx="2619862" cy="1338525"/>
+            <a:chOff x="2292967" y="2774390"/>
+            <a:chExt cx="2619862" cy="1338525"/>
+          </a:xfrm>
+        </p:grpSpPr>
+        <p:sp>
+          <p:nvSpPr>
+            <p:cNvPr id="33" name="矩形 32"/>
+            <p:cNvSpPr/>
+            <p:nvPr/>
+          </p:nvSpPr>
+          <p:spPr>
+            <a:xfrm>
+              <a:off x="3084029" y="2774390"/>
+              <a:ext cx="1828800" cy="731520"/>
+            </a:xfrm>
+            <a:prstGeom prst="rect">
+              <a:avLst/>
+            </a:prstGeom>
+            <a:noFill/>
+            <a:ln>
+              <a:solidFill>
+                <a:schemeClr val="tx1"/>
+              </a:solidFill>
+            </a:ln>
+          </p:spPr>
+          <p:style>
+            <a:lnRef idx="1">
+              <a:schemeClr val="accent1"/>
+            </a:lnRef>
+            <a:fillRef idx="3">
+              <a:schemeClr val="accent1"/>
+            </a:fillRef>
+            <a:effectRef idx="2">
+              <a:schemeClr val="accent1"/>
+            </a:effectRef>
+            <a:fontRef idx="minor">
+              <a:schemeClr val="lt1"/>
+            </a:fontRef>
+          </p:style>
+          <p:txBody>
+            <a:bodyPr rtlCol="0" anchor="ctr"/>
+            <a:lstStyle/>
+            <a:p>
+              <a:pPr algn="ctr"/>
+              <a:r>
+                <a:rPr kumimoji="1" lang="en-US" altLang="zh-CN" dirty="0" smtClean="0">
+                  <a:solidFill>
+                    <a:schemeClr val="tx1"/>
+                  </a:solidFill>
+                </a:rPr>
+                <a:t>Matched Filter</a:t>
+              </a:r>
+              <a:endParaRPr kumimoji="1" lang="en-US" altLang="zh-CN" dirty="0" smtClean="0">
+                <a:solidFill>
+                  <a:schemeClr val="tx1"/>
+                </a:solidFill>
+              </a:endParaRPr>
+            </a:p>
+          </p:txBody>
+        </p:sp>
+        <p:grpSp>
+          <p:nvGrpSpPr>
+            <p:cNvPr id="34" name="组 33"/>
+            <p:cNvGrpSpPr/>
+            <p:nvPr/>
+          </p:nvGrpSpPr>
+          <p:grpSpPr>
+            <a:xfrm>
+              <a:off x="2294554" y="2950398"/>
+              <a:ext cx="381000" cy="381000"/>
+              <a:chOff x="5238750" y="698500"/>
+              <a:chExt cx="381000" cy="381000"/>
+            </a:xfrm>
+          </p:grpSpPr>
+          <p:sp>
+            <p:nvSpPr>
+              <p:cNvPr id="35" name="椭圆 34"/>
+              <p:cNvSpPr/>
+              <p:nvPr/>
+            </p:nvSpPr>
+            <p:spPr>
+              <a:xfrm>
+                <a:off x="5238750" y="698500"/>
+                <a:ext cx="381000" cy="381000"/>
+              </a:xfrm>
+              <a:prstGeom prst="ellipse">
+                <a:avLst/>
+              </a:prstGeom>
+              <a:noFill/>
+              <a:ln w="38100">
+                <a:solidFill>
+                  <a:schemeClr val="tx1"/>
+                </a:solidFill>
+              </a:ln>
+            </p:spPr>
+            <p:style>
+              <a:lnRef idx="1">
+                <a:schemeClr val="accent1"/>
+              </a:lnRef>
+              <a:fillRef idx="3">
+                <a:schemeClr val="accent1"/>
+              </a:fillRef>
+              <a:effectRef idx="2">
+                <a:schemeClr val="accent1"/>
+              </a:effectRef>
+              <a:fontRef idx="minor">
+                <a:schemeClr val="lt1"/>
+              </a:fontRef>
+            </p:style>
+            <p:txBody>
+              <a:bodyPr rtlCol="0" anchor="ctr"/>
+              <a:lstStyle/>
+              <a:p>
+                <a:pPr algn="ctr"/>
+                <a:endParaRPr kumimoji="1" lang="zh-CN" altLang="en-US"/>
+              </a:p>
+            </p:txBody>
+          </p:sp>
+          <p:cxnSp>
+            <p:nvCxnSpPr>
+              <p:cNvPr id="36" name="直线连接符 35"/>
+              <p:cNvCxnSpPr>
+                <a:stCxn id="35" idx="1"/>
+                <a:endCxn id="35" idx="5"/>
+              </p:cNvCxnSpPr>
+              <p:nvPr/>
+            </p:nvCxnSpPr>
+            <p:spPr>
+              <a:xfrm>
+                <a:off x="5294546" y="754296"/>
+                <a:ext cx="269408" cy="269408"/>
+              </a:xfrm>
+              <a:prstGeom prst="line">
+                <a:avLst/>
+              </a:prstGeom>
+              <a:ln w="38100">
+                <a:solidFill>
+                  <a:schemeClr val="tx1"/>
+                </a:solidFill>
+              </a:ln>
+            </p:spPr>
+            <p:style>
+              <a:lnRef idx="2">
+                <a:schemeClr val="accent1"/>
+              </a:lnRef>
+              <a:fillRef idx="0">
+                <a:schemeClr val="accent1"/>
+              </a:fillRef>
+              <a:effectRef idx="1">
+                <a:schemeClr val="accent1"/>
+              </a:effectRef>
+              <a:fontRef idx="minor">
+                <a:schemeClr val="tx1"/>
+              </a:fontRef>
+            </p:style>
+          </p:cxnSp>
+          <p:cxnSp>
+            <p:nvCxnSpPr>
+              <p:cNvPr id="37" name="直线连接符 36"/>
+              <p:cNvCxnSpPr>
+                <a:stCxn id="35" idx="7"/>
+                <a:endCxn id="35" idx="3"/>
+              </p:cNvCxnSpPr>
+              <p:nvPr/>
+            </p:nvCxnSpPr>
+            <p:spPr>
+              <a:xfrm flipH="1">
+                <a:off x="5294546" y="754296"/>
+                <a:ext cx="269408" cy="269408"/>
+              </a:xfrm>
+              <a:prstGeom prst="line">
+                <a:avLst/>
+              </a:prstGeom>
+              <a:ln w="38100">
+                <a:solidFill>
+                  <a:schemeClr val="tx1"/>
+                </a:solidFill>
+              </a:ln>
+            </p:spPr>
+            <p:style>
+              <a:lnRef idx="2">
+                <a:schemeClr val="accent1"/>
+              </a:lnRef>
+              <a:fillRef idx="0">
+                <a:schemeClr val="accent1"/>
+              </a:fillRef>
+              <a:effectRef idx="1">
+                <a:schemeClr val="accent1"/>
+              </a:effectRef>
+              <a:fontRef idx="minor">
+                <a:schemeClr val="tx1"/>
+              </a:fontRef>
+            </p:style>
+          </p:cxnSp>
+        </p:grpSp>
+        <p:cxnSp>
+          <p:nvCxnSpPr>
+            <p:cNvPr id="3" name="直线箭头连接符 2"/>
+            <p:cNvCxnSpPr>
+              <a:stCxn id="6" idx="0"/>
+              <a:endCxn id="35" idx="4"/>
+            </p:cNvCxnSpPr>
+            <p:nvPr/>
+          </p:nvCxnSpPr>
+          <p:spPr>
+            <a:xfrm flipV="1">
+              <a:off x="2484261" y="3331398"/>
+              <a:ext cx="793" cy="319852"/>
+            </a:xfrm>
+            <a:prstGeom prst="straightConnector1">
+              <a:avLst/>
+            </a:prstGeom>
+            <a:ln>
+              <a:solidFill>
+                <a:schemeClr val="tx1"/>
+              </a:solidFill>
+              <a:tailEnd type="arrow"/>
+            </a:ln>
+          </p:spPr>
+          <p:style>
+            <a:lnRef idx="2">
+              <a:schemeClr val="accent1"/>
+            </a:lnRef>
+            <a:fillRef idx="0">
+              <a:schemeClr val="accent1"/>
+            </a:fillRef>
+            <a:effectRef idx="1">
+              <a:schemeClr val="accent1"/>
+            </a:effectRef>
+            <a:fontRef idx="minor">
+              <a:schemeClr val="tx1"/>
+            </a:fontRef>
+          </p:style>
+        </p:cxnSp>
+        <p:sp>
+          <p:nvSpPr>
+            <p:cNvPr id="6" name="文本框 5"/>
+            <p:cNvSpPr txBox="1"/>
+            <p:nvPr/>
+          </p:nvSpPr>
+          <p:spPr>
+            <a:xfrm>
+              <a:off x="2292967" y="3651250"/>
+              <a:ext cx="382587" cy="461665"/>
+            </a:xfrm>
+            <a:prstGeom prst="rect">
+              <a:avLst/>
+            </a:prstGeom>
+            <a:noFill/>
+          </p:spPr>
+          <p:txBody>
+            <a:bodyPr wrap="none" rtlCol="0">
+              <a:spAutoFit/>
+            </a:bodyPr>
+            <a:lstStyle/>
+            <a:p>
+              <a:r>
+                <a:rPr kumimoji="1" lang="en-US" altLang="zh-CN" sz="2400" dirty="0" smtClean="0"/>
+                <a:t>f</a:t>
+              </a:r>
+              <a:r>
+                <a:rPr kumimoji="1" lang="en-US" altLang="zh-CN" sz="2400" baseline="-25000" dirty="0" smtClean="0"/>
+                <a:t>1</a:t>
+              </a:r>
+              <a:endParaRPr kumimoji="1" lang="zh-CN" altLang="en-US" sz="2400" baseline="-25000" dirty="0" smtClean="0"/>
+            </a:p>
+          </p:txBody>
+        </p:sp>
+        <p:cxnSp>
+          <p:nvCxnSpPr>
+            <p:cNvPr id="18" name="直线箭头连接符 17"/>
+            <p:cNvCxnSpPr>
+              <a:stCxn id="35" idx="6"/>
+              <a:endCxn id="33" idx="1"/>
+            </p:cNvCxnSpPr>
+            <p:nvPr/>
+          </p:nvCxnSpPr>
+          <p:spPr>
+            <a:xfrm flipV="1">
+              <a:off x="2675554" y="3140150"/>
+              <a:ext cx="408475" cy="748"/>
+            </a:xfrm>
+            <a:prstGeom prst="straightConnector1">
+              <a:avLst/>
+            </a:prstGeom>
+            <a:ln>
+              <a:solidFill>
+                <a:schemeClr val="tx1"/>
+              </a:solidFill>
+              <a:tailEnd type="arrow"/>
+            </a:ln>
+          </p:spPr>
+          <p:style>
+            <a:lnRef idx="2">
+              <a:schemeClr val="accent1"/>
+            </a:lnRef>
+            <a:fillRef idx="0">
+              <a:schemeClr val="accent1"/>
+            </a:fillRef>
+            <a:effectRef idx="1">
+              <a:schemeClr val="accent1"/>
+            </a:effectRef>
+            <a:fontRef idx="minor">
+              <a:schemeClr val="tx1"/>
+            </a:fontRef>
+          </p:style>
+        </p:cxnSp>
+      </p:grpSp>
+      <p:grpSp>
+        <p:nvGrpSpPr>
+          <p:cNvPr id="59" name="组 58"/>
+          <p:cNvGrpSpPr/>
+          <p:nvPr/>
+        </p:nvGrpSpPr>
+        <p:grpSpPr>
+          <a:xfrm>
+            <a:off x="2164658" y="4244153"/>
+            <a:ext cx="2619862" cy="1338525"/>
+            <a:chOff x="2292967" y="4265315"/>
+            <a:chExt cx="2619862" cy="1338525"/>
+          </a:xfrm>
+        </p:grpSpPr>
+        <p:sp>
+          <p:nvSpPr>
+            <p:cNvPr id="38" name="矩形 37"/>
+            <p:cNvSpPr/>
+            <p:nvPr/>
+          </p:nvSpPr>
+          <p:spPr>
+            <a:xfrm>
+              <a:off x="3084029" y="4265315"/>
+              <a:ext cx="1828800" cy="731520"/>
+            </a:xfrm>
+            <a:prstGeom prst="rect">
+              <a:avLst/>
+            </a:prstGeom>
+            <a:noFill/>
+            <a:ln>
+              <a:solidFill>
+                <a:schemeClr val="tx1"/>
+              </a:solidFill>
+            </a:ln>
+          </p:spPr>
+          <p:style>
+            <a:lnRef idx="1">
+              <a:schemeClr val="accent1"/>
+            </a:lnRef>
+            <a:fillRef idx="3">
+              <a:schemeClr val="accent1"/>
+            </a:fillRef>
+            <a:effectRef idx="2">
+              <a:schemeClr val="accent1"/>
+            </a:effectRef>
+            <a:fontRef idx="minor">
+              <a:schemeClr val="lt1"/>
+            </a:fontRef>
+          </p:style>
+          <p:txBody>
+            <a:bodyPr rtlCol="0" anchor="ctr"/>
+            <a:lstStyle/>
+            <a:p>
+              <a:pPr algn="ctr"/>
+              <a:r>
+                <a:rPr kumimoji="1" lang="en-US" altLang="zh-CN" dirty="0" smtClean="0">
+                  <a:solidFill>
+                    <a:schemeClr val="tx1"/>
+                  </a:solidFill>
+                </a:rPr>
+                <a:t>Matched Filter</a:t>
+              </a:r>
+              <a:endParaRPr kumimoji="1" lang="en-US" altLang="zh-CN" dirty="0" smtClean="0">
+                <a:solidFill>
+                  <a:schemeClr val="tx1"/>
+                </a:solidFill>
+              </a:endParaRPr>
+            </a:p>
+          </p:txBody>
+        </p:sp>
+        <p:grpSp>
+          <p:nvGrpSpPr>
+            <p:cNvPr id="39" name="组 38"/>
+            <p:cNvGrpSpPr/>
+            <p:nvPr/>
+          </p:nvGrpSpPr>
+          <p:grpSpPr>
+            <a:xfrm>
+              <a:off x="2294554" y="4441323"/>
+              <a:ext cx="381000" cy="381000"/>
+              <a:chOff x="5238750" y="698500"/>
+              <a:chExt cx="381000" cy="381000"/>
+            </a:xfrm>
+          </p:grpSpPr>
+          <p:sp>
+            <p:nvSpPr>
+              <p:cNvPr id="40" name="椭圆 39"/>
+              <p:cNvSpPr/>
+              <p:nvPr/>
+            </p:nvSpPr>
+            <p:spPr>
+              <a:xfrm>
+                <a:off x="5238750" y="698500"/>
+                <a:ext cx="381000" cy="381000"/>
+              </a:xfrm>
+              <a:prstGeom prst="ellipse">
+                <a:avLst/>
+              </a:prstGeom>
+              <a:noFill/>
+              <a:ln w="38100">
+                <a:solidFill>
+                  <a:schemeClr val="tx1"/>
+                </a:solidFill>
+              </a:ln>
+            </p:spPr>
+            <p:style>
+              <a:lnRef idx="1">
+                <a:schemeClr val="accent1"/>
+              </a:lnRef>
+              <a:fillRef idx="3">
+                <a:schemeClr val="accent1"/>
+              </a:fillRef>
+              <a:effectRef idx="2">
+                <a:schemeClr val="accent1"/>
+              </a:effectRef>
+              <a:fontRef idx="minor">
+                <a:schemeClr val="lt1"/>
+              </a:fontRef>
+            </p:style>
+            <p:txBody>
+              <a:bodyPr rtlCol="0" anchor="ctr"/>
+              <a:lstStyle/>
+              <a:p>
+                <a:pPr algn="ctr"/>
+                <a:endParaRPr kumimoji="1" lang="zh-CN" altLang="en-US"/>
+              </a:p>
+            </p:txBody>
+          </p:sp>
+          <p:cxnSp>
+            <p:nvCxnSpPr>
+              <p:cNvPr id="41" name="直线连接符 40"/>
+              <p:cNvCxnSpPr>
+                <a:stCxn id="40" idx="1"/>
+                <a:endCxn id="40" idx="5"/>
+              </p:cNvCxnSpPr>
+              <p:nvPr/>
+            </p:nvCxnSpPr>
+            <p:spPr>
+              <a:xfrm>
+                <a:off x="5294546" y="754296"/>
+                <a:ext cx="269408" cy="269408"/>
+              </a:xfrm>
+              <a:prstGeom prst="line">
+                <a:avLst/>
+              </a:prstGeom>
+              <a:ln w="38100">
+                <a:solidFill>
+                  <a:schemeClr val="tx1"/>
+                </a:solidFill>
+              </a:ln>
+            </p:spPr>
+            <p:style>
+              <a:lnRef idx="2">
+                <a:schemeClr val="accent1"/>
+              </a:lnRef>
+              <a:fillRef idx="0">
+                <a:schemeClr val="accent1"/>
+              </a:fillRef>
+              <a:effectRef idx="1">
+                <a:schemeClr val="accent1"/>
+              </a:effectRef>
+              <a:fontRef idx="minor">
+                <a:schemeClr val="tx1"/>
+              </a:fontRef>
+            </p:style>
+          </p:cxnSp>
+          <p:cxnSp>
+            <p:nvCxnSpPr>
+              <p:cNvPr id="42" name="直线连接符 41"/>
+              <p:cNvCxnSpPr>
+                <a:stCxn id="40" idx="7"/>
+                <a:endCxn id="40" idx="3"/>
+              </p:cNvCxnSpPr>
+              <p:nvPr/>
+            </p:nvCxnSpPr>
+            <p:spPr>
+              <a:xfrm flipH="1">
+                <a:off x="5294546" y="754296"/>
+                <a:ext cx="269408" cy="269408"/>
+              </a:xfrm>
+              <a:prstGeom prst="line">
+                <a:avLst/>
+              </a:prstGeom>
+              <a:ln w="38100">
+                <a:solidFill>
+                  <a:schemeClr val="tx1"/>
+                </a:solidFill>
+              </a:ln>
+            </p:spPr>
+            <p:style>
+              <a:lnRef idx="2">
+                <a:schemeClr val="accent1"/>
+              </a:lnRef>
+              <a:fillRef idx="0">
+                <a:schemeClr val="accent1"/>
+              </a:fillRef>
+              <a:effectRef idx="1">
+                <a:schemeClr val="accent1"/>
+              </a:effectRef>
+              <a:fontRef idx="minor">
+                <a:schemeClr val="tx1"/>
+              </a:fontRef>
+            </p:style>
+          </p:cxnSp>
+        </p:grpSp>
+        <p:cxnSp>
+          <p:nvCxnSpPr>
+            <p:cNvPr id="43" name="直线箭头连接符 42"/>
+            <p:cNvCxnSpPr>
+              <a:stCxn id="44" idx="0"/>
+              <a:endCxn id="40" idx="4"/>
+            </p:cNvCxnSpPr>
+            <p:nvPr/>
+          </p:nvCxnSpPr>
+          <p:spPr>
+            <a:xfrm flipV="1">
+              <a:off x="2483559" y="4822323"/>
+              <a:ext cx="1495" cy="319852"/>
+            </a:xfrm>
+            <a:prstGeom prst="straightConnector1">
+              <a:avLst/>
+            </a:prstGeom>
+            <a:ln>
+              <a:solidFill>
+                <a:schemeClr val="tx1"/>
+              </a:solidFill>
+              <a:tailEnd type="arrow"/>
+            </a:ln>
+          </p:spPr>
+          <p:style>
+            <a:lnRef idx="2">
+              <a:schemeClr val="accent1"/>
+            </a:lnRef>
+            <a:fillRef idx="0">
+              <a:schemeClr val="accent1"/>
+            </a:fillRef>
+            <a:effectRef idx="1">
+              <a:schemeClr val="accent1"/>
+            </a:effectRef>
+            <a:fontRef idx="minor">
+              <a:schemeClr val="tx1"/>
+            </a:fontRef>
+          </p:style>
+        </p:cxnSp>
+        <p:sp>
+          <p:nvSpPr>
+            <p:cNvPr id="44" name="文本框 43"/>
+            <p:cNvSpPr txBox="1"/>
+            <p:nvPr/>
+          </p:nvSpPr>
+          <p:spPr>
+            <a:xfrm>
+              <a:off x="2292967" y="5142175"/>
+              <a:ext cx="381184" cy="461665"/>
+            </a:xfrm>
+            <a:prstGeom prst="rect">
+              <a:avLst/>
+            </a:prstGeom>
+            <a:noFill/>
+          </p:spPr>
+          <p:txBody>
+            <a:bodyPr wrap="none" rtlCol="0">
+              <a:spAutoFit/>
+            </a:bodyPr>
+            <a:lstStyle/>
+            <a:p>
+              <a:r>
+                <a:rPr kumimoji="1" lang="en-US" altLang="zh-CN" sz="2400" dirty="0" smtClean="0"/>
+                <a:t>f</a:t>
+              </a:r>
+              <a:r>
+                <a:rPr kumimoji="1" lang="zh-CN" altLang="zh-CN" sz="2400" baseline="-25000" dirty="0"/>
+                <a:t>2</a:t>
+              </a:r>
+              <a:endParaRPr kumimoji="1" lang="zh-CN" altLang="en-US" sz="2400" baseline="-25000" dirty="0" smtClean="0"/>
+            </a:p>
+          </p:txBody>
+        </p:sp>
+        <p:cxnSp>
+          <p:nvCxnSpPr>
+            <p:cNvPr id="53" name="直线箭头连接符 52"/>
+            <p:cNvCxnSpPr>
+              <a:stCxn id="40" idx="6"/>
+              <a:endCxn id="38" idx="1"/>
+            </p:cNvCxnSpPr>
+            <p:nvPr/>
+          </p:nvCxnSpPr>
+          <p:spPr>
+            <a:xfrm flipV="1">
+              <a:off x="2675554" y="4631075"/>
+              <a:ext cx="408475" cy="748"/>
+            </a:xfrm>
+            <a:prstGeom prst="straightConnector1">
+              <a:avLst/>
+            </a:prstGeom>
+            <a:ln>
+              <a:solidFill>
+                <a:schemeClr val="tx1"/>
+              </a:solidFill>
+              <a:tailEnd type="arrow"/>
+            </a:ln>
+          </p:spPr>
+          <p:style>
+            <a:lnRef idx="2">
+              <a:schemeClr val="accent1"/>
+            </a:lnRef>
+            <a:fillRef idx="0">
+              <a:schemeClr val="accent1"/>
+            </a:fillRef>
+            <a:effectRef idx="1">
+              <a:schemeClr val="accent1"/>
+            </a:effectRef>
+            <a:fontRef idx="minor">
+              <a:schemeClr val="tx1"/>
+            </a:fontRef>
+          </p:style>
+        </p:cxnSp>
+      </p:grpSp>
+      <p:grpSp>
+        <p:nvGrpSpPr>
+          <p:cNvPr id="58" name="组 57"/>
+          <p:cNvGrpSpPr/>
+          <p:nvPr/>
+        </p:nvGrpSpPr>
+        <p:grpSpPr>
+          <a:xfrm>
+            <a:off x="2164658" y="6306820"/>
+            <a:ext cx="2619862" cy="1338525"/>
+            <a:chOff x="2164658" y="6306820"/>
+            <a:chExt cx="2619862" cy="1338525"/>
+          </a:xfrm>
+        </p:grpSpPr>
+        <p:sp>
+          <p:nvSpPr>
+            <p:cNvPr id="45" name="矩形 44"/>
+            <p:cNvSpPr/>
+            <p:nvPr/>
+          </p:nvSpPr>
+          <p:spPr>
+            <a:xfrm>
+              <a:off x="2955720" y="6306820"/>
+              <a:ext cx="1828800" cy="731520"/>
+            </a:xfrm>
+            <a:prstGeom prst="rect">
+              <a:avLst/>
+            </a:prstGeom>
+            <a:noFill/>
+            <a:ln>
+              <a:solidFill>
+                <a:schemeClr val="tx1"/>
+              </a:solidFill>
+            </a:ln>
+          </p:spPr>
+          <p:style>
+            <a:lnRef idx="1">
+              <a:schemeClr val="accent1"/>
+            </a:lnRef>
+            <a:fillRef idx="3">
+              <a:schemeClr val="accent1"/>
+            </a:fillRef>
+            <a:effectRef idx="2">
+              <a:schemeClr val="accent1"/>
+            </a:effectRef>
+            <a:fontRef idx="minor">
+              <a:schemeClr val="lt1"/>
+            </a:fontRef>
+          </p:style>
+          <p:txBody>
+            <a:bodyPr rtlCol="0" anchor="ctr"/>
+            <a:lstStyle/>
+            <a:p>
+              <a:pPr algn="ctr"/>
+              <a:r>
+                <a:rPr kumimoji="1" lang="en-US" altLang="zh-CN" dirty="0" smtClean="0">
+                  <a:solidFill>
+                    <a:schemeClr val="tx1"/>
+                  </a:solidFill>
+                </a:rPr>
+                <a:t>Matched Filter</a:t>
+              </a:r>
+              <a:endParaRPr kumimoji="1" lang="en-US" altLang="zh-CN" dirty="0" smtClean="0">
+                <a:solidFill>
+                  <a:schemeClr val="tx1"/>
+                </a:solidFill>
+              </a:endParaRPr>
+            </a:p>
+          </p:txBody>
+        </p:sp>
+        <p:grpSp>
+          <p:nvGrpSpPr>
+            <p:cNvPr id="46" name="组 45"/>
+            <p:cNvGrpSpPr/>
+            <p:nvPr/>
+          </p:nvGrpSpPr>
+          <p:grpSpPr>
+            <a:xfrm>
+              <a:off x="2166245" y="6482828"/>
+              <a:ext cx="381000" cy="381000"/>
+              <a:chOff x="5238750" y="698500"/>
+              <a:chExt cx="381000" cy="381000"/>
+            </a:xfrm>
+          </p:grpSpPr>
+          <p:sp>
+            <p:nvSpPr>
+              <p:cNvPr id="47" name="椭圆 46"/>
+              <p:cNvSpPr/>
+              <p:nvPr/>
+            </p:nvSpPr>
+            <p:spPr>
+              <a:xfrm>
+                <a:off x="5238750" y="698500"/>
+                <a:ext cx="381000" cy="381000"/>
+              </a:xfrm>
+              <a:prstGeom prst="ellipse">
+                <a:avLst/>
+              </a:prstGeom>
+              <a:noFill/>
+              <a:ln w="38100">
+                <a:solidFill>
+                  <a:schemeClr val="tx1"/>
+                </a:solidFill>
+              </a:ln>
+            </p:spPr>
+            <p:style>
+              <a:lnRef idx="1">
+                <a:schemeClr val="accent1"/>
+              </a:lnRef>
+              <a:fillRef idx="3">
+                <a:schemeClr val="accent1"/>
+              </a:fillRef>
+              <a:effectRef idx="2">
+                <a:schemeClr val="accent1"/>
+              </a:effectRef>
+              <a:fontRef idx="minor">
+                <a:schemeClr val="lt1"/>
+              </a:fontRef>
+            </p:style>
+            <p:txBody>
+              <a:bodyPr rtlCol="0" anchor="ctr"/>
+              <a:lstStyle/>
+              <a:p>
+                <a:pPr algn="ctr"/>
+                <a:endParaRPr kumimoji="1" lang="zh-CN" altLang="en-US"/>
+              </a:p>
+            </p:txBody>
+          </p:sp>
+          <p:cxnSp>
+            <p:nvCxnSpPr>
+              <p:cNvPr id="48" name="直线连接符 47"/>
+              <p:cNvCxnSpPr>
+                <a:stCxn id="47" idx="1"/>
+                <a:endCxn id="47" idx="5"/>
+              </p:cNvCxnSpPr>
+              <p:nvPr/>
+            </p:nvCxnSpPr>
+            <p:spPr>
+              <a:xfrm>
+                <a:off x="5294546" y="754296"/>
+                <a:ext cx="269408" cy="269408"/>
+              </a:xfrm>
+              <a:prstGeom prst="line">
+                <a:avLst/>
+              </a:prstGeom>
+              <a:ln w="38100">
+                <a:solidFill>
+                  <a:schemeClr val="tx1"/>
+                </a:solidFill>
+              </a:ln>
+            </p:spPr>
+            <p:style>
+              <a:lnRef idx="2">
+                <a:schemeClr val="accent1"/>
+              </a:lnRef>
+              <a:fillRef idx="0">
+                <a:schemeClr val="accent1"/>
+              </a:fillRef>
+              <a:effectRef idx="1">
+                <a:schemeClr val="accent1"/>
+              </a:effectRef>
+              <a:fontRef idx="minor">
+                <a:schemeClr val="tx1"/>
+              </a:fontRef>
+            </p:style>
+          </p:cxnSp>
+          <p:cxnSp>
+            <p:nvCxnSpPr>
+              <p:cNvPr id="49" name="直线连接符 48"/>
+              <p:cNvCxnSpPr>
+                <a:stCxn id="47" idx="7"/>
+                <a:endCxn id="47" idx="3"/>
+              </p:cNvCxnSpPr>
+              <p:nvPr/>
+            </p:nvCxnSpPr>
+            <p:spPr>
+              <a:xfrm flipH="1">
+                <a:off x="5294546" y="754296"/>
+                <a:ext cx="269408" cy="269408"/>
+              </a:xfrm>
+              <a:prstGeom prst="line">
+                <a:avLst/>
+              </a:prstGeom>
+              <a:ln w="38100">
+                <a:solidFill>
+                  <a:schemeClr val="tx1"/>
+                </a:solidFill>
+              </a:ln>
+            </p:spPr>
+            <p:style>
+              <a:lnRef idx="2">
+                <a:schemeClr val="accent1"/>
+              </a:lnRef>
+              <a:fillRef idx="0">
+                <a:schemeClr val="accent1"/>
+              </a:fillRef>
+              <a:effectRef idx="1">
+                <a:schemeClr val="accent1"/>
+              </a:effectRef>
+              <a:fontRef idx="minor">
+                <a:schemeClr val="tx1"/>
+              </a:fontRef>
+            </p:style>
+          </p:cxnSp>
+        </p:grpSp>
+        <p:sp>
+          <p:nvSpPr>
+            <p:cNvPr id="51" name="文本框 50"/>
+            <p:cNvSpPr txBox="1"/>
+            <p:nvPr/>
+          </p:nvSpPr>
+          <p:spPr>
+            <a:xfrm>
+              <a:off x="2164658" y="7183680"/>
+              <a:ext cx="386394" cy="461665"/>
+            </a:xfrm>
+            <a:prstGeom prst="rect">
+              <a:avLst/>
+            </a:prstGeom>
+            <a:noFill/>
+          </p:spPr>
+          <p:txBody>
+            <a:bodyPr wrap="none" rtlCol="0">
+              <a:spAutoFit/>
+            </a:bodyPr>
+            <a:lstStyle/>
+            <a:p>
+              <a:r>
+                <a:rPr kumimoji="1" lang="en-US" altLang="zh-CN" sz="2400" dirty="0" err="1" smtClean="0"/>
+                <a:t>f</a:t>
+              </a:r>
+              <a:r>
+                <a:rPr kumimoji="1" lang="en-US" altLang="zh-CN" sz="2400" baseline="-25000" dirty="0" err="1"/>
+                <a:t>n</a:t>
+              </a:r>
+              <a:endParaRPr kumimoji="1" lang="zh-CN" altLang="en-US" sz="2400" baseline="-25000" dirty="0" smtClean="0"/>
+            </a:p>
+          </p:txBody>
+        </p:sp>
+        <p:cxnSp>
+          <p:nvCxnSpPr>
+            <p:cNvPr id="52" name="直线箭头连接符 51"/>
+            <p:cNvCxnSpPr>
+              <a:stCxn id="51" idx="0"/>
+              <a:endCxn id="47" idx="4"/>
+            </p:cNvCxnSpPr>
+            <p:nvPr/>
+          </p:nvCxnSpPr>
+          <p:spPr>
+            <a:xfrm flipH="1" flipV="1">
+              <a:off x="2356745" y="6863828"/>
+              <a:ext cx="1110" cy="319852"/>
+            </a:xfrm>
+            <a:prstGeom prst="straightConnector1">
+              <a:avLst/>
+            </a:prstGeom>
+            <a:ln>
+              <a:solidFill>
+                <a:schemeClr val="tx1"/>
+              </a:solidFill>
+              <a:tailEnd type="arrow"/>
+            </a:ln>
+          </p:spPr>
+          <p:style>
+            <a:lnRef idx="2">
+              <a:schemeClr val="accent1"/>
+            </a:lnRef>
+            <a:fillRef idx="0">
+              <a:schemeClr val="accent1"/>
+            </a:fillRef>
+            <a:effectRef idx="1">
+              <a:schemeClr val="accent1"/>
+            </a:effectRef>
+            <a:fontRef idx="minor">
+              <a:schemeClr val="tx1"/>
+            </a:fontRef>
+          </p:style>
+        </p:cxnSp>
+        <p:cxnSp>
+          <p:nvCxnSpPr>
+            <p:cNvPr id="55" name="直线箭头连接符 54"/>
+            <p:cNvCxnSpPr>
+              <a:stCxn id="47" idx="6"/>
+              <a:endCxn id="45" idx="1"/>
+            </p:cNvCxnSpPr>
+            <p:nvPr/>
+          </p:nvCxnSpPr>
+          <p:spPr>
+            <a:xfrm flipV="1">
+              <a:off x="2547245" y="6672580"/>
+              <a:ext cx="408475" cy="748"/>
+            </a:xfrm>
+            <a:prstGeom prst="straightConnector1">
+              <a:avLst/>
+            </a:prstGeom>
+            <a:ln>
+              <a:solidFill>
+                <a:schemeClr val="tx1"/>
+              </a:solidFill>
+              <a:tailEnd type="arrow"/>
+            </a:ln>
+          </p:spPr>
+          <p:style>
+            <a:lnRef idx="2">
+              <a:schemeClr val="accent1"/>
+            </a:lnRef>
+            <a:fillRef idx="0">
+              <a:schemeClr val="accent1"/>
+            </a:fillRef>
+            <a:effectRef idx="1">
+              <a:schemeClr val="accent1"/>
+            </a:effectRef>
+            <a:fontRef idx="minor">
+              <a:schemeClr val="tx1"/>
+            </a:fontRef>
+          </p:style>
+        </p:cxnSp>
+      </p:grpSp>
+      <p:sp>
+        <p:nvSpPr>
+          <p:cNvPr id="61" name="文本框 60"/>
+          <p:cNvSpPr txBox="1"/>
+          <p:nvPr/>
+        </p:nvSpPr>
+        <p:spPr>
+          <a:xfrm>
+            <a:off x="3159464" y="5253541"/>
+            <a:ext cx="630251" cy="461665"/>
+          </a:xfrm>
+          <a:prstGeom prst="rect">
+            <a:avLst/>
+          </a:prstGeom>
+          <a:noFill/>
+        </p:spPr>
+        <p:txBody>
+          <a:bodyPr wrap="none" rtlCol="0">
+            <a:spAutoFit/>
+          </a:bodyPr>
+          <a:lstStyle/>
+          <a:p>
+            <a:r>
+              <a:rPr kumimoji="1" lang="en-US" altLang="zh-CN" sz="2400" dirty="0" smtClean="0"/>
+              <a:t>……</a:t>
+            </a:r>
+            <a:endParaRPr kumimoji="1" lang="zh-CN" altLang="en-US" sz="2400" dirty="0" smtClean="0"/>
+          </a:p>
+        </p:txBody>
+      </p:sp>
+      <p:sp>
+        <p:nvSpPr>
+          <p:cNvPr id="62" name="矩形 61"/>
+          <p:cNvSpPr/>
+          <p:nvPr/>
+        </p:nvSpPr>
+        <p:spPr>
+          <a:xfrm>
+            <a:off x="5826125" y="2774390"/>
+            <a:ext cx="904875" cy="4655110"/>
+          </a:xfrm>
+          <a:prstGeom prst="rect">
+            <a:avLst/>
+          </a:prstGeom>
+          <a:noFill/>
+          <a:ln>
+            <a:solidFill>
+              <a:schemeClr val="tx1"/>
+            </a:solidFill>
+          </a:ln>
+        </p:spPr>
+        <p:style>
+          <a:lnRef idx="1">
+            <a:schemeClr val="accent1"/>
+          </a:lnRef>
+          <a:fillRef idx="3">
+            <a:schemeClr val="accent1"/>
+          </a:fillRef>
+          <a:effectRef idx="2">
+            <a:schemeClr val="accent1"/>
+          </a:effectRef>
+          <a:fontRef idx="minor">
+            <a:schemeClr val="lt1"/>
+          </a:fontRef>
+        </p:style>
+        <p:txBody>
+          <a:bodyPr rtlCol="0" anchor="ctr"/>
+          <a:lstStyle/>
+          <a:p>
+            <a:pPr algn="ctr"/>
+            <a:r>
+              <a:rPr kumimoji="1" lang="en-US" altLang="zh-CN" dirty="0" smtClean="0">
+                <a:solidFill>
+                  <a:schemeClr val="tx1"/>
+                </a:solidFill>
+              </a:rPr>
+              <a:t>MAX</a:t>
+            </a:r>
+            <a:endParaRPr kumimoji="1" lang="zh-CN" altLang="en-US" dirty="0">
+              <a:solidFill>
+                <a:schemeClr val="tx1"/>
+              </a:solidFill>
+            </a:endParaRPr>
+          </a:p>
+        </p:txBody>
+      </p:sp>
+      <p:sp>
+        <p:nvSpPr>
+          <p:cNvPr id="64" name="矩形 63"/>
+          <p:cNvSpPr/>
+          <p:nvPr/>
+        </p:nvSpPr>
+        <p:spPr>
+          <a:xfrm>
+            <a:off x="7568995" y="5349446"/>
+            <a:ext cx="2162380" cy="731520"/>
+          </a:xfrm>
+          <a:prstGeom prst="rect">
+            <a:avLst/>
+          </a:prstGeom>
+          <a:noFill/>
+          <a:ln>
+            <a:solidFill>
+              <a:schemeClr val="tx1"/>
+            </a:solidFill>
+          </a:ln>
+        </p:spPr>
+        <p:style>
+          <a:lnRef idx="1">
+            <a:schemeClr val="accent1"/>
+          </a:lnRef>
+          <a:fillRef idx="3">
+            <a:schemeClr val="accent1"/>
+          </a:fillRef>
+          <a:effectRef idx="2">
+            <a:schemeClr val="accent1"/>
+          </a:effectRef>
+          <a:fontRef idx="minor">
+            <a:schemeClr val="lt1"/>
+          </a:fontRef>
+        </p:style>
+        <p:txBody>
+          <a:bodyPr rtlCol="0" anchor="ctr"/>
+          <a:lstStyle/>
+          <a:p>
+            <a:pPr algn="ctr"/>
+            <a:r>
+              <a:rPr kumimoji="1" lang="en-US" altLang="zh-CN" dirty="0" smtClean="0">
+                <a:solidFill>
+                  <a:schemeClr val="tx1"/>
+                </a:solidFill>
+              </a:rPr>
+              <a:t>Peak</a:t>
+            </a:r>
+            <a:r>
+              <a:rPr kumimoji="1" lang="zh-CN" altLang="en-US" dirty="0" smtClean="0">
+                <a:solidFill>
+                  <a:schemeClr val="tx1"/>
+                </a:solidFill>
+              </a:rPr>
+              <a:t> </a:t>
+            </a:r>
+            <a:r>
+              <a:rPr kumimoji="1" lang="en-US" altLang="zh-CN" dirty="0" smtClean="0">
+                <a:solidFill>
+                  <a:schemeClr val="tx1"/>
+                </a:solidFill>
+              </a:rPr>
+              <a:t>Detector</a:t>
+            </a:r>
+            <a:endParaRPr kumimoji="1" lang="en-US" altLang="zh-CN" dirty="0" smtClean="0">
+              <a:solidFill>
+                <a:schemeClr val="tx1"/>
+              </a:solidFill>
+            </a:endParaRPr>
+          </a:p>
+        </p:txBody>
+      </p:sp>
+      <p:sp>
+        <p:nvSpPr>
+          <p:cNvPr id="65" name="矩形 64"/>
+          <p:cNvSpPr/>
+          <p:nvPr/>
+        </p:nvSpPr>
+        <p:spPr>
+          <a:xfrm>
+            <a:off x="7568995" y="3879141"/>
+            <a:ext cx="2162380" cy="731520"/>
+          </a:xfrm>
+          <a:prstGeom prst="rect">
+            <a:avLst/>
+          </a:prstGeom>
+          <a:noFill/>
+          <a:ln>
+            <a:solidFill>
+              <a:schemeClr val="tx1"/>
+            </a:solidFill>
+          </a:ln>
+        </p:spPr>
+        <p:style>
+          <a:lnRef idx="1">
+            <a:schemeClr val="accent1"/>
+          </a:lnRef>
+          <a:fillRef idx="3">
+            <a:schemeClr val="accent1"/>
+          </a:fillRef>
+          <a:effectRef idx="2">
+            <a:schemeClr val="accent1"/>
+          </a:effectRef>
+          <a:fontRef idx="minor">
+            <a:schemeClr val="lt1"/>
+          </a:fontRef>
+        </p:style>
+        <p:txBody>
+          <a:bodyPr rtlCol="0" anchor="ctr"/>
+          <a:lstStyle/>
+          <a:p>
+            <a:pPr algn="ctr"/>
+            <a:r>
+              <a:rPr kumimoji="1" lang="en-US" altLang="zh-CN" dirty="0" smtClean="0">
+                <a:solidFill>
+                  <a:schemeClr val="tx1"/>
+                </a:solidFill>
+              </a:rPr>
+              <a:t>Find</a:t>
+            </a:r>
+            <a:r>
+              <a:rPr kumimoji="1" lang="zh-CN" altLang="en-US" dirty="0" smtClean="0">
+                <a:solidFill>
+                  <a:schemeClr val="tx1"/>
+                </a:solidFill>
+              </a:rPr>
+              <a:t> </a:t>
+            </a:r>
+            <a:r>
+              <a:rPr kumimoji="1" lang="en-US" altLang="zh-CN" dirty="0" smtClean="0">
+                <a:solidFill>
+                  <a:schemeClr val="tx1"/>
+                </a:solidFill>
+              </a:rPr>
+              <a:t>corresponding</a:t>
+            </a:r>
+            <a:r>
+              <a:rPr kumimoji="1" lang="zh-CN" altLang="en-US" dirty="0" smtClean="0">
+                <a:solidFill>
+                  <a:schemeClr val="tx1"/>
+                </a:solidFill>
+              </a:rPr>
+              <a:t> </a:t>
+            </a:r>
+            <a:r>
+              <a:rPr kumimoji="1" lang="en-US" altLang="zh-CN" smtClean="0">
+                <a:solidFill>
+                  <a:schemeClr val="tx1"/>
+                </a:solidFill>
+              </a:rPr>
+              <a:t>frequency</a:t>
+            </a:r>
+            <a:endParaRPr kumimoji="1" lang="en-US" altLang="zh-CN" dirty="0" smtClean="0">
+              <a:solidFill>
+                <a:schemeClr val="tx1"/>
+              </a:solidFill>
+            </a:endParaRPr>
           </a:p>
         </p:txBody>
       </p:sp>

</xml_diff>